<commit_message>
Correct player view, scores adjusted, effect prompts + different avatar sprites
</commit_message>
<xml_diff>
--- a/docs/final presentation.pptx
+++ b/docs/final presentation.pptx
@@ -204,7 +204,7 @@
           <a:p>
             <a:fld id="{D442CA7A-1982-45F1-835E-FEE56F9E9630}" type="datetimeFigureOut">
               <a:rPr lang="en-US" smtClean="0"/>
-              <a:t>21-Feb-17</a:t>
+              <a:t>22-Feb-17</a:t>
             </a:fld>
             <a:endParaRPr lang="en-US"/>
           </a:p>
@@ -567,7 +567,7 @@
           <a:effectLst/>
           <a:extLst>
             <a:ext uri="{91240B29-F687-4f45-9708-019B960494DF}">
-              <a14:hiddenLine xmlns="" xmlns:a14="http://schemas.microsoft.com/office/drawing/2010/main" w="9525">
+              <a14:hiddenLine xmlns:a14="http://schemas.microsoft.com/office/drawing/2010/main" xmlns="" w="9525">
                 <a:solidFill>
                   <a:srgbClr val="000000"/>
                 </a:solidFill>
@@ -759,7 +759,7 @@
           <a:p>
             <a:fld id="{18D8D369-9589-40AD-B749-3BE541F1991F}" type="datetime1">
               <a:rPr lang="en-US" smtClean="0"/>
-              <a:t>21-Feb-17</a:t>
+              <a:t>22-Feb-17</a:t>
             </a:fld>
             <a:endParaRPr lang="en-US"/>
           </a:p>
@@ -1077,7 +1077,7 @@
           <a:p>
             <a:fld id="{1DE6F2FD-5C81-4CE8-9D27-50CECF3FF30C}" type="datetime1">
               <a:rPr lang="en-US" smtClean="0"/>
-              <a:t>21-Feb-17</a:t>
+              <a:t>22-Feb-17</a:t>
             </a:fld>
             <a:endParaRPr lang="en-US"/>
           </a:p>
@@ -1565,7 +1565,7 @@
           <a:p>
             <a:fld id="{4D68A474-1C38-4243-835F-E3E418E9DA9E}" type="datetime1">
               <a:rPr lang="en-US" smtClean="0"/>
-              <a:t>21-Feb-17</a:t>
+              <a:t>22-Feb-17</a:t>
             </a:fld>
             <a:endParaRPr lang="en-US"/>
           </a:p>
@@ -1934,7 +1934,7 @@
           <a:p>
             <a:fld id="{557FE227-51E7-462D-90AF-2815A8BA0A0F}" type="datetime1">
               <a:rPr lang="en-US" smtClean="0"/>
-              <a:t>21-Feb-17</a:t>
+              <a:t>22-Feb-17</a:t>
             </a:fld>
             <a:endParaRPr lang="en-US"/>
           </a:p>
@@ -2089,7 +2089,7 @@
           <a:ln/>
           <a:extLst>
             <a:ext uri="{91240B29-F687-4f45-9708-019B960494DF}">
-              <a14:hiddenLine xmlns="" xmlns:a14="http://schemas.microsoft.com/office/drawing/2010/main" w="9525">
+              <a14:hiddenLine xmlns:a14="http://schemas.microsoft.com/office/drawing/2010/main" xmlns="" w="9525">
                 <a:solidFill>
                   <a:srgbClr val="000000"/>
                 </a:solidFill>
@@ -2207,7 +2207,7 @@
           <a:p>
             <a:fld id="{4BC055D6-85DD-4EDC-9BFB-9158DB6372C5}" type="datetime1">
               <a:rPr lang="en-US" smtClean="0"/>
-              <a:t>21-Feb-17</a:t>
+              <a:t>22-Feb-17</a:t>
             </a:fld>
             <a:endParaRPr lang="en-US"/>
           </a:p>
@@ -2364,7 +2364,7 @@
           <a:ln/>
           <a:extLst>
             <a:ext uri="{91240B29-F687-4f45-9708-019B960494DF}">
-              <a14:hiddenLine xmlns="" xmlns:a14="http://schemas.microsoft.com/office/drawing/2010/main" w="9525">
+              <a14:hiddenLine xmlns:a14="http://schemas.microsoft.com/office/drawing/2010/main" xmlns="" w="9525">
                 <a:solidFill>
                   <a:srgbClr val="000000"/>
                 </a:solidFill>
@@ -2492,7 +2492,7 @@
           <a:p>
             <a:fld id="{A9F39C5F-B6B2-41D4-966E-904A1A2E96FE}" type="datetime1">
               <a:rPr lang="en-US" smtClean="0"/>
-              <a:t>21-Feb-17</a:t>
+              <a:t>22-Feb-17</a:t>
             </a:fld>
             <a:endParaRPr lang="en-US"/>
           </a:p>
@@ -2647,7 +2647,7 @@
           <a:ln/>
           <a:extLst>
             <a:ext uri="{91240B29-F687-4f45-9708-019B960494DF}">
-              <a14:hiddenLine xmlns="" xmlns:a14="http://schemas.microsoft.com/office/drawing/2010/main" w="9525">
+              <a14:hiddenLine xmlns:a14="http://schemas.microsoft.com/office/drawing/2010/main" xmlns="" w="9525">
                 <a:solidFill>
                   <a:srgbClr val="000000"/>
                 </a:solidFill>
@@ -2775,7 +2775,7 @@
           <a:p>
             <a:fld id="{6A9E077F-C15F-40A1-9081-FDBA9BEC3F4B}" type="datetime1">
               <a:rPr lang="en-US" smtClean="0"/>
-              <a:t>21-Feb-17</a:t>
+              <a:t>22-Feb-17</a:t>
             </a:fld>
             <a:endParaRPr lang="en-US"/>
           </a:p>
@@ -3118,7 +3118,7 @@
           <a:p>
             <a:fld id="{1E974925-3E08-41AA-A704-EB3A45C8F7CE}" type="datetime1">
               <a:rPr lang="en-US" smtClean="0"/>
-              <a:t>21-Feb-17</a:t>
+              <a:t>22-Feb-17</a:t>
             </a:fld>
             <a:endParaRPr lang="en-US"/>
           </a:p>
@@ -3273,7 +3273,7 @@
           <a:ln/>
           <a:extLst>
             <a:ext uri="{91240B29-F687-4f45-9708-019B960494DF}">
-              <a14:hiddenLine xmlns="" xmlns:a14="http://schemas.microsoft.com/office/drawing/2010/main" w="9525">
+              <a14:hiddenLine xmlns:a14="http://schemas.microsoft.com/office/drawing/2010/main" xmlns="" w="9525">
                 <a:solidFill>
                   <a:srgbClr val="000000"/>
                 </a:solidFill>
@@ -3457,7 +3457,7 @@
           <a:p>
             <a:fld id="{F5BAA5CC-156E-4131-A968-CEA934C47A7B}" type="datetime1">
               <a:rPr lang="en-US" smtClean="0"/>
-              <a:t>21-Feb-17</a:t>
+              <a:t>22-Feb-17</a:t>
             </a:fld>
             <a:endParaRPr lang="en-US"/>
           </a:p>
@@ -3612,7 +3612,7 @@
           <a:ln/>
           <a:extLst>
             <a:ext uri="{91240B29-F687-4f45-9708-019B960494DF}">
-              <a14:hiddenLine xmlns="" xmlns:a14="http://schemas.microsoft.com/office/drawing/2010/main" w="9525">
+              <a14:hiddenLine xmlns:a14="http://schemas.microsoft.com/office/drawing/2010/main" xmlns="" w="9525">
                 <a:solidFill>
                   <a:srgbClr val="000000"/>
                 </a:solidFill>
@@ -3934,7 +3934,7 @@
           <a:p>
             <a:fld id="{8A128004-700F-41A7-9B23-B44E720E8472}" type="datetime1">
               <a:rPr lang="en-US" smtClean="0"/>
-              <a:t>21-Feb-17</a:t>
+              <a:t>22-Feb-17</a:t>
             </a:fld>
             <a:endParaRPr lang="en-US"/>
           </a:p>
@@ -4089,7 +4089,7 @@
           <a:ln/>
           <a:extLst>
             <a:ext uri="{91240B29-F687-4f45-9708-019B960494DF}">
-              <a14:hiddenLine xmlns="" xmlns:a14="http://schemas.microsoft.com/office/drawing/2010/main" w="9525">
+              <a14:hiddenLine xmlns:a14="http://schemas.microsoft.com/office/drawing/2010/main" xmlns="" w="9525">
                 <a:solidFill>
                   <a:srgbClr val="000000"/>
                 </a:solidFill>
@@ -4155,7 +4155,7 @@
           <a:p>
             <a:fld id="{7A414D3B-2E17-4EF8-91FA-9556D2D939DA}" type="datetime1">
               <a:rPr lang="en-US" smtClean="0"/>
-              <a:t>21-Feb-17</a:t>
+              <a:t>22-Feb-17</a:t>
             </a:fld>
             <a:endParaRPr lang="en-US"/>
           </a:p>
@@ -4250,7 +4250,7 @@
           <a:p>
             <a:fld id="{A86E1A77-11D3-4388-ACF8-061C1A0CBF79}" type="datetime1">
               <a:rPr lang="en-US" smtClean="0"/>
-              <a:t>21-Feb-17</a:t>
+              <a:t>22-Feb-17</a:t>
             </a:fld>
             <a:endParaRPr lang="en-US"/>
           </a:p>
@@ -4518,7 +4518,7 @@
           <a:ln/>
           <a:extLst>
             <a:ext uri="{91240B29-F687-4f45-9708-019B960494DF}">
-              <a14:hiddenLine xmlns="" xmlns:a14="http://schemas.microsoft.com/office/drawing/2010/main" w="9525">
+              <a14:hiddenLine xmlns:a14="http://schemas.microsoft.com/office/drawing/2010/main" xmlns="" w="9525">
                 <a:solidFill>
                   <a:srgbClr val="000000"/>
                 </a:solidFill>
@@ -4717,7 +4717,7 @@
           <a:p>
             <a:fld id="{71280B3E-1203-486D-B2C8-658508DF6AE2}" type="datetime1">
               <a:rPr lang="en-US" smtClean="0"/>
-              <a:t>21-Feb-17</a:t>
+              <a:t>22-Feb-17</a:t>
             </a:fld>
             <a:endParaRPr lang="en-US"/>
           </a:p>
@@ -5030,7 +5030,7 @@
           <a:p>
             <a:fld id="{E298B48B-F629-4FDA-B979-1CF740029079}" type="datetime1">
               <a:rPr lang="en-US" smtClean="0"/>
-              <a:t>21-Feb-17</a:t>
+              <a:t>22-Feb-17</a:t>
             </a:fld>
             <a:endParaRPr lang="en-US"/>
           </a:p>
@@ -5300,7 +5300,7 @@
           <a:p>
             <a:fld id="{69ABDBB3-1493-4A91-8914-234560779987}" type="datetime1">
               <a:rPr lang="en-US" smtClean="0"/>
-              <a:t>21-Feb-17</a:t>
+              <a:t>22-Feb-17</a:t>
             </a:fld>
             <a:endParaRPr lang="en-US"/>
           </a:p>
@@ -5787,13 +5787,7 @@
               <a:rPr lang="en-US" sz="4400" dirty="0" smtClean="0">
                 <a:effectLst/>
               </a:rPr>
-              <a:t> </a:t>
-            </a:r>
-            <a:r>
-              <a:rPr lang="en-US" sz="4400" dirty="0" smtClean="0">
-                <a:effectLst/>
-              </a:rPr>
-              <a:t>in GVGAI/VGDL</a:t>
+              <a:t> in GVGAI/VGDL</a:t>
             </a:r>
             <a:endParaRPr lang="en-US" sz="4400" dirty="0"/>
           </a:p>
@@ -7372,42 +7366,60 @@
             </a:r>
           </a:p>
           <a:p>
-            <a:pPr lvl="1"/>
+            <a:pPr lvl="1">
+              <a:buFont typeface="Arial" panose="020B0604020202020204" pitchFamily="34" charset="0"/>
+              <a:buChar char="•"/>
+            </a:pPr>
             <a:r>
               <a:rPr lang="en-US" dirty="0" smtClean="0"/>
               <a:t>First attempt: sprite following avatar that spawns fog removal objects </a:t>
             </a:r>
           </a:p>
           <a:p>
-            <a:pPr lvl="2"/>
+            <a:pPr lvl="2">
+              <a:buFont typeface="Wingdings" panose="05000000000000000000" pitchFamily="2" charset="2"/>
+              <a:buChar char="Ø"/>
+            </a:pPr>
             <a:r>
               <a:rPr lang="en-US" dirty="0" smtClean="0"/>
               <a:t>way too many sprites and expensive!</a:t>
             </a:r>
           </a:p>
           <a:p>
-            <a:pPr lvl="1"/>
+            <a:pPr lvl="1">
+              <a:buFont typeface="Arial" panose="020B0604020202020204" pitchFamily="34" charset="0"/>
+              <a:buChar char="•"/>
+            </a:pPr>
             <a:r>
               <a:rPr lang="en-US" dirty="0" smtClean="0"/>
               <a:t>Next: static fog removal objects around the avatar and moving relative to the avatar</a:t>
             </a:r>
           </a:p>
           <a:p>
-            <a:pPr lvl="2"/>
+            <a:pPr lvl="2">
+              <a:buFont typeface="Wingdings" panose="05000000000000000000" pitchFamily="2" charset="2"/>
+              <a:buChar char="Ø"/>
+            </a:pPr>
             <a:r>
               <a:rPr lang="en-US" dirty="0" smtClean="0"/>
               <a:t>VGDL said no</a:t>
             </a:r>
           </a:p>
           <a:p>
-            <a:pPr lvl="1"/>
+            <a:pPr lvl="1">
+              <a:buFont typeface="Arial" panose="020B0604020202020204" pitchFamily="34" charset="0"/>
+              <a:buChar char="•"/>
+            </a:pPr>
             <a:r>
               <a:rPr lang="en-US" dirty="0" smtClean="0"/>
               <a:t>Final: spawn fog removal objects only when colliding with fog</a:t>
             </a:r>
           </a:p>
           <a:p>
-            <a:pPr lvl="2"/>
+            <a:pPr lvl="2">
+              <a:buFont typeface="Wingdings" panose="05000000000000000000" pitchFamily="2" charset="2"/>
+              <a:buChar char="Ø"/>
+            </a:pPr>
             <a:r>
               <a:rPr lang="en-US" dirty="0" smtClean="0"/>
               <a:t>YAY!</a:t>
@@ -7420,10 +7432,28 @@
             </a:r>
           </a:p>
           <a:p>
-            <a:pPr lvl="1"/>
+            <a:pPr lvl="1">
+              <a:buFont typeface="Arial" panose="020B0604020202020204" pitchFamily="34" charset="0"/>
+              <a:buChar char="•"/>
+            </a:pPr>
             <a:r>
               <a:rPr lang="en-US" dirty="0" smtClean="0"/>
-              <a:t>No time to rewrite the engine in a week =&gt; level reduced from 64x32 to 20x20</a:t>
+              <a:t>No time to rewrite the engine in a week </a:t>
+            </a:r>
+            <a:endParaRPr lang="en-US" dirty="0" smtClean="0"/>
+          </a:p>
+          <a:p>
+            <a:pPr lvl="2">
+              <a:buFont typeface="Wingdings" panose="05000000000000000000" pitchFamily="2" charset="2"/>
+              <a:buChar char="Ø"/>
+            </a:pPr>
+            <a:r>
+              <a:rPr lang="en-US" dirty="0" smtClean="0"/>
+              <a:t>level </a:t>
+            </a:r>
+            <a:r>
+              <a:rPr lang="en-US" dirty="0" smtClean="0"/>
+              <a:t>reduced from 64x32 to 20x20</a:t>
             </a:r>
             <a:endParaRPr lang="en-US" dirty="0"/>
           </a:p>
@@ -7532,8 +7562,8 @@
           </a:p>
           <a:p>
             <a:pPr lvl="1">
-              <a:buFont typeface="Wingdings" panose="05000000000000000000" pitchFamily="2" charset="2"/>
-              <a:buChar char="§"/>
+              <a:buFont typeface="Arial" panose="020B0604020202020204" pitchFamily="34" charset="0"/>
+              <a:buChar char="•"/>
             </a:pPr>
             <a:r>
               <a:rPr lang="en-US" dirty="0" smtClean="0"/>
@@ -7542,22 +7572,22 @@
           </a:p>
           <a:p>
             <a:pPr lvl="1">
-              <a:buFont typeface="Wingdings" panose="05000000000000000000" pitchFamily="2" charset="2"/>
-              <a:buChar char="§"/>
+              <a:buFont typeface="Arial" panose="020B0604020202020204" pitchFamily="34" charset="0"/>
+              <a:buChar char="•"/>
             </a:pPr>
             <a:endParaRPr lang="en-US" dirty="0"/>
           </a:p>
           <a:p>
             <a:pPr lvl="1">
-              <a:buFont typeface="Wingdings" panose="05000000000000000000" pitchFamily="2" charset="2"/>
-              <a:buChar char="§"/>
+              <a:buFont typeface="Arial" panose="020B0604020202020204" pitchFamily="34" charset="0"/>
+              <a:buChar char="•"/>
             </a:pPr>
             <a:endParaRPr lang="en-US" dirty="0" smtClean="0"/>
           </a:p>
           <a:p>
             <a:pPr lvl="1">
-              <a:buFont typeface="Wingdings" panose="05000000000000000000" pitchFamily="2" charset="2"/>
-              <a:buChar char="§"/>
+              <a:buFont typeface="Arial" panose="020B0604020202020204" pitchFamily="34" charset="0"/>
+              <a:buChar char="•"/>
             </a:pPr>
             <a:r>
               <a:rPr lang="en-US" dirty="0" smtClean="0"/>
@@ -7566,8 +7596,8 @@
           </a:p>
           <a:p>
             <a:pPr lvl="1">
-              <a:buFont typeface="Wingdings" panose="05000000000000000000" pitchFamily="2" charset="2"/>
-              <a:buChar char="§"/>
+              <a:buFont typeface="Arial" panose="020B0604020202020204" pitchFamily="34" charset="0"/>
+              <a:buChar char="•"/>
             </a:pPr>
             <a:r>
               <a:rPr lang="en-US" dirty="0" smtClean="0"/>
@@ -8162,40 +8192,88 @@
             </a:r>
           </a:p>
           <a:p>
-            <a:pPr lvl="1"/>
-            <a:r>
-              <a:rPr lang="en-US" dirty="0" smtClean="0"/>
+            <a:pPr lvl="1">
+              <a:buFont typeface="Wingdings" panose="05000000000000000000" pitchFamily="2" charset="2"/>
+              <a:buChar char="Ø"/>
+            </a:pPr>
+            <a:r>
+              <a:rPr lang="en-US" sz="1400" dirty="0" smtClean="0"/>
               <a:t>Movement awkward because you have to run away and then back to align shooting direction with the target</a:t>
             </a:r>
           </a:p>
           <a:p>
-            <a:pPr lvl="1"/>
-            <a:r>
-              <a:rPr lang="en-US" dirty="0" smtClean="0"/>
+            <a:pPr lvl="1">
+              <a:buFont typeface="Wingdings" panose="05000000000000000000" pitchFamily="2" charset="2"/>
+              <a:buChar char="Ø"/>
+            </a:pPr>
+            <a:r>
+              <a:rPr lang="en-US" sz="1400" dirty="0" smtClean="0"/>
               <a:t>Can’t see life bar and resources well enough</a:t>
             </a:r>
           </a:p>
           <a:p>
-            <a:pPr lvl="1"/>
-            <a:r>
-              <a:rPr lang="en-US" dirty="0" smtClean="0"/>
+            <a:pPr lvl="1">
+              <a:buFont typeface="Wingdings" panose="05000000000000000000" pitchFamily="2" charset="2"/>
+              <a:buChar char="Ø"/>
+            </a:pPr>
+            <a:r>
+              <a:rPr lang="en-US" sz="1400" dirty="0" smtClean="0"/>
               <a:t>Can’t see shooting direction</a:t>
             </a:r>
           </a:p>
           <a:p>
-            <a:pPr lvl="1"/>
-            <a:r>
-              <a:rPr lang="en-US" dirty="0" smtClean="0"/>
-              <a:t>Slow fog reveal  (don’t even get me started on that…)</a:t>
-            </a:r>
-          </a:p>
-          <a:p>
-            <a:pPr lvl="1"/>
-            <a:r>
-              <a:rPr lang="en-US" dirty="0" smtClean="0"/>
-              <a:t>Cool! Nice graphics! Yay for eating butterflies!</a:t>
-            </a:r>
-            <a:endParaRPr lang="en-US" dirty="0"/>
+            <a:pPr lvl="1">
+              <a:buFont typeface="Wingdings" panose="05000000000000000000" pitchFamily="2" charset="2"/>
+              <a:buChar char="Ø"/>
+            </a:pPr>
+            <a:r>
+              <a:rPr lang="en-US" sz="1400" dirty="0" smtClean="0"/>
+              <a:t>Slow fog reveal  </a:t>
+            </a:r>
+            <a:r>
+              <a:rPr lang="en-US" sz="1400" dirty="0" smtClean="0"/>
+              <a:t>(…)</a:t>
+            </a:r>
+            <a:endParaRPr lang="en-US" sz="1400" dirty="0" smtClean="0"/>
+          </a:p>
+          <a:p>
+            <a:pPr lvl="1">
+              <a:buFont typeface="Wingdings" panose="05000000000000000000" pitchFamily="2" charset="2"/>
+              <a:buChar char="Ø"/>
+            </a:pPr>
+            <a:r>
+              <a:rPr lang="en-US" sz="1400" dirty="0" smtClean="0"/>
+              <a:t>Cool! Nice graphics! Yay for eating butterflies</a:t>
+            </a:r>
+            <a:r>
+              <a:rPr lang="en-US" sz="1400" dirty="0" smtClean="0"/>
+              <a:t>!</a:t>
+            </a:r>
+          </a:p>
+          <a:p>
+            <a:pPr lvl="1">
+              <a:buFont typeface="Wingdings" panose="05000000000000000000" pitchFamily="2" charset="2"/>
+              <a:buChar char="Ø"/>
+            </a:pPr>
+            <a:r>
+              <a:rPr lang="en-US" sz="1400" dirty="0" smtClean="0"/>
+              <a:t>Maybe introduce prompts for special events</a:t>
+            </a:r>
+          </a:p>
+          <a:p>
+            <a:pPr lvl="1">
+              <a:buFont typeface="Wingdings" panose="05000000000000000000" pitchFamily="2" charset="2"/>
+              <a:buChar char="Ø"/>
+            </a:pPr>
+            <a:r>
+              <a:rPr lang="en-US" sz="1400" dirty="0" smtClean="0"/>
+              <a:t>Maybe introduce timed events to provoke player interaction (i.e. food i</a:t>
+            </a:r>
+            <a:r>
+              <a:rPr lang="en-US" sz="1400" dirty="0" smtClean="0"/>
+              <a:t>n the middle visible to all players)</a:t>
+            </a:r>
+            <a:endParaRPr lang="en-US" sz="1400" dirty="0"/>
           </a:p>
         </p:txBody>
       </p:sp>

</xml_diff>

<commit_message>
GUI improvement for human players after play test #1
</commit_message>
<xml_diff>
--- a/docs/final presentation.pptx
+++ b/docs/final presentation.pptx
@@ -5,7 +5,7 @@
     <p:sldMasterId id="2147483801" r:id="rId1"/>
   </p:sldMasterIdLst>
   <p:notesMasterIdLst>
-    <p:notesMasterId r:id="rId10"/>
+    <p:notesMasterId r:id="rId11"/>
   </p:notesMasterIdLst>
   <p:sldIdLst>
     <p:sldId id="256" r:id="rId2"/>
@@ -15,7 +15,8 @@
     <p:sldId id="273" r:id="rId6"/>
     <p:sldId id="272" r:id="rId7"/>
     <p:sldId id="274" r:id="rId8"/>
-    <p:sldId id="270" r:id="rId9"/>
+    <p:sldId id="275" r:id="rId9"/>
+    <p:sldId id="270" r:id="rId10"/>
   </p:sldIdLst>
   <p:sldSz cx="12192000" cy="6858000"/>
   <p:notesSz cx="6858000" cy="9144000"/>
@@ -567,7 +568,7 @@
           <a:effectLst/>
           <a:extLst>
             <a:ext uri="{91240B29-F687-4f45-9708-019B960494DF}">
-              <a14:hiddenLine xmlns:a14="http://schemas.microsoft.com/office/drawing/2010/main" xmlns="" w="9525">
+              <a14:hiddenLine xmlns="" xmlns:a14="http://schemas.microsoft.com/office/drawing/2010/main" w="9525">
                 <a:solidFill>
                   <a:srgbClr val="000000"/>
                 </a:solidFill>
@@ -2089,7 +2090,7 @@
           <a:ln/>
           <a:extLst>
             <a:ext uri="{91240B29-F687-4f45-9708-019B960494DF}">
-              <a14:hiddenLine xmlns:a14="http://schemas.microsoft.com/office/drawing/2010/main" xmlns="" w="9525">
+              <a14:hiddenLine xmlns="" xmlns:a14="http://schemas.microsoft.com/office/drawing/2010/main" w="9525">
                 <a:solidFill>
                   <a:srgbClr val="000000"/>
                 </a:solidFill>
@@ -2364,7 +2365,7 @@
           <a:ln/>
           <a:extLst>
             <a:ext uri="{91240B29-F687-4f45-9708-019B960494DF}">
-              <a14:hiddenLine xmlns:a14="http://schemas.microsoft.com/office/drawing/2010/main" xmlns="" w="9525">
+              <a14:hiddenLine xmlns="" xmlns:a14="http://schemas.microsoft.com/office/drawing/2010/main" w="9525">
                 <a:solidFill>
                   <a:srgbClr val="000000"/>
                 </a:solidFill>
@@ -2647,7 +2648,7 @@
           <a:ln/>
           <a:extLst>
             <a:ext uri="{91240B29-F687-4f45-9708-019B960494DF}">
-              <a14:hiddenLine xmlns:a14="http://schemas.microsoft.com/office/drawing/2010/main" xmlns="" w="9525">
+              <a14:hiddenLine xmlns="" xmlns:a14="http://schemas.microsoft.com/office/drawing/2010/main" w="9525">
                 <a:solidFill>
                   <a:srgbClr val="000000"/>
                 </a:solidFill>
@@ -3273,7 +3274,7 @@
           <a:ln/>
           <a:extLst>
             <a:ext uri="{91240B29-F687-4f45-9708-019B960494DF}">
-              <a14:hiddenLine xmlns:a14="http://schemas.microsoft.com/office/drawing/2010/main" xmlns="" w="9525">
+              <a14:hiddenLine xmlns="" xmlns:a14="http://schemas.microsoft.com/office/drawing/2010/main" w="9525">
                 <a:solidFill>
                   <a:srgbClr val="000000"/>
                 </a:solidFill>
@@ -3612,7 +3613,7 @@
           <a:ln/>
           <a:extLst>
             <a:ext uri="{91240B29-F687-4f45-9708-019B960494DF}">
-              <a14:hiddenLine xmlns:a14="http://schemas.microsoft.com/office/drawing/2010/main" xmlns="" w="9525">
+              <a14:hiddenLine xmlns="" xmlns:a14="http://schemas.microsoft.com/office/drawing/2010/main" w="9525">
                 <a:solidFill>
                   <a:srgbClr val="000000"/>
                 </a:solidFill>
@@ -4089,7 +4090,7 @@
           <a:ln/>
           <a:extLst>
             <a:ext uri="{91240B29-F687-4f45-9708-019B960494DF}">
-              <a14:hiddenLine xmlns:a14="http://schemas.microsoft.com/office/drawing/2010/main" xmlns="" w="9525">
+              <a14:hiddenLine xmlns="" xmlns:a14="http://schemas.microsoft.com/office/drawing/2010/main" w="9525">
                 <a:solidFill>
                   <a:srgbClr val="000000"/>
                 </a:solidFill>
@@ -4518,7 +4519,7 @@
           <a:ln/>
           <a:extLst>
             <a:ext uri="{91240B29-F687-4f45-9708-019B960494DF}">
-              <a14:hiddenLine xmlns:a14="http://schemas.microsoft.com/office/drawing/2010/main" xmlns="" w="9525">
+              <a14:hiddenLine xmlns="" xmlns:a14="http://schemas.microsoft.com/office/drawing/2010/main" w="9525">
                 <a:solidFill>
                   <a:srgbClr val="000000"/>
                 </a:solidFill>
@@ -7440,7 +7441,6 @@
               <a:rPr lang="en-US" dirty="0" smtClean="0"/>
               <a:t>No time to rewrite the engine in a week </a:t>
             </a:r>
-            <a:endParaRPr lang="en-US" dirty="0" smtClean="0"/>
           </a:p>
           <a:p>
             <a:pPr lvl="2">
@@ -7449,11 +7449,7 @@
             </a:pPr>
             <a:r>
               <a:rPr lang="en-US" dirty="0" smtClean="0"/>
-              <a:t>level </a:t>
-            </a:r>
-            <a:r>
-              <a:rPr lang="en-US" dirty="0" smtClean="0"/>
-              <a:t>reduced from 64x32 to 20x20</a:t>
+              <a:t>level reduced from 64x32 to 20x20</a:t>
             </a:r>
             <a:endParaRPr lang="en-US" dirty="0"/>
           </a:p>
@@ -8188,92 +8184,185 @@
           <a:p>
             <a:r>
               <a:rPr lang="en-US" dirty="0" smtClean="0"/>
-              <a:t>Feedback received:</a:t>
+              <a:t>Feedback received</a:t>
+            </a:r>
+            <a:r>
+              <a:rPr lang="en-US" dirty="0" smtClean="0"/>
+              <a:t>:</a:t>
             </a:r>
           </a:p>
           <a:p>
             <a:pPr lvl="1">
+              <a:buFont typeface="Arial" panose="020B0604020202020204" pitchFamily="34" charset="0"/>
+              <a:buChar char="•"/>
+            </a:pPr>
+            <a:r>
+              <a:rPr lang="en-US" dirty="0" smtClean="0"/>
+              <a:t>Negative:</a:t>
+            </a:r>
+            <a:endParaRPr lang="en-US" dirty="0" smtClean="0"/>
+          </a:p>
+          <a:p>
+            <a:pPr lvl="2">
               <a:buFont typeface="Wingdings" panose="05000000000000000000" pitchFamily="2" charset="2"/>
               <a:buChar char="Ø"/>
             </a:pPr>
             <a:r>
-              <a:rPr lang="en-US" sz="1400" dirty="0" smtClean="0"/>
+              <a:rPr lang="en-US" sz="1200" dirty="0" smtClean="0">
+                <a:solidFill>
+                  <a:schemeClr val="accent2">
+                    <a:lumMod val="60000"/>
+                    <a:lumOff val="40000"/>
+                  </a:schemeClr>
+                </a:solidFill>
+              </a:rPr>
               <a:t>Movement awkward because you have to run away and then back to align shooting direction with the target</a:t>
             </a:r>
           </a:p>
           <a:p>
-            <a:pPr lvl="1">
+            <a:pPr lvl="2">
               <a:buFont typeface="Wingdings" panose="05000000000000000000" pitchFamily="2" charset="2"/>
               <a:buChar char="Ø"/>
             </a:pPr>
             <a:r>
-              <a:rPr lang="en-US" sz="1400" dirty="0" smtClean="0"/>
+              <a:rPr lang="en-US" sz="1200" b="1" dirty="0" smtClean="0">
+                <a:solidFill>
+                  <a:schemeClr val="accent2"/>
+                </a:solidFill>
+              </a:rPr>
               <a:t>Can’t see life bar and resources well enough</a:t>
             </a:r>
           </a:p>
           <a:p>
-            <a:pPr lvl="1">
+            <a:pPr lvl="2">
               <a:buFont typeface="Wingdings" panose="05000000000000000000" pitchFamily="2" charset="2"/>
               <a:buChar char="Ø"/>
             </a:pPr>
             <a:r>
-              <a:rPr lang="en-US" sz="1400" dirty="0" smtClean="0"/>
+              <a:rPr lang="en-US" sz="1200" b="1" dirty="0" smtClean="0">
+                <a:solidFill>
+                  <a:schemeClr val="accent2"/>
+                </a:solidFill>
+              </a:rPr>
               <a:t>Can’t see shooting direction</a:t>
             </a:r>
           </a:p>
           <a:p>
-            <a:pPr lvl="1">
+            <a:pPr lvl="2">
               <a:buFont typeface="Wingdings" panose="05000000000000000000" pitchFamily="2" charset="2"/>
               <a:buChar char="Ø"/>
             </a:pPr>
             <a:r>
-              <a:rPr lang="en-US" sz="1400" dirty="0" smtClean="0"/>
+              <a:rPr lang="en-US" sz="1200" dirty="0" smtClean="0">
+                <a:solidFill>
+                  <a:schemeClr val="accent2">
+                    <a:lumMod val="60000"/>
+                    <a:lumOff val="40000"/>
+                  </a:schemeClr>
+                </a:solidFill>
+              </a:rPr>
               <a:t>Slow fog reveal  </a:t>
             </a:r>
             <a:r>
-              <a:rPr lang="en-US" sz="1400" dirty="0" smtClean="0"/>
+              <a:rPr lang="en-US" sz="1200" dirty="0" smtClean="0">
+                <a:solidFill>
+                  <a:schemeClr val="accent2">
+                    <a:lumMod val="60000"/>
+                    <a:lumOff val="40000"/>
+                  </a:schemeClr>
+                </a:solidFill>
+              </a:rPr>
               <a:t>(…)</a:t>
             </a:r>
-            <a:endParaRPr lang="en-US" sz="1400" dirty="0" smtClean="0"/>
           </a:p>
           <a:p>
             <a:pPr lvl="1">
+              <a:buFont typeface="Arial" panose="020B0604020202020204" pitchFamily="34" charset="0"/>
+              <a:buChar char="•"/>
+            </a:pPr>
+            <a:r>
+              <a:rPr lang="en-US" dirty="0" smtClean="0"/>
+              <a:t>Positive:</a:t>
+            </a:r>
+            <a:endParaRPr lang="en-US" dirty="0" smtClean="0"/>
+          </a:p>
+          <a:p>
+            <a:pPr lvl="2">
               <a:buFont typeface="Wingdings" panose="05000000000000000000" pitchFamily="2" charset="2"/>
               <a:buChar char="Ø"/>
             </a:pPr>
             <a:r>
-              <a:rPr lang="en-US" sz="1400" dirty="0" smtClean="0"/>
+              <a:rPr lang="en-US" sz="1200" dirty="0" smtClean="0">
+                <a:solidFill>
+                  <a:schemeClr val="accent1">
+                    <a:lumMod val="60000"/>
+                    <a:lumOff val="40000"/>
+                  </a:schemeClr>
+                </a:solidFill>
+              </a:rPr>
               <a:t>Cool! Nice graphics! Yay for eating butterflies</a:t>
             </a:r>
             <a:r>
-              <a:rPr lang="en-US" sz="1400" dirty="0" smtClean="0"/>
+              <a:rPr lang="en-US" sz="1200" dirty="0" smtClean="0">
+                <a:solidFill>
+                  <a:schemeClr val="accent1">
+                    <a:lumMod val="60000"/>
+                    <a:lumOff val="40000"/>
+                  </a:schemeClr>
+                </a:solidFill>
+              </a:rPr>
               <a:t>!</a:t>
             </a:r>
           </a:p>
           <a:p>
             <a:pPr lvl="1">
+              <a:buFont typeface="Arial" panose="020B0604020202020204" pitchFamily="34" charset="0"/>
+              <a:buChar char="•"/>
+            </a:pPr>
+            <a:r>
+              <a:rPr lang="en-US" dirty="0" smtClean="0"/>
+              <a:t>Suggestions:</a:t>
+            </a:r>
+            <a:endParaRPr lang="en-US" dirty="0" smtClean="0"/>
+          </a:p>
+          <a:p>
+            <a:pPr lvl="2">
               <a:buFont typeface="Wingdings" panose="05000000000000000000" pitchFamily="2" charset="2"/>
               <a:buChar char="Ø"/>
             </a:pPr>
             <a:r>
-              <a:rPr lang="en-US" sz="1400" dirty="0" smtClean="0"/>
+              <a:rPr lang="en-US" sz="1200" b="1" dirty="0" smtClean="0">
+                <a:solidFill>
+                  <a:schemeClr val="accent5"/>
+                </a:solidFill>
+              </a:rPr>
               <a:t>Maybe introduce prompts for special events</a:t>
             </a:r>
           </a:p>
           <a:p>
-            <a:pPr lvl="1">
+            <a:pPr lvl="2">
               <a:buFont typeface="Wingdings" panose="05000000000000000000" pitchFamily="2" charset="2"/>
               <a:buChar char="Ø"/>
             </a:pPr>
             <a:r>
-              <a:rPr lang="en-US" sz="1400" dirty="0" smtClean="0"/>
-              <a:t>Maybe introduce timed events to provoke player interaction (i.e. food i</a:t>
-            </a:r>
-            <a:r>
-              <a:rPr lang="en-US" sz="1400" dirty="0" smtClean="0"/>
-              <a:t>n the middle visible to all players)</a:t>
-            </a:r>
-            <a:endParaRPr lang="en-US" sz="1400" dirty="0"/>
+              <a:rPr lang="en-US" sz="1200" dirty="0" smtClean="0">
+                <a:solidFill>
+                  <a:schemeClr val="accent5">
+                    <a:lumMod val="60000"/>
+                    <a:lumOff val="40000"/>
+                  </a:schemeClr>
+                </a:solidFill>
+              </a:rPr>
+              <a:t>Maybe introduce timed events to provoke player interaction (i.e. food in the middle visible to all players)</a:t>
+            </a:r>
+            <a:endParaRPr lang="en-US" sz="1200" dirty="0">
+              <a:solidFill>
+                <a:schemeClr val="accent5">
+                  <a:lumMod val="60000"/>
+                  <a:lumOff val="40000"/>
+                </a:schemeClr>
+              </a:solidFill>
+            </a:endParaRPr>
           </a:p>
         </p:txBody>
       </p:sp>
@@ -8300,6 +8389,90 @@
           </a:p>
         </p:txBody>
       </p:sp>
+      <p:pic>
+        <p:nvPicPr>
+          <p:cNvPr id="5" name="Picture 4"/>
+          <p:cNvPicPr>
+            <a:picLocks noChangeAspect="1"/>
+          </p:cNvPicPr>
+          <p:nvPr/>
+        </p:nvPicPr>
+        <p:blipFill>
+          <a:blip r:embed="rId2"/>
+          <a:stretch>
+            <a:fillRect/>
+          </a:stretch>
+        </p:blipFill>
+        <p:spPr>
+          <a:xfrm>
+            <a:off x="9341329" y="3362044"/>
+            <a:ext cx="831085" cy="659448"/>
+          </a:xfrm>
+          <a:prstGeom prst="rect">
+            <a:avLst/>
+          </a:prstGeom>
+        </p:spPr>
+      </p:pic>
+      <p:pic>
+        <p:nvPicPr>
+          <p:cNvPr id="6" name="Picture 5"/>
+          <p:cNvPicPr>
+            <a:picLocks noChangeAspect="1"/>
+          </p:cNvPicPr>
+          <p:nvPr/>
+        </p:nvPicPr>
+        <p:blipFill>
+          <a:blip r:embed="rId3"/>
+          <a:stretch>
+            <a:fillRect/>
+          </a:stretch>
+        </p:blipFill>
+        <p:spPr>
+          <a:xfrm>
+            <a:off x="7536611" y="3364266"/>
+            <a:ext cx="914400" cy="657225"/>
+          </a:xfrm>
+          <a:prstGeom prst="rect">
+            <a:avLst/>
+          </a:prstGeom>
+        </p:spPr>
+      </p:pic>
+      <p:cxnSp>
+        <p:nvCxnSpPr>
+          <p:cNvPr id="8" name="Straight Arrow Connector 7"/>
+          <p:cNvCxnSpPr/>
+          <p:nvPr/>
+        </p:nvCxnSpPr>
+        <p:spPr>
+          <a:xfrm>
+            <a:off x="8617789" y="3692106"/>
+            <a:ext cx="543464" cy="0"/>
+          </a:xfrm>
+          <a:prstGeom prst="straightConnector1">
+            <a:avLst/>
+          </a:prstGeom>
+          <a:ln w="38100">
+            <a:solidFill>
+              <a:schemeClr val="accent2"/>
+            </a:solidFill>
+            <a:tailEnd type="triangle"/>
+          </a:ln>
+        </p:spPr>
+        <p:style>
+          <a:lnRef idx="1">
+            <a:schemeClr val="accent1"/>
+          </a:lnRef>
+          <a:fillRef idx="0">
+            <a:schemeClr val="accent1"/>
+          </a:fillRef>
+          <a:effectRef idx="0">
+            <a:schemeClr val="accent1"/>
+          </a:effectRef>
+          <a:fontRef idx="minor">
+            <a:schemeClr val="tx1"/>
+          </a:fontRef>
+        </p:style>
+      </p:cxnSp>
     </p:spTree>
     <p:extLst>
       <p:ext uri="{BB962C8B-B14F-4D97-AF65-F5344CB8AC3E}">
@@ -8345,6 +8518,97 @@
           <a:bodyPr/>
           <a:lstStyle/>
           <a:p>
+            <a:endParaRPr lang="en-US"/>
+          </a:p>
+        </p:txBody>
+      </p:sp>
+      <p:sp>
+        <p:nvSpPr>
+          <p:cNvPr id="3" name="Content Placeholder 2"/>
+          <p:cNvSpPr>
+            <a:spLocks noGrp="1"/>
+          </p:cNvSpPr>
+          <p:nvPr>
+            <p:ph idx="1"/>
+          </p:nvPr>
+        </p:nvSpPr>
+        <p:spPr/>
+        <p:txBody>
+          <a:bodyPr/>
+          <a:lstStyle/>
+          <a:p>
+            <a:endParaRPr lang="en-US"/>
+          </a:p>
+        </p:txBody>
+      </p:sp>
+      <p:sp>
+        <p:nvSpPr>
+          <p:cNvPr id="4" name="Slide Number Placeholder 3"/>
+          <p:cNvSpPr>
+            <a:spLocks noGrp="1"/>
+          </p:cNvSpPr>
+          <p:nvPr>
+            <p:ph type="sldNum" sz="quarter" idx="12"/>
+          </p:nvPr>
+        </p:nvSpPr>
+        <p:spPr/>
+        <p:txBody>
+          <a:bodyPr/>
+          <a:lstStyle/>
+          <a:p>
+            <a:fld id="{47CA7342-9518-470C-A5DA-6F82F22E1F7D}" type="slidenum">
+              <a:rPr lang="en-US" smtClean="0"/>
+              <a:t>8</a:t>
+            </a:fld>
+            <a:endParaRPr lang="en-US"/>
+          </a:p>
+        </p:txBody>
+      </p:sp>
+    </p:spTree>
+    <p:extLst>
+      <p:ext uri="{BB962C8B-B14F-4D97-AF65-F5344CB8AC3E}">
+        <p14:creationId xmlns:p14="http://schemas.microsoft.com/office/powerpoint/2010/main" val="773743935"/>
+      </p:ext>
+    </p:extLst>
+  </p:cSld>
+  <p:clrMapOvr>
+    <a:masterClrMapping/>
+  </p:clrMapOvr>
+</p:sld>
+</file>
+
+<file path=ppt/slides/slide9.xml><?xml version="1.0" encoding="utf-8"?>
+<p:sld xmlns:a="http://schemas.openxmlformats.org/drawingml/2006/main" xmlns:r="http://schemas.openxmlformats.org/officeDocument/2006/relationships" xmlns:p="http://schemas.openxmlformats.org/presentationml/2006/main">
+  <p:cSld>
+    <p:spTree>
+      <p:nvGrpSpPr>
+        <p:cNvPr id="1" name=""/>
+        <p:cNvGrpSpPr/>
+        <p:nvPr/>
+      </p:nvGrpSpPr>
+      <p:grpSpPr>
+        <a:xfrm>
+          <a:off x="0" y="0"/>
+          <a:ext cx="0" cy="0"/>
+          <a:chOff x="0" y="0"/>
+          <a:chExt cx="0" cy="0"/>
+        </a:xfrm>
+      </p:grpSpPr>
+      <p:sp>
+        <p:nvSpPr>
+          <p:cNvPr id="2" name="Title 1"/>
+          <p:cNvSpPr>
+            <a:spLocks noGrp="1"/>
+          </p:cNvSpPr>
+          <p:nvPr>
+            <p:ph type="title"/>
+          </p:nvPr>
+        </p:nvSpPr>
+        <p:spPr/>
+        <p:txBody>
+          <a:bodyPr/>
+          <a:lstStyle/>
+          <a:p>
             <a:r>
               <a:rPr lang="en-US" dirty="0" smtClean="0"/>
               <a:t>AI Design - Rolling Horizon Evolution</a:t>
@@ -8370,7 +8634,7 @@
           <a:p>
             <a:fld id="{47CA7342-9518-470C-A5DA-6F82F22E1F7D}" type="slidenum">
               <a:rPr lang="en-US" smtClean="0"/>
-              <a:t>8</a:t>
+              <a:t>9</a:t>
             </a:fld>
             <a:endParaRPr lang="en-US"/>
           </a:p>

</xml_diff>

<commit_message>
Effect prompt display fixed + timed event + AI
- Puppies!
</commit_message>
<xml_diff>
--- a/docs/final presentation.pptx
+++ b/docs/final presentation.pptx
@@ -5,7 +5,7 @@
     <p:sldMasterId id="2147483801" r:id="rId1"/>
   </p:sldMasterIdLst>
   <p:notesMasterIdLst>
-    <p:notesMasterId r:id="rId11"/>
+    <p:notesMasterId r:id="rId15"/>
   </p:notesMasterIdLst>
   <p:sldIdLst>
     <p:sldId id="256" r:id="rId2"/>
@@ -17,6 +17,10 @@
     <p:sldId id="274" r:id="rId8"/>
     <p:sldId id="275" r:id="rId9"/>
     <p:sldId id="270" r:id="rId10"/>
+    <p:sldId id="276" r:id="rId11"/>
+    <p:sldId id="277" r:id="rId12"/>
+    <p:sldId id="278" r:id="rId13"/>
+    <p:sldId id="279" r:id="rId14"/>
   </p:sldIdLst>
   <p:sldSz cx="12192000" cy="6858000"/>
   <p:notesSz cx="6858000" cy="9144000"/>
@@ -568,7 +572,7 @@
           <a:effectLst/>
           <a:extLst>
             <a:ext uri="{91240B29-F687-4f45-9708-019B960494DF}">
-              <a14:hiddenLine xmlns="" xmlns:a14="http://schemas.microsoft.com/office/drawing/2010/main" w="9525">
+              <a14:hiddenLine xmlns:a14="http://schemas.microsoft.com/office/drawing/2010/main" xmlns="" w="9525">
                 <a:solidFill>
                   <a:srgbClr val="000000"/>
                 </a:solidFill>
@@ -2090,7 +2094,7 @@
           <a:ln/>
           <a:extLst>
             <a:ext uri="{91240B29-F687-4f45-9708-019B960494DF}">
-              <a14:hiddenLine xmlns="" xmlns:a14="http://schemas.microsoft.com/office/drawing/2010/main" w="9525">
+              <a14:hiddenLine xmlns:a14="http://schemas.microsoft.com/office/drawing/2010/main" xmlns="" w="9525">
                 <a:solidFill>
                   <a:srgbClr val="000000"/>
                 </a:solidFill>
@@ -2365,7 +2369,7 @@
           <a:ln/>
           <a:extLst>
             <a:ext uri="{91240B29-F687-4f45-9708-019B960494DF}">
-              <a14:hiddenLine xmlns="" xmlns:a14="http://schemas.microsoft.com/office/drawing/2010/main" w="9525">
+              <a14:hiddenLine xmlns:a14="http://schemas.microsoft.com/office/drawing/2010/main" xmlns="" w="9525">
                 <a:solidFill>
                   <a:srgbClr val="000000"/>
                 </a:solidFill>
@@ -2648,7 +2652,7 @@
           <a:ln/>
           <a:extLst>
             <a:ext uri="{91240B29-F687-4f45-9708-019B960494DF}">
-              <a14:hiddenLine xmlns="" xmlns:a14="http://schemas.microsoft.com/office/drawing/2010/main" w="9525">
+              <a14:hiddenLine xmlns:a14="http://schemas.microsoft.com/office/drawing/2010/main" xmlns="" w="9525">
                 <a:solidFill>
                   <a:srgbClr val="000000"/>
                 </a:solidFill>
@@ -3274,7 +3278,7 @@
           <a:ln/>
           <a:extLst>
             <a:ext uri="{91240B29-F687-4f45-9708-019B960494DF}">
-              <a14:hiddenLine xmlns="" xmlns:a14="http://schemas.microsoft.com/office/drawing/2010/main" w="9525">
+              <a14:hiddenLine xmlns:a14="http://schemas.microsoft.com/office/drawing/2010/main" xmlns="" w="9525">
                 <a:solidFill>
                   <a:srgbClr val="000000"/>
                 </a:solidFill>
@@ -3613,7 +3617,7 @@
           <a:ln/>
           <a:extLst>
             <a:ext uri="{91240B29-F687-4f45-9708-019B960494DF}">
-              <a14:hiddenLine xmlns="" xmlns:a14="http://schemas.microsoft.com/office/drawing/2010/main" w="9525">
+              <a14:hiddenLine xmlns:a14="http://schemas.microsoft.com/office/drawing/2010/main" xmlns="" w="9525">
                 <a:solidFill>
                   <a:srgbClr val="000000"/>
                 </a:solidFill>
@@ -4090,7 +4094,7 @@
           <a:ln/>
           <a:extLst>
             <a:ext uri="{91240B29-F687-4f45-9708-019B960494DF}">
-              <a14:hiddenLine xmlns="" xmlns:a14="http://schemas.microsoft.com/office/drawing/2010/main" w="9525">
+              <a14:hiddenLine xmlns:a14="http://schemas.microsoft.com/office/drawing/2010/main" xmlns="" w="9525">
                 <a:solidFill>
                   <a:srgbClr val="000000"/>
                 </a:solidFill>
@@ -4519,7 +4523,7 @@
           <a:ln/>
           <a:extLst>
             <a:ext uri="{91240B29-F687-4f45-9708-019B960494DF}">
-              <a14:hiddenLine xmlns="" xmlns:a14="http://schemas.microsoft.com/office/drawing/2010/main" w="9525">
+              <a14:hiddenLine xmlns:a14="http://schemas.microsoft.com/office/drawing/2010/main" xmlns="" w="9525">
                 <a:solidFill>
                   <a:srgbClr val="000000"/>
                 </a:solidFill>
@@ -5869,6 +5873,400 @@
 </p:sld>
 </file>
 
+<file path=ppt/slides/slide10.xml><?xml version="1.0" encoding="utf-8"?>
+<p:sld xmlns:a="http://schemas.openxmlformats.org/drawingml/2006/main" xmlns:r="http://schemas.openxmlformats.org/officeDocument/2006/relationships" xmlns:p="http://schemas.openxmlformats.org/presentationml/2006/main">
+  <p:cSld>
+    <p:spTree>
+      <p:nvGrpSpPr>
+        <p:cNvPr id="1" name=""/>
+        <p:cNvGrpSpPr/>
+        <p:nvPr/>
+      </p:nvGrpSpPr>
+      <p:grpSpPr>
+        <a:xfrm>
+          <a:off x="0" y="0"/>
+          <a:ext cx="0" cy="0"/>
+          <a:chOff x="0" y="0"/>
+          <a:chExt cx="0" cy="0"/>
+        </a:xfrm>
+      </p:grpSpPr>
+      <p:sp>
+        <p:nvSpPr>
+          <p:cNvPr id="2" name="Title 1"/>
+          <p:cNvSpPr>
+            <a:spLocks noGrp="1"/>
+          </p:cNvSpPr>
+          <p:nvPr>
+            <p:ph type="title"/>
+          </p:nvPr>
+        </p:nvSpPr>
+        <p:spPr/>
+        <p:txBody>
+          <a:bodyPr/>
+          <a:lstStyle/>
+          <a:p>
+            <a:r>
+              <a:rPr lang="en-US" dirty="0" smtClean="0"/>
+              <a:t>Rolling Horizon Evolution</a:t>
+            </a:r>
+            <a:endParaRPr lang="en-US" dirty="0"/>
+          </a:p>
+        </p:txBody>
+      </p:sp>
+      <p:pic>
+        <p:nvPicPr>
+          <p:cNvPr id="5" name="Content Placeholder 4"/>
+          <p:cNvPicPr>
+            <a:picLocks noGrp="1" noChangeAspect="1"/>
+          </p:cNvPicPr>
+          <p:nvPr>
+            <p:ph idx="1"/>
+          </p:nvPr>
+        </p:nvPicPr>
+        <p:blipFill>
+          <a:blip r:embed="rId2">
+            <a:extLst>
+              <a:ext uri="{28A0092B-C50C-407E-A947-70E740481C1C}">
+                <a14:useLocalDpi xmlns:a14="http://schemas.microsoft.com/office/drawing/2010/main" val="0"/>
+              </a:ext>
+            </a:extLst>
+          </a:blip>
+          <a:stretch>
+            <a:fillRect/>
+          </a:stretch>
+        </p:blipFill>
+        <p:spPr>
+          <a:xfrm>
+            <a:off x="2716256" y="2222500"/>
+            <a:ext cx="6759487" cy="3636963"/>
+          </a:xfrm>
+        </p:spPr>
+      </p:pic>
+      <p:sp>
+        <p:nvSpPr>
+          <p:cNvPr id="4" name="Slide Number Placeholder 3"/>
+          <p:cNvSpPr>
+            <a:spLocks noGrp="1"/>
+          </p:cNvSpPr>
+          <p:nvPr>
+            <p:ph type="sldNum" sz="quarter" idx="12"/>
+          </p:nvPr>
+        </p:nvSpPr>
+        <p:spPr/>
+        <p:txBody>
+          <a:bodyPr/>
+          <a:lstStyle/>
+          <a:p>
+            <a:fld id="{47CA7342-9518-470C-A5DA-6F82F22E1F7D}" type="slidenum">
+              <a:rPr lang="en-US" smtClean="0"/>
+              <a:t>10</a:t>
+            </a:fld>
+            <a:endParaRPr lang="en-US"/>
+          </a:p>
+        </p:txBody>
+      </p:sp>
+    </p:spTree>
+    <p:extLst>
+      <p:ext uri="{BB962C8B-B14F-4D97-AF65-F5344CB8AC3E}">
+        <p14:creationId xmlns:p14="http://schemas.microsoft.com/office/powerpoint/2010/main" val="2883444772"/>
+      </p:ext>
+    </p:extLst>
+  </p:cSld>
+  <p:clrMapOvr>
+    <a:masterClrMapping/>
+  </p:clrMapOvr>
+</p:sld>
+</file>
+
+<file path=ppt/slides/slide11.xml><?xml version="1.0" encoding="utf-8"?>
+<p:sld xmlns:a="http://schemas.openxmlformats.org/drawingml/2006/main" xmlns:r="http://schemas.openxmlformats.org/officeDocument/2006/relationships" xmlns:p="http://schemas.openxmlformats.org/presentationml/2006/main">
+  <p:cSld>
+    <p:spTree>
+      <p:nvGrpSpPr>
+        <p:cNvPr id="1" name=""/>
+        <p:cNvGrpSpPr/>
+        <p:nvPr/>
+      </p:nvGrpSpPr>
+      <p:grpSpPr>
+        <a:xfrm>
+          <a:off x="0" y="0"/>
+          <a:ext cx="0" cy="0"/>
+          <a:chOff x="0" y="0"/>
+          <a:chExt cx="0" cy="0"/>
+        </a:xfrm>
+      </p:grpSpPr>
+      <p:sp>
+        <p:nvSpPr>
+          <p:cNvPr id="2" name="Title 1"/>
+          <p:cNvSpPr>
+            <a:spLocks noGrp="1"/>
+          </p:cNvSpPr>
+          <p:nvPr>
+            <p:ph type="title"/>
+          </p:nvPr>
+        </p:nvSpPr>
+        <p:spPr/>
+        <p:txBody>
+          <a:bodyPr/>
+          <a:lstStyle/>
+          <a:p>
+            <a:r>
+              <a:rPr lang="en-US" dirty="0" smtClean="0"/>
+              <a:t>Fitness Function</a:t>
+            </a:r>
+            <a:endParaRPr lang="en-US" dirty="0"/>
+          </a:p>
+        </p:txBody>
+      </p:sp>
+      <p:sp>
+        <p:nvSpPr>
+          <p:cNvPr id="3" name="Content Placeholder 2"/>
+          <p:cNvSpPr>
+            <a:spLocks noGrp="1"/>
+          </p:cNvSpPr>
+          <p:nvPr>
+            <p:ph idx="1"/>
+          </p:nvPr>
+        </p:nvSpPr>
+        <p:spPr/>
+        <p:txBody>
+          <a:bodyPr/>
+          <a:lstStyle/>
+          <a:p>
+            <a:r>
+              <a:rPr lang="en-US" dirty="0" smtClean="0"/>
+              <a:t>FSM with different heuristics</a:t>
+            </a:r>
+            <a:endParaRPr lang="en-US" dirty="0"/>
+          </a:p>
+        </p:txBody>
+      </p:sp>
+      <p:sp>
+        <p:nvSpPr>
+          <p:cNvPr id="4" name="Slide Number Placeholder 3"/>
+          <p:cNvSpPr>
+            <a:spLocks noGrp="1"/>
+          </p:cNvSpPr>
+          <p:nvPr>
+            <p:ph type="sldNum" sz="quarter" idx="12"/>
+          </p:nvPr>
+        </p:nvSpPr>
+        <p:spPr/>
+        <p:txBody>
+          <a:bodyPr/>
+          <a:lstStyle/>
+          <a:p>
+            <a:fld id="{47CA7342-9518-470C-A5DA-6F82F22E1F7D}" type="slidenum">
+              <a:rPr lang="en-US" smtClean="0"/>
+              <a:t>11</a:t>
+            </a:fld>
+            <a:endParaRPr lang="en-US"/>
+          </a:p>
+        </p:txBody>
+      </p:sp>
+    </p:spTree>
+    <p:extLst>
+      <p:ext uri="{BB962C8B-B14F-4D97-AF65-F5344CB8AC3E}">
+        <p14:creationId xmlns:p14="http://schemas.microsoft.com/office/powerpoint/2010/main" val="4155045372"/>
+      </p:ext>
+    </p:extLst>
+  </p:cSld>
+  <p:clrMapOvr>
+    <a:masterClrMapping/>
+  </p:clrMapOvr>
+</p:sld>
+</file>
+
+<file path=ppt/slides/slide12.xml><?xml version="1.0" encoding="utf-8"?>
+<p:sld xmlns:a="http://schemas.openxmlformats.org/drawingml/2006/main" xmlns:r="http://schemas.openxmlformats.org/officeDocument/2006/relationships" xmlns:p="http://schemas.openxmlformats.org/presentationml/2006/main">
+  <p:cSld>
+    <p:spTree>
+      <p:nvGrpSpPr>
+        <p:cNvPr id="1" name=""/>
+        <p:cNvGrpSpPr/>
+        <p:nvPr/>
+      </p:nvGrpSpPr>
+      <p:grpSpPr>
+        <a:xfrm>
+          <a:off x="0" y="0"/>
+          <a:ext cx="0" cy="0"/>
+          <a:chOff x="0" y="0"/>
+          <a:chExt cx="0" cy="0"/>
+        </a:xfrm>
+      </p:grpSpPr>
+      <p:sp>
+        <p:nvSpPr>
+          <p:cNvPr id="2" name="Title 1"/>
+          <p:cNvSpPr>
+            <a:spLocks noGrp="1"/>
+          </p:cNvSpPr>
+          <p:nvPr>
+            <p:ph type="title"/>
+          </p:nvPr>
+        </p:nvSpPr>
+        <p:spPr/>
+        <p:txBody>
+          <a:bodyPr/>
+          <a:lstStyle/>
+          <a:p>
+            <a:r>
+              <a:rPr lang="en-US" dirty="0" smtClean="0"/>
+              <a:t>Conclusions</a:t>
+            </a:r>
+            <a:endParaRPr lang="en-US" dirty="0"/>
+          </a:p>
+        </p:txBody>
+      </p:sp>
+      <p:sp>
+        <p:nvSpPr>
+          <p:cNvPr id="3" name="Content Placeholder 2"/>
+          <p:cNvSpPr>
+            <a:spLocks noGrp="1"/>
+          </p:cNvSpPr>
+          <p:nvPr>
+            <p:ph idx="1"/>
+          </p:nvPr>
+        </p:nvSpPr>
+        <p:spPr/>
+        <p:txBody>
+          <a:bodyPr/>
+          <a:lstStyle/>
+          <a:p>
+            <a:endParaRPr lang="en-US"/>
+          </a:p>
+        </p:txBody>
+      </p:sp>
+      <p:sp>
+        <p:nvSpPr>
+          <p:cNvPr id="4" name="Slide Number Placeholder 3"/>
+          <p:cNvSpPr>
+            <a:spLocks noGrp="1"/>
+          </p:cNvSpPr>
+          <p:nvPr>
+            <p:ph type="sldNum" sz="quarter" idx="12"/>
+          </p:nvPr>
+        </p:nvSpPr>
+        <p:spPr/>
+        <p:txBody>
+          <a:bodyPr/>
+          <a:lstStyle/>
+          <a:p>
+            <a:fld id="{47CA7342-9518-470C-A5DA-6F82F22E1F7D}" type="slidenum">
+              <a:rPr lang="en-US" smtClean="0"/>
+              <a:t>12</a:t>
+            </a:fld>
+            <a:endParaRPr lang="en-US"/>
+          </a:p>
+        </p:txBody>
+      </p:sp>
+    </p:spTree>
+    <p:extLst>
+      <p:ext uri="{BB962C8B-B14F-4D97-AF65-F5344CB8AC3E}">
+        <p14:creationId xmlns:p14="http://schemas.microsoft.com/office/powerpoint/2010/main" val="2907844250"/>
+      </p:ext>
+    </p:extLst>
+  </p:cSld>
+  <p:clrMapOvr>
+    <a:masterClrMapping/>
+  </p:clrMapOvr>
+</p:sld>
+</file>
+
+<file path=ppt/slides/slide13.xml><?xml version="1.0" encoding="utf-8"?>
+<p:sld xmlns:a="http://schemas.openxmlformats.org/drawingml/2006/main" xmlns:r="http://schemas.openxmlformats.org/officeDocument/2006/relationships" xmlns:p="http://schemas.openxmlformats.org/presentationml/2006/main">
+  <p:cSld>
+    <p:spTree>
+      <p:nvGrpSpPr>
+        <p:cNvPr id="1" name=""/>
+        <p:cNvGrpSpPr/>
+        <p:nvPr/>
+      </p:nvGrpSpPr>
+      <p:grpSpPr>
+        <a:xfrm>
+          <a:off x="0" y="0"/>
+          <a:ext cx="0" cy="0"/>
+          <a:chOff x="0" y="0"/>
+          <a:chExt cx="0" cy="0"/>
+        </a:xfrm>
+      </p:grpSpPr>
+      <p:sp>
+        <p:nvSpPr>
+          <p:cNvPr id="2" name="Title 1"/>
+          <p:cNvSpPr>
+            <a:spLocks noGrp="1"/>
+          </p:cNvSpPr>
+          <p:nvPr>
+            <p:ph type="title"/>
+          </p:nvPr>
+        </p:nvSpPr>
+        <p:spPr/>
+        <p:txBody>
+          <a:bodyPr/>
+          <a:lstStyle/>
+          <a:p>
+            <a:r>
+              <a:rPr lang="en-US" smtClean="0"/>
+              <a:t>More work</a:t>
+            </a:r>
+            <a:endParaRPr lang="en-US"/>
+          </a:p>
+        </p:txBody>
+      </p:sp>
+      <p:sp>
+        <p:nvSpPr>
+          <p:cNvPr id="3" name="Content Placeholder 2"/>
+          <p:cNvSpPr>
+            <a:spLocks noGrp="1"/>
+          </p:cNvSpPr>
+          <p:nvPr>
+            <p:ph idx="1"/>
+          </p:nvPr>
+        </p:nvSpPr>
+        <p:spPr/>
+        <p:txBody>
+          <a:bodyPr/>
+          <a:lstStyle/>
+          <a:p>
+            <a:endParaRPr lang="en-US"/>
+          </a:p>
+        </p:txBody>
+      </p:sp>
+      <p:sp>
+        <p:nvSpPr>
+          <p:cNvPr id="4" name="Slide Number Placeholder 3"/>
+          <p:cNvSpPr>
+            <a:spLocks noGrp="1"/>
+          </p:cNvSpPr>
+          <p:nvPr>
+            <p:ph type="sldNum" sz="quarter" idx="12"/>
+          </p:nvPr>
+        </p:nvSpPr>
+        <p:spPr/>
+        <p:txBody>
+          <a:bodyPr/>
+          <a:lstStyle/>
+          <a:p>
+            <a:fld id="{47CA7342-9518-470C-A5DA-6F82F22E1F7D}" type="slidenum">
+              <a:rPr lang="en-US" smtClean="0"/>
+              <a:t>13</a:t>
+            </a:fld>
+            <a:endParaRPr lang="en-US"/>
+          </a:p>
+        </p:txBody>
+      </p:sp>
+    </p:spTree>
+    <p:extLst>
+      <p:ext uri="{BB962C8B-B14F-4D97-AF65-F5344CB8AC3E}">
+        <p14:creationId xmlns:p14="http://schemas.microsoft.com/office/powerpoint/2010/main" val="794031878"/>
+      </p:ext>
+    </p:extLst>
+  </p:cSld>
+  <p:clrMapOvr>
+    <a:masterClrMapping/>
+  </p:clrMapOvr>
+</p:sld>
+</file>
+
 <file path=ppt/slides/slide2.xml><?xml version="1.0" encoding="utf-8"?>
 <p:sld xmlns:a="http://schemas.openxmlformats.org/drawingml/2006/main" xmlns:r="http://schemas.openxmlformats.org/officeDocument/2006/relationships" xmlns:p="http://schemas.openxmlformats.org/presentationml/2006/main">
   <p:cSld>
@@ -8184,11 +8582,7 @@
           <a:p>
             <a:r>
               <a:rPr lang="en-US" dirty="0" smtClean="0"/>
-              <a:t>Feedback received</a:t>
-            </a:r>
-            <a:r>
-              <a:rPr lang="en-US" dirty="0" smtClean="0"/>
-              <a:t>:</a:t>
+              <a:t>Feedback received:</a:t>
             </a:r>
           </a:p>
           <a:p>
@@ -8200,7 +8594,6 @@
               <a:rPr lang="en-US" dirty="0" smtClean="0"/>
               <a:t>Negative:</a:t>
             </a:r>
-            <a:endParaRPr lang="en-US" dirty="0" smtClean="0"/>
           </a:p>
           <a:p>
             <a:pPr lvl="2">
@@ -8261,18 +8654,7 @@
                   </a:schemeClr>
                 </a:solidFill>
               </a:rPr>
-              <a:t>Slow fog reveal  </a:t>
-            </a:r>
-            <a:r>
-              <a:rPr lang="en-US" sz="1200" dirty="0" smtClean="0">
-                <a:solidFill>
-                  <a:schemeClr val="accent2">
-                    <a:lumMod val="60000"/>
-                    <a:lumOff val="40000"/>
-                  </a:schemeClr>
-                </a:solidFill>
-              </a:rPr>
-              <a:t>(…)</a:t>
+              <a:t>Slow fog reveal  (…)</a:t>
             </a:r>
           </a:p>
           <a:p>
@@ -8284,7 +8666,6 @@
               <a:rPr lang="en-US" dirty="0" smtClean="0"/>
               <a:t>Positive:</a:t>
             </a:r>
-            <a:endParaRPr lang="en-US" dirty="0" smtClean="0"/>
           </a:p>
           <a:p>
             <a:pPr lvl="2">
@@ -8300,18 +8681,7 @@
                   </a:schemeClr>
                 </a:solidFill>
               </a:rPr>
-              <a:t>Cool! Nice graphics! Yay for eating butterflies</a:t>
-            </a:r>
-            <a:r>
-              <a:rPr lang="en-US" sz="1200" dirty="0" smtClean="0">
-                <a:solidFill>
-                  <a:schemeClr val="accent1">
-                    <a:lumMod val="60000"/>
-                    <a:lumOff val="40000"/>
-                  </a:schemeClr>
-                </a:solidFill>
-              </a:rPr>
-              <a:t>!</a:t>
+              <a:t>Cool! Nice graphics! Yay for eating butterflies!</a:t>
             </a:r>
           </a:p>
           <a:p>
@@ -8323,7 +8693,6 @@
               <a:rPr lang="en-US" dirty="0" smtClean="0"/>
               <a:t>Suggestions:</a:t>
             </a:r>
-            <a:endParaRPr lang="en-US" dirty="0" smtClean="0"/>
           </a:p>
           <a:p>
             <a:pPr lvl="2">
@@ -8518,7 +8887,11 @@
           <a:bodyPr/>
           <a:lstStyle/>
           <a:p>
-            <a:endParaRPr lang="en-US"/>
+            <a:r>
+              <a:rPr lang="en-US" dirty="0" smtClean="0"/>
+              <a:t>Play Test #2 - Game v2 + AI</a:t>
+            </a:r>
+            <a:endParaRPr lang="en-US" dirty="0"/>
           </a:p>
         </p:txBody>
       </p:sp>

</xml_diff>

<commit_message>
Play test #2 feedback
</commit_message>
<xml_diff>
--- a/docs/final presentation.pptx
+++ b/docs/final presentation.pptx
@@ -572,7 +572,7 @@
           <a:effectLst/>
           <a:extLst>
             <a:ext uri="{91240B29-F687-4f45-9708-019B960494DF}">
-              <a14:hiddenLine xmlns:a14="http://schemas.microsoft.com/office/drawing/2010/main" xmlns="" w="9525">
+              <a14:hiddenLine xmlns="" xmlns:a14="http://schemas.microsoft.com/office/drawing/2010/main" w="9525">
                 <a:solidFill>
                   <a:srgbClr val="000000"/>
                 </a:solidFill>
@@ -2094,7 +2094,7 @@
           <a:ln/>
           <a:extLst>
             <a:ext uri="{91240B29-F687-4f45-9708-019B960494DF}">
-              <a14:hiddenLine xmlns:a14="http://schemas.microsoft.com/office/drawing/2010/main" xmlns="" w="9525">
+              <a14:hiddenLine xmlns="" xmlns:a14="http://schemas.microsoft.com/office/drawing/2010/main" w="9525">
                 <a:solidFill>
                   <a:srgbClr val="000000"/>
                 </a:solidFill>
@@ -2369,7 +2369,7 @@
           <a:ln/>
           <a:extLst>
             <a:ext uri="{91240B29-F687-4f45-9708-019B960494DF}">
-              <a14:hiddenLine xmlns:a14="http://schemas.microsoft.com/office/drawing/2010/main" xmlns="" w="9525">
+              <a14:hiddenLine xmlns="" xmlns:a14="http://schemas.microsoft.com/office/drawing/2010/main" w="9525">
                 <a:solidFill>
                   <a:srgbClr val="000000"/>
                 </a:solidFill>
@@ -2652,7 +2652,7 @@
           <a:ln/>
           <a:extLst>
             <a:ext uri="{91240B29-F687-4f45-9708-019B960494DF}">
-              <a14:hiddenLine xmlns:a14="http://schemas.microsoft.com/office/drawing/2010/main" xmlns="" w="9525">
+              <a14:hiddenLine xmlns="" xmlns:a14="http://schemas.microsoft.com/office/drawing/2010/main" w="9525">
                 <a:solidFill>
                   <a:srgbClr val="000000"/>
                 </a:solidFill>
@@ -3278,7 +3278,7 @@
           <a:ln/>
           <a:extLst>
             <a:ext uri="{91240B29-F687-4f45-9708-019B960494DF}">
-              <a14:hiddenLine xmlns:a14="http://schemas.microsoft.com/office/drawing/2010/main" xmlns="" w="9525">
+              <a14:hiddenLine xmlns="" xmlns:a14="http://schemas.microsoft.com/office/drawing/2010/main" w="9525">
                 <a:solidFill>
                   <a:srgbClr val="000000"/>
                 </a:solidFill>
@@ -3617,7 +3617,7 @@
           <a:ln/>
           <a:extLst>
             <a:ext uri="{91240B29-F687-4f45-9708-019B960494DF}">
-              <a14:hiddenLine xmlns:a14="http://schemas.microsoft.com/office/drawing/2010/main" xmlns="" w="9525">
+              <a14:hiddenLine xmlns="" xmlns:a14="http://schemas.microsoft.com/office/drawing/2010/main" w="9525">
                 <a:solidFill>
                   <a:srgbClr val="000000"/>
                 </a:solidFill>
@@ -4094,7 +4094,7 @@
           <a:ln/>
           <a:extLst>
             <a:ext uri="{91240B29-F687-4f45-9708-019B960494DF}">
-              <a14:hiddenLine xmlns:a14="http://schemas.microsoft.com/office/drawing/2010/main" xmlns="" w="9525">
+              <a14:hiddenLine xmlns="" xmlns:a14="http://schemas.microsoft.com/office/drawing/2010/main" w="9525">
                 <a:solidFill>
                   <a:srgbClr val="000000"/>
                 </a:solidFill>
@@ -4523,7 +4523,7 @@
           <a:ln/>
           <a:extLst>
             <a:ext uri="{91240B29-F687-4f45-9708-019B960494DF}">
-              <a14:hiddenLine xmlns:a14="http://schemas.microsoft.com/office/drawing/2010/main" xmlns="" w="9525">
+              <a14:hiddenLine xmlns="" xmlns:a14="http://schemas.microsoft.com/office/drawing/2010/main" w="9525">
                 <a:solidFill>
                   <a:srgbClr val="000000"/>
                 </a:solidFill>
@@ -8675,10 +8675,7 @@
             <a:r>
               <a:rPr lang="en-US" sz="1200" dirty="0" smtClean="0">
                 <a:solidFill>
-                  <a:schemeClr val="accent1">
-                    <a:lumMod val="60000"/>
-                    <a:lumOff val="40000"/>
-                  </a:schemeClr>
+                  <a:schemeClr val="accent1"/>
                 </a:solidFill>
               </a:rPr>
               <a:t>Cool! Nice graphics! Yay for eating butterflies!</a:t>
@@ -8910,7 +8907,124 @@
           <a:bodyPr/>
           <a:lstStyle/>
           <a:p>
-            <a:endParaRPr lang="en-US"/>
+            <a:r>
+              <a:rPr lang="en-US" dirty="0" smtClean="0"/>
+              <a:t>Feedback received:</a:t>
+            </a:r>
+          </a:p>
+          <a:p>
+            <a:pPr lvl="1">
+              <a:buFont typeface="Arial" panose="020B0604020202020204" pitchFamily="34" charset="0"/>
+              <a:buChar char="•"/>
+            </a:pPr>
+            <a:r>
+              <a:rPr lang="en-US" dirty="0" smtClean="0"/>
+              <a:t>Negative:</a:t>
+            </a:r>
+          </a:p>
+          <a:p>
+            <a:pPr lvl="2">
+              <a:buFont typeface="Wingdings" panose="05000000000000000000" pitchFamily="2" charset="2"/>
+              <a:buChar char="Ø"/>
+            </a:pPr>
+            <a:r>
+              <a:rPr lang="en-US" b="1" dirty="0" smtClean="0">
+                <a:solidFill>
+                  <a:schemeClr val="accent2"/>
+                </a:solidFill>
+              </a:rPr>
+              <a:t>AI: dies too quickly to puppies.</a:t>
+            </a:r>
+          </a:p>
+          <a:p>
+            <a:pPr lvl="1">
+              <a:buFont typeface="Arial" panose="020B0604020202020204" pitchFamily="34" charset="0"/>
+              <a:buChar char="•"/>
+            </a:pPr>
+            <a:r>
+              <a:rPr lang="en-US" dirty="0" smtClean="0"/>
+              <a:t>Positive:</a:t>
+            </a:r>
+            <a:endParaRPr lang="en-US" dirty="0"/>
+          </a:p>
+          <a:p>
+            <a:pPr lvl="2">
+              <a:buFont typeface="Wingdings" panose="05000000000000000000" pitchFamily="2" charset="2"/>
+              <a:buChar char="Ø"/>
+            </a:pPr>
+            <a:r>
+              <a:rPr lang="en-US" dirty="0">
+                <a:solidFill>
+                  <a:schemeClr val="accent1"/>
+                </a:solidFill>
+              </a:rPr>
+              <a:t>Killer puppies: awesome! (and secretly Jeremy’s </a:t>
+            </a:r>
+            <a:r>
+              <a:rPr lang="en-US" dirty="0" err="1">
+                <a:solidFill>
+                  <a:schemeClr val="accent1"/>
+                </a:solidFill>
+              </a:rPr>
+              <a:t>favourite</a:t>
+            </a:r>
+            <a:r>
+              <a:rPr lang="en-US" dirty="0">
+                <a:solidFill>
+                  <a:schemeClr val="accent1"/>
+                </a:solidFill>
+              </a:rPr>
+              <a:t> feature</a:t>
+            </a:r>
+            <a:r>
+              <a:rPr lang="en-US" dirty="0" smtClean="0">
+                <a:solidFill>
+                  <a:schemeClr val="accent1"/>
+                </a:solidFill>
+              </a:rPr>
+              <a:t>)</a:t>
+            </a:r>
+          </a:p>
+          <a:p>
+            <a:pPr lvl="2">
+              <a:buFont typeface="Wingdings" panose="05000000000000000000" pitchFamily="2" charset="2"/>
+              <a:buChar char="Ø"/>
+            </a:pPr>
+            <a:r>
+              <a:rPr lang="en-US" dirty="0" smtClean="0">
+                <a:solidFill>
+                  <a:schemeClr val="accent1"/>
+                </a:solidFill>
+              </a:rPr>
+              <a:t>Still c</a:t>
+            </a:r>
+            <a:r>
+              <a:rPr lang="en-US" dirty="0" smtClean="0">
+                <a:solidFill>
+                  <a:schemeClr val="accent1"/>
+                </a:solidFill>
+              </a:rPr>
+              <a:t>ool!</a:t>
+            </a:r>
+          </a:p>
+          <a:p>
+            <a:pPr lvl="2">
+              <a:buFont typeface="Wingdings" panose="05000000000000000000" pitchFamily="2" charset="2"/>
+              <a:buChar char="Ø"/>
+            </a:pPr>
+            <a:r>
+              <a:rPr lang="en-US" dirty="0" smtClean="0">
+                <a:solidFill>
+                  <a:schemeClr val="accent1"/>
+                </a:solidFill>
+              </a:rPr>
+              <a:t>Best VGDL Game !?</a:t>
+            </a:r>
+            <a:endParaRPr lang="en-US" dirty="0">
+              <a:solidFill>
+                <a:schemeClr val="accent1"/>
+              </a:solidFill>
+            </a:endParaRPr>
           </a:p>
         </p:txBody>
       </p:sp>

</xml_diff>

<commit_message>
AI description added in presentation
</commit_message>
<xml_diff>
--- a/docs/final presentation.pptx
+++ b/docs/final presentation.pptx
@@ -572,7 +572,7 @@
           <a:effectLst/>
           <a:extLst>
             <a:ext uri="{91240B29-F687-4f45-9708-019B960494DF}">
-              <a14:hiddenLine xmlns="" xmlns:a14="http://schemas.microsoft.com/office/drawing/2010/main" w="9525">
+              <a14:hiddenLine xmlns:a14="http://schemas.microsoft.com/office/drawing/2010/main" xmlns="" w="9525">
                 <a:solidFill>
                   <a:srgbClr val="000000"/>
                 </a:solidFill>
@@ -2094,7 +2094,7 @@
           <a:ln/>
           <a:extLst>
             <a:ext uri="{91240B29-F687-4f45-9708-019B960494DF}">
-              <a14:hiddenLine xmlns="" xmlns:a14="http://schemas.microsoft.com/office/drawing/2010/main" w="9525">
+              <a14:hiddenLine xmlns:a14="http://schemas.microsoft.com/office/drawing/2010/main" xmlns="" w="9525">
                 <a:solidFill>
                   <a:srgbClr val="000000"/>
                 </a:solidFill>
@@ -2369,7 +2369,7 @@
           <a:ln/>
           <a:extLst>
             <a:ext uri="{91240B29-F687-4f45-9708-019B960494DF}">
-              <a14:hiddenLine xmlns="" xmlns:a14="http://schemas.microsoft.com/office/drawing/2010/main" w="9525">
+              <a14:hiddenLine xmlns:a14="http://schemas.microsoft.com/office/drawing/2010/main" xmlns="" w="9525">
                 <a:solidFill>
                   <a:srgbClr val="000000"/>
                 </a:solidFill>
@@ -2652,7 +2652,7 @@
           <a:ln/>
           <a:extLst>
             <a:ext uri="{91240B29-F687-4f45-9708-019B960494DF}">
-              <a14:hiddenLine xmlns="" xmlns:a14="http://schemas.microsoft.com/office/drawing/2010/main" w="9525">
+              <a14:hiddenLine xmlns:a14="http://schemas.microsoft.com/office/drawing/2010/main" xmlns="" w="9525">
                 <a:solidFill>
                   <a:srgbClr val="000000"/>
                 </a:solidFill>
@@ -3278,7 +3278,7 @@
           <a:ln/>
           <a:extLst>
             <a:ext uri="{91240B29-F687-4f45-9708-019B960494DF}">
-              <a14:hiddenLine xmlns="" xmlns:a14="http://schemas.microsoft.com/office/drawing/2010/main" w="9525">
+              <a14:hiddenLine xmlns:a14="http://schemas.microsoft.com/office/drawing/2010/main" xmlns="" w="9525">
                 <a:solidFill>
                   <a:srgbClr val="000000"/>
                 </a:solidFill>
@@ -3617,7 +3617,7 @@
           <a:ln/>
           <a:extLst>
             <a:ext uri="{91240B29-F687-4f45-9708-019B960494DF}">
-              <a14:hiddenLine xmlns="" xmlns:a14="http://schemas.microsoft.com/office/drawing/2010/main" w="9525">
+              <a14:hiddenLine xmlns:a14="http://schemas.microsoft.com/office/drawing/2010/main" xmlns="" w="9525">
                 <a:solidFill>
                   <a:srgbClr val="000000"/>
                 </a:solidFill>
@@ -4094,7 +4094,7 @@
           <a:ln/>
           <a:extLst>
             <a:ext uri="{91240B29-F687-4f45-9708-019B960494DF}">
-              <a14:hiddenLine xmlns="" xmlns:a14="http://schemas.microsoft.com/office/drawing/2010/main" w="9525">
+              <a14:hiddenLine xmlns:a14="http://schemas.microsoft.com/office/drawing/2010/main" xmlns="" w="9525">
                 <a:solidFill>
                   <a:srgbClr val="000000"/>
                 </a:solidFill>
@@ -4523,7 +4523,7 @@
           <a:ln/>
           <a:extLst>
             <a:ext uri="{91240B29-F687-4f45-9708-019B960494DF}">
-              <a14:hiddenLine xmlns="" xmlns:a14="http://schemas.microsoft.com/office/drawing/2010/main" w="9525">
+              <a14:hiddenLine xmlns:a14="http://schemas.microsoft.com/office/drawing/2010/main" xmlns="" w="9525">
                 <a:solidFill>
                   <a:srgbClr val="000000"/>
                 </a:solidFill>
@@ -6012,30 +6012,11 @@
           <a:p>
             <a:r>
               <a:rPr lang="en-US" dirty="0" smtClean="0"/>
-              <a:t>Fitness Function</a:t>
-            </a:r>
-            <a:endParaRPr lang="en-US" dirty="0"/>
-          </a:p>
-        </p:txBody>
-      </p:sp>
-      <p:sp>
-        <p:nvSpPr>
-          <p:cNvPr id="3" name="Content Placeholder 2"/>
-          <p:cNvSpPr>
-            <a:spLocks noGrp="1"/>
-          </p:cNvSpPr>
-          <p:nvPr>
-            <p:ph idx="1"/>
-          </p:nvPr>
-        </p:nvSpPr>
-        <p:spPr/>
-        <p:txBody>
-          <a:bodyPr/>
-          <a:lstStyle/>
-          <a:p>
+              <a:t>FSM &amp; Fitness </a:t>
+            </a:r>
             <a:r>
               <a:rPr lang="en-US" dirty="0" smtClean="0"/>
-              <a:t>FSM with different heuristics</a:t>
+              <a:t>Function</a:t>
             </a:r>
             <a:endParaRPr lang="en-US" dirty="0"/>
           </a:p>
@@ -6064,6 +6045,1774 @@
           </a:p>
         </p:txBody>
       </p:sp>
+      <p:sp>
+        <p:nvSpPr>
+          <p:cNvPr id="6" name="Rounded Rectangle 5"/>
+          <p:cNvSpPr/>
+          <p:nvPr/>
+        </p:nvSpPr>
+        <p:spPr>
+          <a:xfrm>
+            <a:off x="997788" y="2312641"/>
+            <a:ext cx="1751163" cy="491705"/>
+          </a:xfrm>
+          <a:prstGeom prst="roundRect">
+            <a:avLst/>
+          </a:prstGeom>
+        </p:spPr>
+        <p:style>
+          <a:lnRef idx="2">
+            <a:schemeClr val="accent2">
+              <a:shade val="50000"/>
+            </a:schemeClr>
+          </a:lnRef>
+          <a:fillRef idx="1">
+            <a:schemeClr val="accent2"/>
+          </a:fillRef>
+          <a:effectRef idx="0">
+            <a:schemeClr val="accent2"/>
+          </a:effectRef>
+          <a:fontRef idx="minor">
+            <a:schemeClr val="lt1"/>
+          </a:fontRef>
+        </p:style>
+        <p:txBody>
+          <a:bodyPr rtlCol="0" anchor="ctr"/>
+          <a:lstStyle/>
+          <a:p>
+            <a:pPr algn="ctr"/>
+            <a:r>
+              <a:rPr lang="en-US" sz="1600" dirty="0" smtClean="0"/>
+              <a:t>Default state: explore</a:t>
+            </a:r>
+            <a:endParaRPr lang="en-US" sz="1600" dirty="0"/>
+          </a:p>
+        </p:txBody>
+      </p:sp>
+      <p:sp>
+        <p:nvSpPr>
+          <p:cNvPr id="7" name="Rounded Rectangle 6"/>
+          <p:cNvSpPr/>
+          <p:nvPr/>
+        </p:nvSpPr>
+        <p:spPr>
+          <a:xfrm>
+            <a:off x="3810000" y="2312641"/>
+            <a:ext cx="1751163" cy="491705"/>
+          </a:xfrm>
+          <a:prstGeom prst="roundRect">
+            <a:avLst/>
+          </a:prstGeom>
+        </p:spPr>
+        <p:style>
+          <a:lnRef idx="2">
+            <a:schemeClr val="accent2">
+              <a:shade val="50000"/>
+            </a:schemeClr>
+          </a:lnRef>
+          <a:fillRef idx="1">
+            <a:schemeClr val="accent2"/>
+          </a:fillRef>
+          <a:effectRef idx="0">
+            <a:schemeClr val="accent2"/>
+          </a:effectRef>
+          <a:fontRef idx="minor">
+            <a:schemeClr val="lt1"/>
+          </a:fontRef>
+        </p:style>
+        <p:txBody>
+          <a:bodyPr rtlCol="0" anchor="ctr"/>
+          <a:lstStyle/>
+          <a:p>
+            <a:pPr algn="ctr"/>
+            <a:r>
+              <a:rPr lang="en-US" sz="1600" dirty="0" smtClean="0"/>
+              <a:t>State: Attack</a:t>
+            </a:r>
+            <a:endParaRPr lang="en-US" sz="1600" dirty="0"/>
+          </a:p>
+        </p:txBody>
+      </p:sp>
+      <p:sp>
+        <p:nvSpPr>
+          <p:cNvPr id="8" name="Rounded Rectangle 7"/>
+          <p:cNvSpPr/>
+          <p:nvPr/>
+        </p:nvSpPr>
+        <p:spPr>
+          <a:xfrm>
+            <a:off x="6622212" y="2312641"/>
+            <a:ext cx="1751163" cy="491705"/>
+          </a:xfrm>
+          <a:prstGeom prst="roundRect">
+            <a:avLst/>
+          </a:prstGeom>
+        </p:spPr>
+        <p:style>
+          <a:lnRef idx="2">
+            <a:schemeClr val="accent2">
+              <a:shade val="50000"/>
+            </a:schemeClr>
+          </a:lnRef>
+          <a:fillRef idx="1">
+            <a:schemeClr val="accent2"/>
+          </a:fillRef>
+          <a:effectRef idx="0">
+            <a:schemeClr val="accent2"/>
+          </a:effectRef>
+          <a:fontRef idx="minor">
+            <a:schemeClr val="lt1"/>
+          </a:fontRef>
+        </p:style>
+        <p:txBody>
+          <a:bodyPr rtlCol="0" anchor="ctr"/>
+          <a:lstStyle/>
+          <a:p>
+            <a:pPr algn="ctr"/>
+            <a:r>
+              <a:rPr lang="en-US" sz="1600" dirty="0" smtClean="0"/>
+              <a:t>State: Defend</a:t>
+            </a:r>
+            <a:endParaRPr lang="en-US" sz="1600" dirty="0"/>
+          </a:p>
+        </p:txBody>
+      </p:sp>
+      <p:sp>
+        <p:nvSpPr>
+          <p:cNvPr id="9" name="Rounded Rectangle 8"/>
+          <p:cNvSpPr/>
+          <p:nvPr/>
+        </p:nvSpPr>
+        <p:spPr>
+          <a:xfrm>
+            <a:off x="9434424" y="2312641"/>
+            <a:ext cx="1751163" cy="491705"/>
+          </a:xfrm>
+          <a:prstGeom prst="roundRect">
+            <a:avLst/>
+          </a:prstGeom>
+        </p:spPr>
+        <p:style>
+          <a:lnRef idx="2">
+            <a:schemeClr val="accent2">
+              <a:shade val="50000"/>
+            </a:schemeClr>
+          </a:lnRef>
+          <a:fillRef idx="1">
+            <a:schemeClr val="accent2"/>
+          </a:fillRef>
+          <a:effectRef idx="0">
+            <a:schemeClr val="accent2"/>
+          </a:effectRef>
+          <a:fontRef idx="minor">
+            <a:schemeClr val="lt1"/>
+          </a:fontRef>
+        </p:style>
+        <p:txBody>
+          <a:bodyPr rtlCol="0" anchor="ctr"/>
+          <a:lstStyle/>
+          <a:p>
+            <a:pPr algn="ctr"/>
+            <a:r>
+              <a:rPr lang="en-US" sz="1600" dirty="0" smtClean="0"/>
+              <a:t>State: Collect</a:t>
+            </a:r>
+            <a:endParaRPr lang="en-US" sz="1600" dirty="0"/>
+          </a:p>
+        </p:txBody>
+      </p:sp>
+      <p:cxnSp>
+        <p:nvCxnSpPr>
+          <p:cNvPr id="13" name="Straight Connector 12"/>
+          <p:cNvCxnSpPr>
+            <a:stCxn id="6" idx="2"/>
+          </p:cNvCxnSpPr>
+          <p:nvPr/>
+        </p:nvCxnSpPr>
+        <p:spPr>
+          <a:xfrm flipH="1">
+            <a:off x="1873369" y="2804346"/>
+            <a:ext cx="1" cy="361548"/>
+          </a:xfrm>
+          <a:prstGeom prst="line">
+            <a:avLst/>
+          </a:prstGeom>
+        </p:spPr>
+        <p:style>
+          <a:lnRef idx="1">
+            <a:schemeClr val="accent1"/>
+          </a:lnRef>
+          <a:fillRef idx="0">
+            <a:schemeClr val="accent1"/>
+          </a:fillRef>
+          <a:effectRef idx="0">
+            <a:schemeClr val="accent1"/>
+          </a:effectRef>
+          <a:fontRef idx="minor">
+            <a:schemeClr val="tx1"/>
+          </a:fontRef>
+        </p:style>
+      </p:cxnSp>
+      <p:cxnSp>
+        <p:nvCxnSpPr>
+          <p:cNvPr id="15" name="Straight Connector 14"/>
+          <p:cNvCxnSpPr/>
+          <p:nvPr/>
+        </p:nvCxnSpPr>
+        <p:spPr>
+          <a:xfrm>
+            <a:off x="1873369" y="3148642"/>
+            <a:ext cx="5624424" cy="0"/>
+          </a:xfrm>
+          <a:prstGeom prst="line">
+            <a:avLst/>
+          </a:prstGeom>
+        </p:spPr>
+        <p:style>
+          <a:lnRef idx="1">
+            <a:schemeClr val="accent1"/>
+          </a:lnRef>
+          <a:fillRef idx="0">
+            <a:schemeClr val="accent1"/>
+          </a:fillRef>
+          <a:effectRef idx="0">
+            <a:schemeClr val="accent1"/>
+          </a:effectRef>
+          <a:fontRef idx="minor">
+            <a:schemeClr val="tx1"/>
+          </a:fontRef>
+        </p:style>
+      </p:cxnSp>
+      <p:cxnSp>
+        <p:nvCxnSpPr>
+          <p:cNvPr id="17" name="Straight Arrow Connector 16"/>
+          <p:cNvCxnSpPr/>
+          <p:nvPr/>
+        </p:nvCxnSpPr>
+        <p:spPr>
+          <a:xfrm flipV="1">
+            <a:off x="7506419" y="2804346"/>
+            <a:ext cx="0" cy="361548"/>
+          </a:xfrm>
+          <a:prstGeom prst="straightConnector1">
+            <a:avLst/>
+          </a:prstGeom>
+          <a:ln>
+            <a:tailEnd type="triangle"/>
+          </a:ln>
+        </p:spPr>
+        <p:style>
+          <a:lnRef idx="1">
+            <a:schemeClr val="accent1"/>
+          </a:lnRef>
+          <a:fillRef idx="0">
+            <a:schemeClr val="accent1"/>
+          </a:fillRef>
+          <a:effectRef idx="0">
+            <a:schemeClr val="accent1"/>
+          </a:effectRef>
+          <a:fontRef idx="minor">
+            <a:schemeClr val="tx1"/>
+          </a:fontRef>
+        </p:style>
+      </p:cxnSp>
+      <p:cxnSp>
+        <p:nvCxnSpPr>
+          <p:cNvPr id="19" name="Straight Arrow Connector 18"/>
+          <p:cNvCxnSpPr/>
+          <p:nvPr/>
+        </p:nvCxnSpPr>
+        <p:spPr>
+          <a:xfrm flipV="1">
+            <a:off x="4685581" y="2787094"/>
+            <a:ext cx="0" cy="361548"/>
+          </a:xfrm>
+          <a:prstGeom prst="straightConnector1">
+            <a:avLst/>
+          </a:prstGeom>
+          <a:ln>
+            <a:tailEnd type="triangle"/>
+          </a:ln>
+        </p:spPr>
+        <p:style>
+          <a:lnRef idx="1">
+            <a:schemeClr val="accent1"/>
+          </a:lnRef>
+          <a:fillRef idx="0">
+            <a:schemeClr val="accent1"/>
+          </a:fillRef>
+          <a:effectRef idx="0">
+            <a:schemeClr val="accent1"/>
+          </a:effectRef>
+          <a:fontRef idx="minor">
+            <a:schemeClr val="tx1"/>
+          </a:fontRef>
+        </p:style>
+      </p:cxnSp>
+      <p:cxnSp>
+        <p:nvCxnSpPr>
+          <p:cNvPr id="20" name="Straight Arrow Connector 19"/>
+          <p:cNvCxnSpPr/>
+          <p:nvPr/>
+        </p:nvCxnSpPr>
+        <p:spPr>
+          <a:xfrm flipV="1">
+            <a:off x="10310005" y="2810477"/>
+            <a:ext cx="0" cy="519319"/>
+          </a:xfrm>
+          <a:prstGeom prst="straightConnector1">
+            <a:avLst/>
+          </a:prstGeom>
+          <a:ln>
+            <a:tailEnd type="triangle"/>
+          </a:ln>
+        </p:spPr>
+        <p:style>
+          <a:lnRef idx="1">
+            <a:schemeClr val="accent1"/>
+          </a:lnRef>
+          <a:fillRef idx="0">
+            <a:schemeClr val="accent1"/>
+          </a:fillRef>
+          <a:effectRef idx="0">
+            <a:schemeClr val="accent1"/>
+          </a:effectRef>
+          <a:fontRef idx="minor">
+            <a:schemeClr val="tx1"/>
+          </a:fontRef>
+        </p:style>
+      </p:cxnSp>
+      <p:cxnSp>
+        <p:nvCxnSpPr>
+          <p:cNvPr id="23" name="Straight Connector 22"/>
+          <p:cNvCxnSpPr/>
+          <p:nvPr/>
+        </p:nvCxnSpPr>
+        <p:spPr>
+          <a:xfrm>
+            <a:off x="1873369" y="3157268"/>
+            <a:ext cx="0" cy="172528"/>
+          </a:xfrm>
+          <a:prstGeom prst="line">
+            <a:avLst/>
+          </a:prstGeom>
+        </p:spPr>
+        <p:style>
+          <a:lnRef idx="1">
+            <a:schemeClr val="accent1"/>
+          </a:lnRef>
+          <a:fillRef idx="0">
+            <a:schemeClr val="accent1"/>
+          </a:fillRef>
+          <a:effectRef idx="0">
+            <a:schemeClr val="accent1"/>
+          </a:effectRef>
+          <a:fontRef idx="minor">
+            <a:schemeClr val="tx1"/>
+          </a:fontRef>
+        </p:style>
+      </p:cxnSp>
+      <p:cxnSp>
+        <p:nvCxnSpPr>
+          <p:cNvPr id="25" name="Straight Connector 24"/>
+          <p:cNvCxnSpPr/>
+          <p:nvPr/>
+        </p:nvCxnSpPr>
+        <p:spPr>
+          <a:xfrm>
+            <a:off x="1873369" y="3329796"/>
+            <a:ext cx="8436636" cy="0"/>
+          </a:xfrm>
+          <a:prstGeom prst="line">
+            <a:avLst/>
+          </a:prstGeom>
+        </p:spPr>
+        <p:style>
+          <a:lnRef idx="1">
+            <a:schemeClr val="accent1"/>
+          </a:lnRef>
+          <a:fillRef idx="0">
+            <a:schemeClr val="accent1"/>
+          </a:fillRef>
+          <a:effectRef idx="0">
+            <a:schemeClr val="accent1"/>
+          </a:effectRef>
+          <a:fontRef idx="minor">
+            <a:schemeClr val="tx1"/>
+          </a:fontRef>
+        </p:style>
+      </p:cxnSp>
+      <p:cxnSp>
+        <p:nvCxnSpPr>
+          <p:cNvPr id="28" name="Straight Connector 27"/>
+          <p:cNvCxnSpPr>
+            <a:stCxn id="7" idx="0"/>
+          </p:cNvCxnSpPr>
+          <p:nvPr/>
+        </p:nvCxnSpPr>
+        <p:spPr>
+          <a:xfrm flipV="1">
+            <a:off x="4685582" y="2110230"/>
+            <a:ext cx="0" cy="202411"/>
+          </a:xfrm>
+          <a:prstGeom prst="line">
+            <a:avLst/>
+          </a:prstGeom>
+        </p:spPr>
+        <p:style>
+          <a:lnRef idx="1">
+            <a:schemeClr val="accent1"/>
+          </a:lnRef>
+          <a:fillRef idx="0">
+            <a:schemeClr val="accent1"/>
+          </a:fillRef>
+          <a:effectRef idx="0">
+            <a:schemeClr val="accent1"/>
+          </a:effectRef>
+          <a:fontRef idx="minor">
+            <a:schemeClr val="tx1"/>
+          </a:fontRef>
+        </p:style>
+      </p:cxnSp>
+      <p:cxnSp>
+        <p:nvCxnSpPr>
+          <p:cNvPr id="30" name="Straight Connector 29"/>
+          <p:cNvCxnSpPr/>
+          <p:nvPr/>
+        </p:nvCxnSpPr>
+        <p:spPr>
+          <a:xfrm flipH="1">
+            <a:off x="1873369" y="2110231"/>
+            <a:ext cx="8436636" cy="0"/>
+          </a:xfrm>
+          <a:prstGeom prst="line">
+            <a:avLst/>
+          </a:prstGeom>
+        </p:spPr>
+        <p:style>
+          <a:lnRef idx="1">
+            <a:schemeClr val="accent1"/>
+          </a:lnRef>
+          <a:fillRef idx="0">
+            <a:schemeClr val="accent1"/>
+          </a:fillRef>
+          <a:effectRef idx="0">
+            <a:schemeClr val="accent1"/>
+          </a:effectRef>
+          <a:fontRef idx="minor">
+            <a:schemeClr val="tx1"/>
+          </a:fontRef>
+        </p:style>
+      </p:cxnSp>
+      <p:cxnSp>
+        <p:nvCxnSpPr>
+          <p:cNvPr id="33" name="Straight Arrow Connector 32"/>
+          <p:cNvCxnSpPr>
+            <a:endCxn id="6" idx="0"/>
+          </p:cNvCxnSpPr>
+          <p:nvPr/>
+        </p:nvCxnSpPr>
+        <p:spPr>
+          <a:xfrm>
+            <a:off x="1873370" y="2109851"/>
+            <a:ext cx="0" cy="202790"/>
+          </a:xfrm>
+          <a:prstGeom prst="straightConnector1">
+            <a:avLst/>
+          </a:prstGeom>
+          <a:ln>
+            <a:tailEnd type="triangle"/>
+          </a:ln>
+        </p:spPr>
+        <p:style>
+          <a:lnRef idx="1">
+            <a:schemeClr val="accent1"/>
+          </a:lnRef>
+          <a:fillRef idx="0">
+            <a:schemeClr val="accent1"/>
+          </a:fillRef>
+          <a:effectRef idx="0">
+            <a:schemeClr val="accent1"/>
+          </a:effectRef>
+          <a:fontRef idx="minor">
+            <a:schemeClr val="tx1"/>
+          </a:fontRef>
+        </p:style>
+      </p:cxnSp>
+      <p:cxnSp>
+        <p:nvCxnSpPr>
+          <p:cNvPr id="39" name="Straight Connector 38"/>
+          <p:cNvCxnSpPr>
+            <a:stCxn id="8" idx="0"/>
+          </p:cNvCxnSpPr>
+          <p:nvPr/>
+        </p:nvCxnSpPr>
+        <p:spPr>
+          <a:xfrm flipH="1" flipV="1">
+            <a:off x="7497793" y="2110230"/>
+            <a:ext cx="1" cy="202411"/>
+          </a:xfrm>
+          <a:prstGeom prst="line">
+            <a:avLst/>
+          </a:prstGeom>
+        </p:spPr>
+        <p:style>
+          <a:lnRef idx="1">
+            <a:schemeClr val="accent1"/>
+          </a:lnRef>
+          <a:fillRef idx="0">
+            <a:schemeClr val="accent1"/>
+          </a:fillRef>
+          <a:effectRef idx="0">
+            <a:schemeClr val="accent1"/>
+          </a:effectRef>
+          <a:fontRef idx="minor">
+            <a:schemeClr val="tx1"/>
+          </a:fontRef>
+        </p:style>
+      </p:cxnSp>
+      <p:cxnSp>
+        <p:nvCxnSpPr>
+          <p:cNvPr id="41" name="Straight Connector 40"/>
+          <p:cNvCxnSpPr>
+            <a:stCxn id="9" idx="0"/>
+          </p:cNvCxnSpPr>
+          <p:nvPr/>
+        </p:nvCxnSpPr>
+        <p:spPr>
+          <a:xfrm flipH="1" flipV="1">
+            <a:off x="10310005" y="2109851"/>
+            <a:ext cx="1" cy="202790"/>
+          </a:xfrm>
+          <a:prstGeom prst="line">
+            <a:avLst/>
+          </a:prstGeom>
+        </p:spPr>
+        <p:style>
+          <a:lnRef idx="1">
+            <a:schemeClr val="accent1"/>
+          </a:lnRef>
+          <a:fillRef idx="0">
+            <a:schemeClr val="accent1"/>
+          </a:fillRef>
+          <a:effectRef idx="0">
+            <a:schemeClr val="accent1"/>
+          </a:effectRef>
+          <a:fontRef idx="minor">
+            <a:schemeClr val="tx1"/>
+          </a:fontRef>
+        </p:style>
+      </p:cxnSp>
+      <p:sp>
+        <p:nvSpPr>
+          <p:cNvPr id="42" name="TextBox 41"/>
+          <p:cNvSpPr txBox="1"/>
+          <p:nvPr/>
+        </p:nvSpPr>
+        <p:spPr>
+          <a:xfrm>
+            <a:off x="4108149" y="3278799"/>
+            <a:ext cx="1633628" cy="600164"/>
+          </a:xfrm>
+          <a:prstGeom prst="rect">
+            <a:avLst/>
+          </a:prstGeom>
+          <a:noFill/>
+        </p:spPr>
+        <p:txBody>
+          <a:bodyPr wrap="square" rtlCol="0">
+            <a:spAutoFit/>
+          </a:bodyPr>
+          <a:lstStyle/>
+          <a:p>
+            <a:r>
+              <a:rPr lang="en-US" sz="1100" dirty="0" smtClean="0"/>
+              <a:t>Health points &gt; Enemy health points OR crazy?</a:t>
+            </a:r>
+            <a:endParaRPr lang="en-US" sz="1100" dirty="0"/>
+          </a:p>
+        </p:txBody>
+      </p:sp>
+      <p:sp>
+        <p:nvSpPr>
+          <p:cNvPr id="43" name="TextBox 42"/>
+          <p:cNvSpPr txBox="1"/>
+          <p:nvPr/>
+        </p:nvSpPr>
+        <p:spPr>
+          <a:xfrm>
+            <a:off x="2173137" y="2887032"/>
+            <a:ext cx="1380227" cy="261610"/>
+          </a:xfrm>
+          <a:prstGeom prst="rect">
+            <a:avLst/>
+          </a:prstGeom>
+          <a:noFill/>
+        </p:spPr>
+        <p:txBody>
+          <a:bodyPr wrap="square" rtlCol="0">
+            <a:spAutoFit/>
+          </a:bodyPr>
+          <a:lstStyle/>
+          <a:p>
+            <a:r>
+              <a:rPr lang="en-US" sz="1100" dirty="0" smtClean="0"/>
+              <a:t>yes</a:t>
+            </a:r>
+            <a:endParaRPr lang="en-US" sz="1100" dirty="0"/>
+          </a:p>
+        </p:txBody>
+      </p:sp>
+      <p:sp>
+        <p:nvSpPr>
+          <p:cNvPr id="44" name="TextBox 43"/>
+          <p:cNvSpPr txBox="1"/>
+          <p:nvPr/>
+        </p:nvSpPr>
+        <p:spPr>
+          <a:xfrm>
+            <a:off x="2173136" y="3319536"/>
+            <a:ext cx="1380227" cy="261610"/>
+          </a:xfrm>
+          <a:prstGeom prst="rect">
+            <a:avLst/>
+          </a:prstGeom>
+          <a:noFill/>
+        </p:spPr>
+        <p:txBody>
+          <a:bodyPr wrap="square" rtlCol="0">
+            <a:spAutoFit/>
+          </a:bodyPr>
+          <a:lstStyle/>
+          <a:p>
+            <a:r>
+              <a:rPr lang="en-US" sz="1100" dirty="0" smtClean="0"/>
+              <a:t>no</a:t>
+            </a:r>
+            <a:endParaRPr lang="en-US" sz="1100" dirty="0"/>
+          </a:p>
+        </p:txBody>
+      </p:sp>
+      <p:sp>
+        <p:nvSpPr>
+          <p:cNvPr id="45" name="TextBox 44"/>
+          <p:cNvSpPr txBox="1"/>
+          <p:nvPr/>
+        </p:nvSpPr>
+        <p:spPr>
+          <a:xfrm>
+            <a:off x="798301" y="2909997"/>
+            <a:ext cx="1224951" cy="430887"/>
+          </a:xfrm>
+          <a:prstGeom prst="rect">
+            <a:avLst/>
+          </a:prstGeom>
+          <a:noFill/>
+        </p:spPr>
+        <p:txBody>
+          <a:bodyPr wrap="square" rtlCol="0">
+            <a:spAutoFit/>
+          </a:bodyPr>
+          <a:lstStyle/>
+          <a:p>
+            <a:r>
+              <a:rPr lang="en-US" sz="1100" dirty="0" smtClean="0"/>
+              <a:t>Distance to enemy &lt; 5?</a:t>
+            </a:r>
+            <a:endParaRPr lang="en-US" sz="1100" dirty="0"/>
+          </a:p>
+        </p:txBody>
+      </p:sp>
+      <p:sp>
+        <p:nvSpPr>
+          <p:cNvPr id="46" name="TextBox 45"/>
+          <p:cNvSpPr txBox="1"/>
+          <p:nvPr/>
+        </p:nvSpPr>
+        <p:spPr>
+          <a:xfrm>
+            <a:off x="4676955" y="2856980"/>
+            <a:ext cx="1380227" cy="261610"/>
+          </a:xfrm>
+          <a:prstGeom prst="rect">
+            <a:avLst/>
+          </a:prstGeom>
+          <a:noFill/>
+        </p:spPr>
+        <p:txBody>
+          <a:bodyPr wrap="square" rtlCol="0">
+            <a:spAutoFit/>
+          </a:bodyPr>
+          <a:lstStyle/>
+          <a:p>
+            <a:r>
+              <a:rPr lang="en-US" sz="1100" dirty="0" smtClean="0"/>
+              <a:t>yes</a:t>
+            </a:r>
+            <a:endParaRPr lang="en-US" sz="1100" dirty="0"/>
+          </a:p>
+        </p:txBody>
+      </p:sp>
+      <p:sp>
+        <p:nvSpPr>
+          <p:cNvPr id="47" name="TextBox 46"/>
+          <p:cNvSpPr txBox="1"/>
+          <p:nvPr/>
+        </p:nvSpPr>
+        <p:spPr>
+          <a:xfrm>
+            <a:off x="7489167" y="2863831"/>
+            <a:ext cx="1380227" cy="261610"/>
+          </a:xfrm>
+          <a:prstGeom prst="rect">
+            <a:avLst/>
+          </a:prstGeom>
+          <a:noFill/>
+        </p:spPr>
+        <p:txBody>
+          <a:bodyPr wrap="square" rtlCol="0">
+            <a:spAutoFit/>
+          </a:bodyPr>
+          <a:lstStyle/>
+          <a:p>
+            <a:r>
+              <a:rPr lang="en-US" sz="1100" dirty="0" smtClean="0"/>
+              <a:t>no</a:t>
+            </a:r>
+            <a:endParaRPr lang="en-US" sz="1100" dirty="0"/>
+          </a:p>
+        </p:txBody>
+      </p:sp>
+      <p:sp>
+        <p:nvSpPr>
+          <p:cNvPr id="48" name="Diamond 47"/>
+          <p:cNvSpPr/>
+          <p:nvPr/>
+        </p:nvSpPr>
+        <p:spPr>
+          <a:xfrm>
+            <a:off x="1762093" y="3027401"/>
+            <a:ext cx="239806" cy="239806"/>
+          </a:xfrm>
+          <a:prstGeom prst="diamond">
+            <a:avLst/>
+          </a:prstGeom>
+        </p:spPr>
+        <p:style>
+          <a:lnRef idx="2">
+            <a:schemeClr val="accent1">
+              <a:shade val="50000"/>
+            </a:schemeClr>
+          </a:lnRef>
+          <a:fillRef idx="1">
+            <a:schemeClr val="accent1"/>
+          </a:fillRef>
+          <a:effectRef idx="0">
+            <a:schemeClr val="accent1"/>
+          </a:effectRef>
+          <a:fontRef idx="minor">
+            <a:schemeClr val="lt1"/>
+          </a:fontRef>
+        </p:style>
+        <p:txBody>
+          <a:bodyPr rtlCol="0" anchor="ctr"/>
+          <a:lstStyle/>
+          <a:p>
+            <a:pPr algn="ctr"/>
+            <a:endParaRPr lang="en-US"/>
+          </a:p>
+        </p:txBody>
+      </p:sp>
+      <p:sp>
+        <p:nvSpPr>
+          <p:cNvPr id="49" name="Diamond 48"/>
+          <p:cNvSpPr/>
+          <p:nvPr/>
+        </p:nvSpPr>
+        <p:spPr>
+          <a:xfrm>
+            <a:off x="4571363" y="3027401"/>
+            <a:ext cx="239806" cy="239806"/>
+          </a:xfrm>
+          <a:prstGeom prst="diamond">
+            <a:avLst/>
+          </a:prstGeom>
+        </p:spPr>
+        <p:style>
+          <a:lnRef idx="2">
+            <a:schemeClr val="accent1">
+              <a:shade val="50000"/>
+            </a:schemeClr>
+          </a:lnRef>
+          <a:fillRef idx="1">
+            <a:schemeClr val="accent1"/>
+          </a:fillRef>
+          <a:effectRef idx="0">
+            <a:schemeClr val="accent1"/>
+          </a:effectRef>
+          <a:fontRef idx="minor">
+            <a:schemeClr val="lt1"/>
+          </a:fontRef>
+        </p:style>
+        <p:txBody>
+          <a:bodyPr rtlCol="0" anchor="ctr"/>
+          <a:lstStyle/>
+          <a:p>
+            <a:pPr algn="ctr"/>
+            <a:endParaRPr lang="en-US"/>
+          </a:p>
+        </p:txBody>
+      </p:sp>
+      <p:sp>
+        <p:nvSpPr>
+          <p:cNvPr id="50" name="TextBox 49"/>
+          <p:cNvSpPr txBox="1"/>
+          <p:nvPr/>
+        </p:nvSpPr>
+        <p:spPr>
+          <a:xfrm>
+            <a:off x="10292751" y="2099866"/>
+            <a:ext cx="1633628" cy="261610"/>
+          </a:xfrm>
+          <a:prstGeom prst="rect">
+            <a:avLst/>
+          </a:prstGeom>
+          <a:noFill/>
+        </p:spPr>
+        <p:txBody>
+          <a:bodyPr wrap="square" rtlCol="0">
+            <a:spAutoFit/>
+          </a:bodyPr>
+          <a:lstStyle/>
+          <a:p>
+            <a:r>
+              <a:rPr lang="en-US" sz="1100" dirty="0" smtClean="0"/>
+              <a:t>No resource close</a:t>
+            </a:r>
+            <a:endParaRPr lang="en-US" sz="1100" dirty="0"/>
+          </a:p>
+        </p:txBody>
+      </p:sp>
+      <p:sp>
+        <p:nvSpPr>
+          <p:cNvPr id="51" name="TextBox 50"/>
+          <p:cNvSpPr txBox="1"/>
+          <p:nvPr/>
+        </p:nvSpPr>
+        <p:spPr>
+          <a:xfrm>
+            <a:off x="7489167" y="2099866"/>
+            <a:ext cx="1633628" cy="261610"/>
+          </a:xfrm>
+          <a:prstGeom prst="rect">
+            <a:avLst/>
+          </a:prstGeom>
+          <a:noFill/>
+        </p:spPr>
+        <p:txBody>
+          <a:bodyPr wrap="square" rtlCol="0">
+            <a:spAutoFit/>
+          </a:bodyPr>
+          <a:lstStyle/>
+          <a:p>
+            <a:r>
+              <a:rPr lang="en-US" sz="1100" dirty="0" smtClean="0"/>
+              <a:t>Lost enemy</a:t>
+            </a:r>
+            <a:endParaRPr lang="en-US" sz="1100" dirty="0"/>
+          </a:p>
+        </p:txBody>
+      </p:sp>
+      <p:sp>
+        <p:nvSpPr>
+          <p:cNvPr id="52" name="TextBox 51"/>
+          <p:cNvSpPr txBox="1"/>
+          <p:nvPr/>
+        </p:nvSpPr>
+        <p:spPr>
+          <a:xfrm>
+            <a:off x="4649279" y="2107123"/>
+            <a:ext cx="1633628" cy="261610"/>
+          </a:xfrm>
+          <a:prstGeom prst="rect">
+            <a:avLst/>
+          </a:prstGeom>
+          <a:noFill/>
+        </p:spPr>
+        <p:txBody>
+          <a:bodyPr wrap="square" rtlCol="0">
+            <a:spAutoFit/>
+          </a:bodyPr>
+          <a:lstStyle/>
+          <a:p>
+            <a:r>
+              <a:rPr lang="en-US" sz="1100" dirty="0" smtClean="0"/>
+              <a:t>Lost enemy</a:t>
+            </a:r>
+            <a:endParaRPr lang="en-US" sz="1100" dirty="0"/>
+          </a:p>
+        </p:txBody>
+      </p:sp>
+      <p:sp>
+        <p:nvSpPr>
+          <p:cNvPr id="53" name="Rounded Rectangle 52"/>
+          <p:cNvSpPr/>
+          <p:nvPr/>
+        </p:nvSpPr>
+        <p:spPr>
+          <a:xfrm>
+            <a:off x="790900" y="4134214"/>
+            <a:ext cx="2028407" cy="890548"/>
+          </a:xfrm>
+          <a:prstGeom prst="roundRect">
+            <a:avLst/>
+          </a:prstGeom>
+        </p:spPr>
+        <p:style>
+          <a:lnRef idx="2">
+            <a:schemeClr val="accent6">
+              <a:shade val="50000"/>
+            </a:schemeClr>
+          </a:lnRef>
+          <a:fillRef idx="1">
+            <a:schemeClr val="accent6"/>
+          </a:fillRef>
+          <a:effectRef idx="0">
+            <a:schemeClr val="accent6"/>
+          </a:effectRef>
+          <a:fontRef idx="minor">
+            <a:schemeClr val="lt1"/>
+          </a:fontRef>
+        </p:style>
+        <p:txBody>
+          <a:bodyPr rtlCol="0" anchor="ctr"/>
+          <a:lstStyle/>
+          <a:p>
+            <a:pPr algn="ctr"/>
+            <a:r>
+              <a:rPr lang="en-US" sz="1600" dirty="0">
+                <a:latin typeface="Blackadder ITC" panose="04020505051007020D02" pitchFamily="82" charset="0"/>
+              </a:rPr>
+              <a:t>f</a:t>
+            </a:r>
+            <a:r>
+              <a:rPr lang="en-US" sz="1600" dirty="0" smtClean="0">
+                <a:latin typeface="Blackadder ITC" panose="04020505051007020D02" pitchFamily="82" charset="0"/>
+              </a:rPr>
+              <a:t>  </a:t>
+            </a:r>
+            <a:r>
+              <a:rPr lang="en-US" sz="1200" dirty="0" smtClean="0"/>
+              <a:t>= w</a:t>
+            </a:r>
+            <a:r>
+              <a:rPr lang="en-US" sz="1200" baseline="-25000" dirty="0" smtClean="0"/>
+              <a:t>1 </a:t>
+            </a:r>
+            <a:r>
+              <a:rPr lang="en-US" sz="1200" dirty="0" smtClean="0"/>
+              <a:t>× </a:t>
+            </a:r>
+            <a:r>
+              <a:rPr lang="en-US" sz="1200" dirty="0" err="1" smtClean="0"/>
+              <a:t>resourceCount</a:t>
+            </a:r>
+            <a:r>
+              <a:rPr lang="en-US" sz="1200" dirty="0" smtClean="0"/>
+              <a:t> + PENALTY × moved?   + w</a:t>
+            </a:r>
+            <a:r>
+              <a:rPr lang="en-US" sz="1200" baseline="-25000" dirty="0" smtClean="0"/>
+              <a:t>3 </a:t>
+            </a:r>
+            <a:r>
+              <a:rPr lang="en-US" sz="1200" dirty="0" smtClean="0"/>
+              <a:t>× </a:t>
+            </a:r>
+            <a:r>
+              <a:rPr lang="en-US" sz="1200" dirty="0" err="1" smtClean="0"/>
+              <a:t>distMoved</a:t>
+            </a:r>
+            <a:r>
+              <a:rPr lang="en-US" sz="1200" dirty="0" smtClean="0"/>
+              <a:t>          + w</a:t>
+            </a:r>
+            <a:r>
+              <a:rPr lang="en-US" sz="1200" baseline="-25000" dirty="0" smtClean="0"/>
+              <a:t>3 </a:t>
+            </a:r>
+            <a:r>
+              <a:rPr lang="en-US" sz="1200" dirty="0" smtClean="0"/>
+              <a:t>× </a:t>
+            </a:r>
+            <a:r>
+              <a:rPr lang="en-US" sz="1200" dirty="0" err="1" smtClean="0"/>
+              <a:t>healthPoints</a:t>
+            </a:r>
+            <a:r>
+              <a:rPr lang="en-US" sz="1200" dirty="0" smtClean="0"/>
+              <a:t> </a:t>
+            </a:r>
+            <a:endParaRPr lang="en-US" sz="1200" dirty="0"/>
+          </a:p>
+        </p:txBody>
+      </p:sp>
+      <p:sp>
+        <p:nvSpPr>
+          <p:cNvPr id="54" name="Rounded Rectangle 53"/>
+          <p:cNvSpPr/>
+          <p:nvPr/>
+        </p:nvSpPr>
+        <p:spPr>
+          <a:xfrm>
+            <a:off x="2778335" y="5559345"/>
+            <a:ext cx="6626703" cy="416891"/>
+          </a:xfrm>
+          <a:prstGeom prst="roundRect">
+            <a:avLst/>
+          </a:prstGeom>
+        </p:spPr>
+        <p:style>
+          <a:lnRef idx="2">
+            <a:schemeClr val="accent6">
+              <a:shade val="50000"/>
+            </a:schemeClr>
+          </a:lnRef>
+          <a:fillRef idx="1">
+            <a:schemeClr val="accent6"/>
+          </a:fillRef>
+          <a:effectRef idx="0">
+            <a:schemeClr val="accent6"/>
+          </a:effectRef>
+          <a:fontRef idx="minor">
+            <a:schemeClr val="lt1"/>
+          </a:fontRef>
+        </p:style>
+        <p:txBody>
+          <a:bodyPr rtlCol="0" anchor="ctr"/>
+          <a:lstStyle/>
+          <a:p>
+            <a:pPr algn="ctr"/>
+            <a:r>
+              <a:rPr lang="en-US" sz="1600" dirty="0">
+                <a:latin typeface="Blackadder ITC" panose="04020505051007020D02" pitchFamily="82" charset="0"/>
+              </a:rPr>
+              <a:t>f  </a:t>
+            </a:r>
+            <a:r>
+              <a:rPr lang="en-US" sz="1600" dirty="0" smtClean="0"/>
+              <a:t>+</a:t>
+            </a:r>
+            <a:r>
+              <a:rPr lang="en-US" sz="1200" dirty="0" smtClean="0"/>
+              <a:t>= </a:t>
+            </a:r>
+            <a:r>
+              <a:rPr lang="en-US" sz="1200" dirty="0" err="1" smtClean="0"/>
+              <a:t>gameScore</a:t>
+            </a:r>
+            <a:r>
+              <a:rPr lang="en-US" sz="1200" dirty="0" smtClean="0"/>
+              <a:t> + BONUS</a:t>
+            </a:r>
+            <a:r>
+              <a:rPr lang="en-US" sz="1200" dirty="0"/>
+              <a:t> ×</a:t>
+            </a:r>
+            <a:r>
+              <a:rPr lang="en-US" sz="1200" dirty="0" smtClean="0"/>
+              <a:t> win? - w1</a:t>
+            </a:r>
+            <a:r>
+              <a:rPr lang="en-US" sz="1200" dirty="0"/>
+              <a:t> </a:t>
+            </a:r>
+            <a:r>
+              <a:rPr lang="en-US" sz="1200" dirty="0" smtClean="0"/>
+              <a:t>× </a:t>
+            </a:r>
+            <a:r>
+              <a:rPr lang="en-US" sz="1200" dirty="0" err="1" smtClean="0"/>
+              <a:t>npcCount</a:t>
+            </a:r>
+            <a:r>
+              <a:rPr lang="en-US" sz="1200" dirty="0" smtClean="0"/>
+              <a:t> - PENALTY </a:t>
+            </a:r>
+            <a:r>
+              <a:rPr lang="en-US" sz="1200" dirty="0"/>
+              <a:t>× </a:t>
+            </a:r>
+            <a:r>
+              <a:rPr lang="en-US" sz="1200" dirty="0" smtClean="0"/>
+              <a:t>overlapping(enemy)?</a:t>
+            </a:r>
+            <a:endParaRPr lang="en-US" sz="1200" dirty="0"/>
+          </a:p>
+        </p:txBody>
+      </p:sp>
+      <p:sp>
+        <p:nvSpPr>
+          <p:cNvPr id="55" name="Rounded Rectangle 54"/>
+          <p:cNvSpPr/>
+          <p:nvPr/>
+        </p:nvSpPr>
+        <p:spPr>
+          <a:xfrm>
+            <a:off x="3554299" y="4133287"/>
+            <a:ext cx="2311663" cy="890548"/>
+          </a:xfrm>
+          <a:prstGeom prst="roundRect">
+            <a:avLst/>
+          </a:prstGeom>
+        </p:spPr>
+        <p:style>
+          <a:lnRef idx="2">
+            <a:schemeClr val="accent6">
+              <a:shade val="50000"/>
+            </a:schemeClr>
+          </a:lnRef>
+          <a:fillRef idx="1">
+            <a:schemeClr val="accent6"/>
+          </a:fillRef>
+          <a:effectRef idx="0">
+            <a:schemeClr val="accent6"/>
+          </a:effectRef>
+          <a:fontRef idx="minor">
+            <a:schemeClr val="lt1"/>
+          </a:fontRef>
+        </p:style>
+        <p:txBody>
+          <a:bodyPr rtlCol="0" anchor="ctr"/>
+          <a:lstStyle/>
+          <a:p>
+            <a:pPr algn="ctr"/>
+            <a:r>
+              <a:rPr lang="en-US" sz="1600" dirty="0">
+                <a:latin typeface="Blackadder ITC" panose="04020505051007020D02" pitchFamily="82" charset="0"/>
+              </a:rPr>
+              <a:t>f</a:t>
+            </a:r>
+            <a:r>
+              <a:rPr lang="en-US" sz="1600" dirty="0" smtClean="0">
+                <a:latin typeface="Blackadder ITC" panose="04020505051007020D02" pitchFamily="82" charset="0"/>
+              </a:rPr>
+              <a:t>  </a:t>
+            </a:r>
+            <a:r>
+              <a:rPr lang="en-US" sz="1200" dirty="0" smtClean="0"/>
+              <a:t>= - w</a:t>
+            </a:r>
+            <a:r>
+              <a:rPr lang="en-US" sz="1200" baseline="-25000" dirty="0" smtClean="0"/>
+              <a:t>3 </a:t>
+            </a:r>
+            <a:r>
+              <a:rPr lang="en-US" sz="1200" dirty="0" smtClean="0"/>
+              <a:t>× distance(Enemy) + w</a:t>
+            </a:r>
+            <a:r>
+              <a:rPr lang="en-US" sz="1200" baseline="-25000" dirty="0"/>
+              <a:t>1</a:t>
+            </a:r>
+            <a:r>
+              <a:rPr lang="en-US" sz="1200" baseline="-25000" dirty="0" smtClean="0"/>
+              <a:t> </a:t>
+            </a:r>
+            <a:r>
+              <a:rPr lang="en-US" sz="1200" dirty="0" smtClean="0"/>
+              <a:t>× </a:t>
+            </a:r>
+            <a:r>
+              <a:rPr lang="en-US" sz="1200" dirty="0" err="1" smtClean="0"/>
+              <a:t>resourceCount</a:t>
+            </a:r>
+            <a:endParaRPr lang="en-US" sz="1200" dirty="0"/>
+          </a:p>
+        </p:txBody>
+      </p:sp>
+      <p:sp>
+        <p:nvSpPr>
+          <p:cNvPr id="56" name="Rounded Rectangle 55"/>
+          <p:cNvSpPr/>
+          <p:nvPr/>
+        </p:nvSpPr>
+        <p:spPr>
+          <a:xfrm>
+            <a:off x="6395888" y="4133287"/>
+            <a:ext cx="2178769" cy="890548"/>
+          </a:xfrm>
+          <a:prstGeom prst="roundRect">
+            <a:avLst/>
+          </a:prstGeom>
+        </p:spPr>
+        <p:style>
+          <a:lnRef idx="2">
+            <a:schemeClr val="accent6">
+              <a:shade val="50000"/>
+            </a:schemeClr>
+          </a:lnRef>
+          <a:fillRef idx="1">
+            <a:schemeClr val="accent6"/>
+          </a:fillRef>
+          <a:effectRef idx="0">
+            <a:schemeClr val="accent6"/>
+          </a:effectRef>
+          <a:fontRef idx="minor">
+            <a:schemeClr val="lt1"/>
+          </a:fontRef>
+        </p:style>
+        <p:txBody>
+          <a:bodyPr rtlCol="0" anchor="ctr"/>
+          <a:lstStyle/>
+          <a:p>
+            <a:pPr algn="ctr"/>
+            <a:r>
+              <a:rPr lang="en-US" sz="1600" dirty="0">
+                <a:latin typeface="Blackadder ITC" panose="04020505051007020D02" pitchFamily="82" charset="0"/>
+              </a:rPr>
+              <a:t>f</a:t>
+            </a:r>
+            <a:r>
+              <a:rPr lang="en-US" sz="1600" dirty="0" smtClean="0">
+                <a:latin typeface="Blackadder ITC" panose="04020505051007020D02" pitchFamily="82" charset="0"/>
+              </a:rPr>
+              <a:t>  </a:t>
+            </a:r>
+            <a:r>
+              <a:rPr lang="en-US" sz="1200" dirty="0" smtClean="0"/>
+              <a:t>= w</a:t>
+            </a:r>
+            <a:r>
+              <a:rPr lang="en-US" sz="1200" baseline="-25000" dirty="0"/>
+              <a:t>3</a:t>
+            </a:r>
+            <a:r>
+              <a:rPr lang="en-US" sz="1200" baseline="-25000" dirty="0" smtClean="0"/>
+              <a:t> </a:t>
+            </a:r>
+            <a:r>
+              <a:rPr lang="en-US" sz="1200" dirty="0" smtClean="0"/>
+              <a:t>× distance(Enemy) + w</a:t>
+            </a:r>
+            <a:r>
+              <a:rPr lang="en-US" sz="1200" baseline="-25000" dirty="0"/>
+              <a:t>2</a:t>
+            </a:r>
+            <a:r>
+              <a:rPr lang="en-US" sz="1200" baseline="-25000" dirty="0" smtClean="0"/>
+              <a:t> </a:t>
+            </a:r>
+            <a:r>
+              <a:rPr lang="en-US" sz="1200" dirty="0" smtClean="0"/>
+              <a:t>× </a:t>
+            </a:r>
+            <a:r>
+              <a:rPr lang="en-US" sz="1200" dirty="0" err="1" smtClean="0"/>
+              <a:t>resourceCount</a:t>
+            </a:r>
+            <a:r>
+              <a:rPr lang="en-US" sz="1200" dirty="0" smtClean="0"/>
+              <a:t>       + w</a:t>
+            </a:r>
+            <a:r>
+              <a:rPr lang="en-US" sz="1200" baseline="-25000" dirty="0" smtClean="0"/>
+              <a:t>3 </a:t>
+            </a:r>
+            <a:r>
+              <a:rPr lang="en-US" sz="1200" dirty="0" smtClean="0"/>
+              <a:t>× </a:t>
+            </a:r>
+            <a:r>
+              <a:rPr lang="en-US" sz="1200" dirty="0" err="1" smtClean="0"/>
+              <a:t>healthPoints</a:t>
+            </a:r>
+            <a:r>
+              <a:rPr lang="en-US" sz="1200" dirty="0" smtClean="0"/>
+              <a:t> </a:t>
+            </a:r>
+            <a:endParaRPr lang="en-US" sz="1200" dirty="0"/>
+          </a:p>
+        </p:txBody>
+      </p:sp>
+      <p:sp>
+        <p:nvSpPr>
+          <p:cNvPr id="59" name="Rounded Rectangle 58"/>
+          <p:cNvSpPr/>
+          <p:nvPr/>
+        </p:nvSpPr>
+        <p:spPr>
+          <a:xfrm>
+            <a:off x="9309649" y="4133287"/>
+            <a:ext cx="2072349" cy="890548"/>
+          </a:xfrm>
+          <a:prstGeom prst="roundRect">
+            <a:avLst/>
+          </a:prstGeom>
+        </p:spPr>
+        <p:style>
+          <a:lnRef idx="2">
+            <a:schemeClr val="accent6">
+              <a:shade val="50000"/>
+            </a:schemeClr>
+          </a:lnRef>
+          <a:fillRef idx="1">
+            <a:schemeClr val="accent6"/>
+          </a:fillRef>
+          <a:effectRef idx="0">
+            <a:schemeClr val="accent6"/>
+          </a:effectRef>
+          <a:fontRef idx="minor">
+            <a:schemeClr val="lt1"/>
+          </a:fontRef>
+        </p:style>
+        <p:txBody>
+          <a:bodyPr rtlCol="0" anchor="ctr"/>
+          <a:lstStyle/>
+          <a:p>
+            <a:pPr algn="ctr"/>
+            <a:r>
+              <a:rPr lang="en-US" sz="1600" dirty="0">
+                <a:latin typeface="Blackadder ITC" panose="04020505051007020D02" pitchFamily="82" charset="0"/>
+              </a:rPr>
+              <a:t>f</a:t>
+            </a:r>
+            <a:r>
+              <a:rPr lang="en-US" sz="1600" dirty="0" smtClean="0">
+                <a:latin typeface="Blackadder ITC" panose="04020505051007020D02" pitchFamily="82" charset="0"/>
+              </a:rPr>
+              <a:t>  </a:t>
+            </a:r>
+            <a:r>
+              <a:rPr lang="en-US" sz="1200" dirty="0" smtClean="0"/>
+              <a:t>= w</a:t>
+            </a:r>
+            <a:r>
+              <a:rPr lang="en-US" sz="1200" baseline="-25000" dirty="0"/>
+              <a:t>3</a:t>
+            </a:r>
+            <a:r>
+              <a:rPr lang="en-US" sz="1200" baseline="-25000" dirty="0" smtClean="0"/>
+              <a:t> </a:t>
+            </a:r>
+            <a:r>
+              <a:rPr lang="en-US" sz="1200" dirty="0" smtClean="0"/>
+              <a:t>× </a:t>
+            </a:r>
+            <a:r>
+              <a:rPr lang="en-US" sz="1200" dirty="0" err="1" smtClean="0"/>
+              <a:t>resourceCount</a:t>
+            </a:r>
+            <a:r>
+              <a:rPr lang="en-US" sz="1200" dirty="0" smtClean="0"/>
+              <a:t> + w</a:t>
+            </a:r>
+            <a:r>
+              <a:rPr lang="en-US" sz="1200" baseline="-25000" dirty="0"/>
+              <a:t>2</a:t>
+            </a:r>
+            <a:r>
+              <a:rPr lang="en-US" sz="1200" baseline="-25000" dirty="0" smtClean="0"/>
+              <a:t> </a:t>
+            </a:r>
+            <a:r>
+              <a:rPr lang="en-US" sz="1200" dirty="0" smtClean="0"/>
+              <a:t>× </a:t>
+            </a:r>
+            <a:r>
+              <a:rPr lang="en-US" sz="1200" dirty="0" err="1" smtClean="0"/>
+              <a:t>healthPoints</a:t>
+            </a:r>
+            <a:r>
+              <a:rPr lang="en-US" sz="1200" dirty="0" smtClean="0"/>
+              <a:t> </a:t>
+            </a:r>
+            <a:endParaRPr lang="en-US" sz="1200" dirty="0"/>
+          </a:p>
+        </p:txBody>
+      </p:sp>
+      <p:sp>
+        <p:nvSpPr>
+          <p:cNvPr id="60" name="TextBox 59"/>
+          <p:cNvSpPr txBox="1"/>
+          <p:nvPr/>
+        </p:nvSpPr>
+        <p:spPr>
+          <a:xfrm>
+            <a:off x="5326093" y="6337169"/>
+            <a:ext cx="1462177" cy="369332"/>
+          </a:xfrm>
+          <a:prstGeom prst="rect">
+            <a:avLst/>
+          </a:prstGeom>
+          <a:noFill/>
+        </p:spPr>
+        <p:txBody>
+          <a:bodyPr wrap="square" rtlCol="0">
+            <a:spAutoFit/>
+          </a:bodyPr>
+          <a:lstStyle/>
+          <a:p>
+            <a:r>
+              <a:rPr lang="en-US" dirty="0" smtClean="0"/>
+              <a:t>Final Fitness</a:t>
+            </a:r>
+            <a:endParaRPr lang="en-US" dirty="0"/>
+          </a:p>
+        </p:txBody>
+      </p:sp>
+      <p:cxnSp>
+        <p:nvCxnSpPr>
+          <p:cNvPr id="62" name="Straight Arrow Connector 61"/>
+          <p:cNvCxnSpPr/>
+          <p:nvPr/>
+        </p:nvCxnSpPr>
+        <p:spPr>
+          <a:xfrm>
+            <a:off x="2023252" y="2855343"/>
+            <a:ext cx="0" cy="1223408"/>
+          </a:xfrm>
+          <a:prstGeom prst="straightConnector1">
+            <a:avLst/>
+          </a:prstGeom>
+          <a:ln>
+            <a:tailEnd type="triangle"/>
+          </a:ln>
+        </p:spPr>
+        <p:style>
+          <a:lnRef idx="1">
+            <a:schemeClr val="accent6"/>
+          </a:lnRef>
+          <a:fillRef idx="0">
+            <a:schemeClr val="accent6"/>
+          </a:fillRef>
+          <a:effectRef idx="0">
+            <a:schemeClr val="accent6"/>
+          </a:effectRef>
+          <a:fontRef idx="minor">
+            <a:schemeClr val="tx1"/>
+          </a:fontRef>
+        </p:style>
+      </p:cxnSp>
+      <p:cxnSp>
+        <p:nvCxnSpPr>
+          <p:cNvPr id="63" name="Straight Arrow Connector 62"/>
+          <p:cNvCxnSpPr/>
+          <p:nvPr/>
+        </p:nvCxnSpPr>
+        <p:spPr>
+          <a:xfrm>
+            <a:off x="5143139" y="2855343"/>
+            <a:ext cx="0" cy="1223408"/>
+          </a:xfrm>
+          <a:prstGeom prst="straightConnector1">
+            <a:avLst/>
+          </a:prstGeom>
+          <a:ln>
+            <a:tailEnd type="triangle"/>
+          </a:ln>
+        </p:spPr>
+        <p:style>
+          <a:lnRef idx="1">
+            <a:schemeClr val="accent6"/>
+          </a:lnRef>
+          <a:fillRef idx="0">
+            <a:schemeClr val="accent6"/>
+          </a:fillRef>
+          <a:effectRef idx="0">
+            <a:schemeClr val="accent6"/>
+          </a:effectRef>
+          <a:fontRef idx="minor">
+            <a:schemeClr val="tx1"/>
+          </a:fontRef>
+        </p:style>
+      </p:cxnSp>
+      <p:cxnSp>
+        <p:nvCxnSpPr>
+          <p:cNvPr id="64" name="Straight Arrow Connector 63"/>
+          <p:cNvCxnSpPr/>
+          <p:nvPr/>
+        </p:nvCxnSpPr>
+        <p:spPr>
+          <a:xfrm>
+            <a:off x="7814452" y="2855343"/>
+            <a:ext cx="0" cy="1223408"/>
+          </a:xfrm>
+          <a:prstGeom prst="straightConnector1">
+            <a:avLst/>
+          </a:prstGeom>
+          <a:ln>
+            <a:tailEnd type="triangle"/>
+          </a:ln>
+        </p:spPr>
+        <p:style>
+          <a:lnRef idx="1">
+            <a:schemeClr val="accent6"/>
+          </a:lnRef>
+          <a:fillRef idx="0">
+            <a:schemeClr val="accent6"/>
+          </a:fillRef>
+          <a:effectRef idx="0">
+            <a:schemeClr val="accent6"/>
+          </a:effectRef>
+          <a:fontRef idx="minor">
+            <a:schemeClr val="tx1"/>
+          </a:fontRef>
+        </p:style>
+      </p:cxnSp>
+      <p:cxnSp>
+        <p:nvCxnSpPr>
+          <p:cNvPr id="65" name="Straight Arrow Connector 64"/>
+          <p:cNvCxnSpPr/>
+          <p:nvPr/>
+        </p:nvCxnSpPr>
+        <p:spPr>
+          <a:xfrm>
+            <a:off x="10451260" y="2837676"/>
+            <a:ext cx="0" cy="1223408"/>
+          </a:xfrm>
+          <a:prstGeom prst="straightConnector1">
+            <a:avLst/>
+          </a:prstGeom>
+          <a:ln>
+            <a:tailEnd type="triangle"/>
+          </a:ln>
+        </p:spPr>
+        <p:style>
+          <a:lnRef idx="1">
+            <a:schemeClr val="accent6"/>
+          </a:lnRef>
+          <a:fillRef idx="0">
+            <a:schemeClr val="accent6"/>
+          </a:fillRef>
+          <a:effectRef idx="0">
+            <a:schemeClr val="accent6"/>
+          </a:effectRef>
+          <a:fontRef idx="minor">
+            <a:schemeClr val="tx1"/>
+          </a:fontRef>
+        </p:style>
+      </p:cxnSp>
+      <p:cxnSp>
+        <p:nvCxnSpPr>
+          <p:cNvPr id="66" name="Straight Arrow Connector 65"/>
+          <p:cNvCxnSpPr/>
+          <p:nvPr/>
+        </p:nvCxnSpPr>
+        <p:spPr>
+          <a:xfrm>
+            <a:off x="6057182" y="5279366"/>
+            <a:ext cx="0" cy="279979"/>
+          </a:xfrm>
+          <a:prstGeom prst="straightConnector1">
+            <a:avLst/>
+          </a:prstGeom>
+          <a:ln>
+            <a:tailEnd type="triangle"/>
+          </a:ln>
+        </p:spPr>
+        <p:style>
+          <a:lnRef idx="1">
+            <a:schemeClr val="accent6"/>
+          </a:lnRef>
+          <a:fillRef idx="0">
+            <a:schemeClr val="accent6"/>
+          </a:fillRef>
+          <a:effectRef idx="0">
+            <a:schemeClr val="accent6"/>
+          </a:effectRef>
+          <a:fontRef idx="minor">
+            <a:schemeClr val="tx1"/>
+          </a:fontRef>
+        </p:style>
+      </p:cxnSp>
+      <p:cxnSp>
+        <p:nvCxnSpPr>
+          <p:cNvPr id="70" name="Straight Connector 69"/>
+          <p:cNvCxnSpPr>
+            <a:stCxn id="53" idx="2"/>
+          </p:cNvCxnSpPr>
+          <p:nvPr/>
+        </p:nvCxnSpPr>
+        <p:spPr>
+          <a:xfrm>
+            <a:off x="1805104" y="5024762"/>
+            <a:ext cx="0" cy="265691"/>
+          </a:xfrm>
+          <a:prstGeom prst="line">
+            <a:avLst/>
+          </a:prstGeom>
+        </p:spPr>
+        <p:style>
+          <a:lnRef idx="1">
+            <a:schemeClr val="accent6"/>
+          </a:lnRef>
+          <a:fillRef idx="0">
+            <a:schemeClr val="accent6"/>
+          </a:fillRef>
+          <a:effectRef idx="0">
+            <a:schemeClr val="accent6"/>
+          </a:effectRef>
+          <a:fontRef idx="minor">
+            <a:schemeClr val="tx1"/>
+          </a:fontRef>
+        </p:style>
+      </p:cxnSp>
+      <p:cxnSp>
+        <p:nvCxnSpPr>
+          <p:cNvPr id="72" name="Straight Connector 71"/>
+          <p:cNvCxnSpPr>
+            <a:stCxn id="59" idx="2"/>
+          </p:cNvCxnSpPr>
+          <p:nvPr/>
+        </p:nvCxnSpPr>
+        <p:spPr>
+          <a:xfrm flipH="1">
+            <a:off x="10345823" y="5023835"/>
+            <a:ext cx="1" cy="255531"/>
+          </a:xfrm>
+          <a:prstGeom prst="line">
+            <a:avLst/>
+          </a:prstGeom>
+        </p:spPr>
+        <p:style>
+          <a:lnRef idx="1">
+            <a:schemeClr val="accent6"/>
+          </a:lnRef>
+          <a:fillRef idx="0">
+            <a:schemeClr val="accent6"/>
+          </a:fillRef>
+          <a:effectRef idx="0">
+            <a:schemeClr val="accent6"/>
+          </a:effectRef>
+          <a:fontRef idx="minor">
+            <a:schemeClr val="tx1"/>
+          </a:fontRef>
+        </p:style>
+      </p:cxnSp>
+      <p:cxnSp>
+        <p:nvCxnSpPr>
+          <p:cNvPr id="76" name="Straight Connector 75"/>
+          <p:cNvCxnSpPr/>
+          <p:nvPr/>
+        </p:nvCxnSpPr>
+        <p:spPr>
+          <a:xfrm flipH="1">
+            <a:off x="1805103" y="5279366"/>
+            <a:ext cx="8540720" cy="0"/>
+          </a:xfrm>
+          <a:prstGeom prst="line">
+            <a:avLst/>
+          </a:prstGeom>
+        </p:spPr>
+        <p:style>
+          <a:lnRef idx="1">
+            <a:schemeClr val="accent6"/>
+          </a:lnRef>
+          <a:fillRef idx="0">
+            <a:schemeClr val="accent6"/>
+          </a:fillRef>
+          <a:effectRef idx="0">
+            <a:schemeClr val="accent6"/>
+          </a:effectRef>
+          <a:fontRef idx="minor">
+            <a:schemeClr val="tx1"/>
+          </a:fontRef>
+        </p:style>
+      </p:cxnSp>
+      <p:cxnSp>
+        <p:nvCxnSpPr>
+          <p:cNvPr id="78" name="Straight Connector 77"/>
+          <p:cNvCxnSpPr/>
+          <p:nvPr/>
+        </p:nvCxnSpPr>
+        <p:spPr>
+          <a:xfrm>
+            <a:off x="4710130" y="5024762"/>
+            <a:ext cx="0" cy="265691"/>
+          </a:xfrm>
+          <a:prstGeom prst="line">
+            <a:avLst/>
+          </a:prstGeom>
+        </p:spPr>
+        <p:style>
+          <a:lnRef idx="1">
+            <a:schemeClr val="accent6"/>
+          </a:lnRef>
+          <a:fillRef idx="0">
+            <a:schemeClr val="accent6"/>
+          </a:fillRef>
+          <a:effectRef idx="0">
+            <a:schemeClr val="accent6"/>
+          </a:effectRef>
+          <a:fontRef idx="minor">
+            <a:schemeClr val="tx1"/>
+          </a:fontRef>
+        </p:style>
+      </p:cxnSp>
+      <p:cxnSp>
+        <p:nvCxnSpPr>
+          <p:cNvPr id="79" name="Straight Connector 78"/>
+          <p:cNvCxnSpPr/>
+          <p:nvPr/>
+        </p:nvCxnSpPr>
+        <p:spPr>
+          <a:xfrm>
+            <a:off x="7506419" y="5024762"/>
+            <a:ext cx="0" cy="265691"/>
+          </a:xfrm>
+          <a:prstGeom prst="line">
+            <a:avLst/>
+          </a:prstGeom>
+        </p:spPr>
+        <p:style>
+          <a:lnRef idx="1">
+            <a:schemeClr val="accent6"/>
+          </a:lnRef>
+          <a:fillRef idx="0">
+            <a:schemeClr val="accent6"/>
+          </a:fillRef>
+          <a:effectRef idx="0">
+            <a:schemeClr val="accent6"/>
+          </a:effectRef>
+          <a:fontRef idx="minor">
+            <a:schemeClr val="tx1"/>
+          </a:fontRef>
+        </p:style>
+      </p:cxnSp>
+      <p:cxnSp>
+        <p:nvCxnSpPr>
+          <p:cNvPr id="80" name="Straight Arrow Connector 79"/>
+          <p:cNvCxnSpPr/>
+          <p:nvPr/>
+        </p:nvCxnSpPr>
+        <p:spPr>
+          <a:xfrm>
+            <a:off x="6048147" y="5976236"/>
+            <a:ext cx="0" cy="277915"/>
+          </a:xfrm>
+          <a:prstGeom prst="straightConnector1">
+            <a:avLst/>
+          </a:prstGeom>
+          <a:ln>
+            <a:tailEnd type="triangle"/>
+          </a:ln>
+        </p:spPr>
+        <p:style>
+          <a:lnRef idx="1">
+            <a:schemeClr val="accent6"/>
+          </a:lnRef>
+          <a:fillRef idx="0">
+            <a:schemeClr val="accent6"/>
+          </a:fillRef>
+          <a:effectRef idx="0">
+            <a:schemeClr val="accent6"/>
+          </a:effectRef>
+          <a:fontRef idx="minor">
+            <a:schemeClr val="tx1"/>
+          </a:fontRef>
+        </p:style>
+      </p:cxnSp>
     </p:spTree>
     <p:extLst>
       <p:ext uri="{BB962C8B-B14F-4D97-AF65-F5344CB8AC3E}">
@@ -6127,12 +7876,116 @@
             <p:ph idx="1"/>
           </p:nvPr>
         </p:nvSpPr>
-        <p:spPr/>
+        <p:spPr>
+          <a:xfrm>
+            <a:off x="818712" y="2222287"/>
+            <a:ext cx="10554574" cy="3833456"/>
+          </a:xfrm>
+        </p:spPr>
         <p:txBody>
           <a:bodyPr/>
           <a:lstStyle/>
           <a:p>
-            <a:endParaRPr lang="en-US"/>
+            <a:r>
+              <a:rPr lang="en-US" dirty="0" smtClean="0"/>
+              <a:t>Game - success! (Sort of …)</a:t>
+            </a:r>
+          </a:p>
+          <a:p>
+            <a:pPr lvl="1">
+              <a:buFont typeface="Arial" panose="020B0604020202020204" pitchFamily="34" charset="0"/>
+              <a:buChar char="•"/>
+            </a:pPr>
+            <a:r>
+              <a:rPr lang="en-US" dirty="0" smtClean="0"/>
+              <a:t>Fog of war!</a:t>
+            </a:r>
+          </a:p>
+          <a:p>
+            <a:pPr lvl="1">
+              <a:buFont typeface="Arial" panose="020B0604020202020204" pitchFamily="34" charset="0"/>
+              <a:buChar char="•"/>
+            </a:pPr>
+            <a:r>
+              <a:rPr lang="en-US" dirty="0" smtClean="0"/>
+              <a:t>Killer puppies!</a:t>
+            </a:r>
+          </a:p>
+          <a:p>
+            <a:pPr lvl="1">
+              <a:buFont typeface="Arial" panose="020B0604020202020204" pitchFamily="34" charset="0"/>
+              <a:buChar char="•"/>
+            </a:pPr>
+            <a:r>
+              <a:rPr lang="en-US" dirty="0" smtClean="0"/>
+              <a:t>Life and death!</a:t>
+            </a:r>
+          </a:p>
+          <a:p>
+            <a:pPr lvl="1">
+              <a:buFont typeface="Arial" panose="020B0604020202020204" pitchFamily="34" charset="0"/>
+              <a:buChar char="•"/>
+            </a:pPr>
+            <a:r>
+              <a:rPr lang="en-US" dirty="0" smtClean="0"/>
+              <a:t>Where did that tree come from?!</a:t>
+            </a:r>
+          </a:p>
+          <a:p>
+            <a:pPr lvl="1">
+              <a:buFont typeface="Arial" panose="020B0604020202020204" pitchFamily="34" charset="0"/>
+              <a:buChar char="•"/>
+            </a:pPr>
+            <a:r>
+              <a:rPr lang="en-US" dirty="0" smtClean="0"/>
+              <a:t>Om nom </a:t>
+            </a:r>
+            <a:r>
+              <a:rPr lang="en-US" dirty="0" err="1" smtClean="0"/>
+              <a:t>nom</a:t>
+            </a:r>
+            <a:r>
+              <a:rPr lang="en-US" dirty="0" smtClean="0"/>
+              <a:t> butterfly!</a:t>
+            </a:r>
+            <a:endParaRPr lang="en-US" dirty="0" smtClean="0"/>
+          </a:p>
+          <a:p>
+            <a:r>
+              <a:rPr lang="en-US" dirty="0" smtClean="0"/>
+              <a:t>AI - success! (Sort of …)</a:t>
+            </a:r>
+          </a:p>
+          <a:p>
+            <a:pPr lvl="1">
+              <a:buFont typeface="Arial" panose="020B0604020202020204" pitchFamily="34" charset="0"/>
+              <a:buChar char="•"/>
+            </a:pPr>
+            <a:r>
+              <a:rPr lang="en-US" dirty="0" smtClean="0"/>
+              <a:t>Still too general and doesn’t know puppies are bad</a:t>
+            </a:r>
+          </a:p>
+          <a:p>
+            <a:pPr lvl="1">
+              <a:buFont typeface="Arial" panose="020B0604020202020204" pitchFamily="34" charset="0"/>
+              <a:buChar char="•"/>
+            </a:pPr>
+            <a:r>
+              <a:rPr lang="en-US" dirty="0" smtClean="0"/>
+              <a:t>Ignores FSM awesomeness and does what it pleases (i.e. hit trees with sticks)</a:t>
+            </a:r>
+          </a:p>
+          <a:p>
+            <a:pPr lvl="1">
+              <a:buFont typeface="Arial" panose="020B0604020202020204" pitchFamily="34" charset="0"/>
+              <a:buChar char="•"/>
+            </a:pPr>
+            <a:r>
+              <a:rPr lang="en-US" dirty="0" smtClean="0"/>
+              <a:t>Game too expensive for many generations to be iterated through in real time</a:t>
+            </a:r>
+            <a:endParaRPr lang="en-US" dirty="0"/>
           </a:p>
         </p:txBody>
       </p:sp>
@@ -6227,7 +8080,38 @@
           <a:bodyPr/>
           <a:lstStyle/>
           <a:p>
-            <a:endParaRPr lang="en-US"/>
+            <a:r>
+              <a:rPr lang="en-US" dirty="0" smtClean="0"/>
+              <a:t>Optimize engine performance to support large and heavy games</a:t>
+            </a:r>
+          </a:p>
+          <a:p>
+            <a:r>
+              <a:rPr lang="en-US" dirty="0" smtClean="0"/>
+              <a:t>Automatic map adjustment for fully connected maze</a:t>
+            </a:r>
+            <a:endParaRPr lang="en-US" dirty="0" smtClean="0"/>
+          </a:p>
+          <a:p>
+            <a:r>
+              <a:rPr lang="en-US" dirty="0" smtClean="0"/>
+              <a:t>Expand game to more than 2 players</a:t>
+            </a:r>
+          </a:p>
+          <a:p>
+            <a:r>
+              <a:rPr lang="en-US" dirty="0" smtClean="0"/>
+              <a:t>Test GVGAI agents on this more complex challenge and </a:t>
+            </a:r>
+            <a:r>
+              <a:rPr lang="en-US" dirty="0" err="1" smtClean="0"/>
+              <a:t>analyse</a:t>
+            </a:r>
+            <a:r>
+              <a:rPr lang="en-US" dirty="0" smtClean="0"/>
+              <a:t> their performance</a:t>
+            </a:r>
+            <a:endParaRPr lang="en-US" dirty="0"/>
           </a:p>
         </p:txBody>
       </p:sp>
@@ -7349,7 +9233,7 @@
         <p:spPr/>
         <p:txBody>
           <a:bodyPr>
-            <a:normAutofit fontScale="70000" lnSpcReduction="20000"/>
+            <a:normAutofit fontScale="62500" lnSpcReduction="20000"/>
           </a:bodyPr>
           <a:lstStyle/>
           <a:p>
@@ -7382,7 +9266,15 @@
           <a:p>
             <a:r>
               <a:rPr lang="en-US" dirty="0" smtClean="0"/>
-              <a:t>Partial observability: fog of war.</a:t>
+              <a:t>Partial observability: </a:t>
+            </a:r>
+            <a:r>
+              <a:rPr lang="en-US" u="sng" dirty="0" smtClean="0"/>
+              <a:t>fog of war</a:t>
+            </a:r>
+            <a:r>
+              <a:rPr lang="en-US" dirty="0" smtClean="0"/>
+              <a:t>.</a:t>
             </a:r>
           </a:p>
           <a:p>
@@ -7398,7 +9290,11 @@
             </a:pPr>
             <a:r>
               <a:rPr lang="en-US" dirty="0" smtClean="0"/>
-              <a:t>Decreased over time</a:t>
+              <a:t>Decreased over </a:t>
+            </a:r>
+            <a:r>
+              <a:rPr lang="en-US" dirty="0" smtClean="0"/>
+              <a:t>time</a:t>
             </a:r>
           </a:p>
           <a:p>
@@ -7407,6 +9303,25 @@
               <a:buChar char="§"/>
             </a:pPr>
             <a:r>
+              <a:rPr lang="en-US" dirty="0" smtClean="0">
+                <a:solidFill>
+                  <a:schemeClr val="accent5"/>
+                </a:solidFill>
+              </a:rPr>
+              <a:t>+ Decreased by killer puppies! (spawned in regular intervals 3 at a time chasing each player)</a:t>
+            </a:r>
+            <a:endParaRPr lang="en-US" dirty="0" smtClean="0">
+              <a:solidFill>
+                <a:schemeClr val="accent5"/>
+              </a:solidFill>
+            </a:endParaRPr>
+          </a:p>
+          <a:p>
+            <a:pPr lvl="1">
+              <a:buFont typeface="Wingdings" panose="05000000000000000000" pitchFamily="2" charset="2"/>
+              <a:buChar char="§"/>
+            </a:pPr>
+            <a:r>
               <a:rPr lang="en-US" dirty="0" smtClean="0"/>
               <a:t>To increase: </a:t>
             </a:r>
@@ -7418,11 +9333,23 @@
             </a:pPr>
             <a:r>
               <a:rPr lang="en-US" dirty="0" smtClean="0"/>
-              <a:t>Kill and eat forest animals (most) - but they leave </a:t>
+              <a:t>Kill and eat forest </a:t>
+            </a:r>
+            <a:r>
+              <a:rPr lang="en-US" dirty="0" smtClean="0"/>
+              <a:t>animals {Random NPCs} </a:t>
+            </a:r>
+            <a:r>
+              <a:rPr lang="en-US" dirty="0" smtClean="0"/>
+              <a:t>(most) - but they leave </a:t>
             </a:r>
             <a:r>
               <a:rPr lang="en-US" dirty="0"/>
-              <a:t>signals when killed.</a:t>
+              <a:t>signals when killed</a:t>
+            </a:r>
+            <a:r>
+              <a:rPr lang="en-US" dirty="0" smtClean="0"/>
+              <a:t>.</a:t>
             </a:r>
             <a:endParaRPr lang="en-US" dirty="0" smtClean="0"/>
           </a:p>
@@ -7552,8 +9479,8 @@
         </p:nvCxnSpPr>
         <p:spPr>
           <a:xfrm>
-            <a:off x="3209026" y="2484408"/>
-            <a:ext cx="5020574" cy="759124"/>
+            <a:off x="2846716" y="2539535"/>
+            <a:ext cx="5287993" cy="722940"/>
           </a:xfrm>
           <a:prstGeom prst="straightConnector1">
             <a:avLst/>
@@ -7585,8 +9512,8 @@
         </p:nvCxnSpPr>
         <p:spPr>
           <a:xfrm flipV="1">
-            <a:off x="3269411" y="3861426"/>
-            <a:ext cx="4899804" cy="563925"/>
+            <a:off x="3131388" y="4040542"/>
+            <a:ext cx="5003321" cy="457568"/>
           </a:xfrm>
           <a:prstGeom prst="straightConnector1">
             <a:avLst/>
@@ -7618,8 +9545,8 @@
         </p:nvCxnSpPr>
         <p:spPr>
           <a:xfrm flipV="1">
-            <a:off x="2191109" y="4040542"/>
-            <a:ext cx="5943600" cy="807503"/>
+            <a:off x="2191109" y="4143388"/>
+            <a:ext cx="5943600" cy="704658"/>
           </a:xfrm>
           <a:prstGeom prst="straightConnector1">
             <a:avLst/>
@@ -7651,8 +9578,8 @@
         </p:nvCxnSpPr>
         <p:spPr>
           <a:xfrm flipV="1">
-            <a:off x="2743200" y="4252823"/>
-            <a:ext cx="5426015" cy="905773"/>
+            <a:off x="2717321" y="4324228"/>
+            <a:ext cx="5417388" cy="859348"/>
           </a:xfrm>
           <a:prstGeom prst="straightConnector1">
             <a:avLst/>
@@ -8559,7 +10486,11 @@
           <a:p>
             <a:r>
               <a:rPr lang="en-US" dirty="0" smtClean="0"/>
-              <a:t>Play Test #1 - The Game</a:t>
+              <a:t>Play Test #1 - </a:t>
+            </a:r>
+            <a:r>
+              <a:rPr lang="en-US" dirty="0" smtClean="0"/>
+              <a:t>Game v1</a:t>
             </a:r>
             <a:endParaRPr lang="en-US" dirty="0"/>
           </a:p>
@@ -8575,9 +10506,16 @@
             <p:ph idx="1"/>
           </p:nvPr>
         </p:nvSpPr>
-        <p:spPr/>
-        <p:txBody>
-          <a:bodyPr/>
+        <p:spPr>
+          <a:xfrm>
+            <a:off x="818711" y="2222287"/>
+            <a:ext cx="10637167" cy="3636511"/>
+          </a:xfrm>
+        </p:spPr>
+        <p:txBody>
+          <a:bodyPr>
+            <a:normAutofit/>
+          </a:bodyPr>
           <a:lstStyle/>
           <a:p>
             <a:r>
@@ -8702,7 +10640,15 @@
                   <a:schemeClr val="accent5"/>
                 </a:solidFill>
               </a:rPr>
-              <a:t>Maybe introduce prompts for special events</a:t>
+              <a:t>Prompts </a:t>
+            </a:r>
+            <a:r>
+              <a:rPr lang="en-US" sz="1200" b="1" dirty="0" smtClean="0">
+                <a:solidFill>
+                  <a:schemeClr val="accent5"/>
+                </a:solidFill>
+              </a:rPr>
+              <a:t>for special events</a:t>
             </a:r>
           </a:p>
           <a:p>
@@ -8711,22 +10657,40 @@
               <a:buChar char="Ø"/>
             </a:pPr>
             <a:r>
-              <a:rPr lang="en-US" sz="1200" dirty="0" smtClean="0">
-                <a:solidFill>
-                  <a:schemeClr val="accent5">
-                    <a:lumMod val="60000"/>
-                    <a:lumOff val="40000"/>
-                  </a:schemeClr>
+              <a:rPr lang="en-US" sz="1200" b="1" dirty="0" smtClean="0">
+                <a:solidFill>
+                  <a:schemeClr val="accent5"/>
                 </a:solidFill>
               </a:rPr>
-              <a:t>Maybe introduce timed events to provoke player interaction (i.e. food in the middle visible to all players)</a:t>
-            </a:r>
-            <a:endParaRPr lang="en-US" sz="1200" dirty="0">
+              <a:t>Timed </a:t>
+            </a:r>
+            <a:r>
+              <a:rPr lang="en-US" sz="1200" b="1" dirty="0" smtClean="0">
+                <a:solidFill>
+                  <a:schemeClr val="accent5"/>
+                </a:solidFill>
+              </a:rPr>
+              <a:t>events to provoke player </a:t>
+            </a:r>
+            <a:r>
+              <a:rPr lang="en-US" sz="1200" b="1" dirty="0" smtClean="0">
+                <a:solidFill>
+                  <a:schemeClr val="accent5"/>
+                </a:solidFill>
+              </a:rPr>
+              <a:t>interaction / spikes in gameplay </a:t>
+            </a:r>
+            <a:r>
+              <a:rPr lang="en-US" sz="1200" b="1" dirty="0" smtClean="0">
+                <a:solidFill>
+                  <a:schemeClr val="accent5"/>
+                </a:solidFill>
+              </a:rPr>
+              <a:t>(i.e. food in the middle visible to all players)</a:t>
+            </a:r>
+            <a:endParaRPr lang="en-US" sz="1200" b="1" dirty="0">
               <a:solidFill>
-                <a:schemeClr val="accent5">
-                  <a:lumMod val="60000"/>
-                  <a:lumOff val="40000"/>
-                </a:schemeClr>
+                <a:schemeClr val="accent5"/>
               </a:solidFill>
             </a:endParaRPr>
           </a:p>
@@ -8777,6 +10741,36 @@
           <a:prstGeom prst="rect">
             <a:avLst/>
           </a:prstGeom>
+          <a:solidFill>
+            <a:srgbClr val="FFFFFF">
+              <a:shade val="85000"/>
+            </a:srgbClr>
+          </a:solidFill>
+          <a:ln w="38100" cap="sq">
+            <a:solidFill>
+              <a:srgbClr val="FFFFFF"/>
+            </a:solidFill>
+            <a:miter lim="800000"/>
+          </a:ln>
+          <a:effectLst>
+            <a:outerShdw blurRad="55000" dist="18000" dir="5400000" algn="tl" rotWithShape="0">
+              <a:srgbClr val="000000">
+                <a:alpha val="40000"/>
+              </a:srgbClr>
+            </a:outerShdw>
+          </a:effectLst>
+          <a:scene3d>
+            <a:camera prst="orthographicFront"/>
+            <a:lightRig rig="twoPt" dir="t">
+              <a:rot lat="0" lon="0" rev="7200000"/>
+            </a:lightRig>
+          </a:scene3d>
+          <a:sp3d>
+            <a:bevelT w="25400" h="19050"/>
+            <a:contourClr>
+              <a:srgbClr val="FFFFFF"/>
+            </a:contourClr>
+          </a:sp3d>
         </p:spPr>
       </p:pic>
       <p:pic>
@@ -8801,6 +10795,36 @@
           <a:prstGeom prst="rect">
             <a:avLst/>
           </a:prstGeom>
+          <a:solidFill>
+            <a:srgbClr val="FFFFFF">
+              <a:shade val="85000"/>
+            </a:srgbClr>
+          </a:solidFill>
+          <a:ln w="38100" cap="sq">
+            <a:solidFill>
+              <a:srgbClr val="FFFFFF"/>
+            </a:solidFill>
+            <a:miter lim="800000"/>
+          </a:ln>
+          <a:effectLst>
+            <a:outerShdw blurRad="55000" dist="18000" dir="5400000" algn="tl" rotWithShape="0">
+              <a:srgbClr val="000000">
+                <a:alpha val="40000"/>
+              </a:srgbClr>
+            </a:outerShdw>
+          </a:effectLst>
+          <a:scene3d>
+            <a:camera prst="orthographicFront"/>
+            <a:lightRig rig="twoPt" dir="t">
+              <a:rot lat="0" lon="0" rev="7200000"/>
+            </a:lightRig>
+          </a:scene3d>
+          <a:sp3d>
+            <a:bevelT w="25400" h="19050"/>
+            <a:contourClr>
+              <a:srgbClr val="FFFFFF"/>
+            </a:contourClr>
+          </a:sp3d>
         </p:spPr>
       </p:pic>
       <p:cxnSp>
@@ -8839,6 +10863,60 @@
           </a:fontRef>
         </p:style>
       </p:cxnSp>
+      <p:pic>
+        <p:nvPicPr>
+          <p:cNvPr id="7" name="Picture 6"/>
+          <p:cNvPicPr>
+            <a:picLocks noChangeAspect="1"/>
+          </p:cNvPicPr>
+          <p:nvPr/>
+        </p:nvPicPr>
+        <p:blipFill>
+          <a:blip r:embed="rId4"/>
+          <a:stretch>
+            <a:fillRect/>
+          </a:stretch>
+        </p:blipFill>
+        <p:spPr>
+          <a:xfrm>
+            <a:off x="7985221" y="4395935"/>
+            <a:ext cx="1771650" cy="1095375"/>
+          </a:xfrm>
+          <a:prstGeom prst="rect">
+            <a:avLst/>
+          </a:prstGeom>
+          <a:solidFill>
+            <a:srgbClr val="FFFFFF">
+              <a:shade val="85000"/>
+            </a:srgbClr>
+          </a:solidFill>
+          <a:ln w="38100" cap="sq">
+            <a:solidFill>
+              <a:srgbClr val="FFFFFF"/>
+            </a:solidFill>
+            <a:miter lim="800000"/>
+          </a:ln>
+          <a:effectLst>
+            <a:outerShdw blurRad="55000" dist="18000" dir="5400000" algn="tl" rotWithShape="0">
+              <a:srgbClr val="000000">
+                <a:alpha val="40000"/>
+              </a:srgbClr>
+            </a:outerShdw>
+          </a:effectLst>
+          <a:scene3d>
+            <a:camera prst="orthographicFront"/>
+            <a:lightRig rig="twoPt" dir="t">
+              <a:rot lat="0" lon="0" rev="7200000"/>
+            </a:lightRig>
+          </a:scene3d>
+          <a:sp3d>
+            <a:bevelT w="25400" h="19050"/>
+            <a:contourClr>
+              <a:srgbClr val="FFFFFF"/>
+            </a:contourClr>
+          </a:sp3d>
+        </p:spPr>
+      </p:pic>
     </p:spTree>
     <p:extLst>
       <p:ext uri="{BB962C8B-B14F-4D97-AF65-F5344CB8AC3E}">
@@ -8933,7 +11011,15 @@
                   <a:schemeClr val="accent2"/>
                 </a:solidFill>
               </a:rPr>
-              <a:t>AI: dies too quickly to puppies.</a:t>
+              <a:t>AI </a:t>
+            </a:r>
+            <a:r>
+              <a:rPr lang="en-US" b="1" dirty="0" smtClean="0">
+                <a:solidFill>
+                  <a:schemeClr val="accent2"/>
+                </a:solidFill>
+              </a:rPr>
+              <a:t>dies too quickly to puppies.</a:t>
             </a:r>
           </a:p>
           <a:p>
@@ -8996,15 +11082,7 @@
                   <a:schemeClr val="accent1"/>
                 </a:solidFill>
               </a:rPr>
-              <a:t>Still c</a:t>
-            </a:r>
-            <a:r>
-              <a:rPr lang="en-US" dirty="0" smtClean="0">
-                <a:solidFill>
-                  <a:schemeClr val="accent1"/>
-                </a:solidFill>
-              </a:rPr>
-              <a:t>ool!</a:t>
+              <a:t>Still cool!</a:t>
             </a:r>
           </a:p>
           <a:p>

</xml_diff>

<commit_message>
Heuristic information updated in presentation
</commit_message>
<xml_diff>
--- a/docs/final presentation.pptx
+++ b/docs/final presentation.pptx
@@ -209,7 +209,7 @@
           <a:p>
             <a:fld id="{D442CA7A-1982-45F1-835E-FEE56F9E9630}" type="datetimeFigureOut">
               <a:rPr lang="en-US" smtClean="0"/>
-              <a:t>22-Feb-17</a:t>
+              <a:t>23-Feb-17</a:t>
             </a:fld>
             <a:endParaRPr lang="en-US"/>
           </a:p>
@@ -572,7 +572,7 @@
           <a:effectLst/>
           <a:extLst>
             <a:ext uri="{91240B29-F687-4f45-9708-019B960494DF}">
-              <a14:hiddenLine xmlns:a14="http://schemas.microsoft.com/office/drawing/2010/main" xmlns="" w="9525">
+              <a14:hiddenLine xmlns="" xmlns:a14="http://schemas.microsoft.com/office/drawing/2010/main" w="9525">
                 <a:solidFill>
                   <a:srgbClr val="000000"/>
                 </a:solidFill>
@@ -764,7 +764,7 @@
           <a:p>
             <a:fld id="{18D8D369-9589-40AD-B749-3BE541F1991F}" type="datetime1">
               <a:rPr lang="en-US" smtClean="0"/>
-              <a:t>22-Feb-17</a:t>
+              <a:t>23-Feb-17</a:t>
             </a:fld>
             <a:endParaRPr lang="en-US"/>
           </a:p>
@@ -1082,7 +1082,7 @@
           <a:p>
             <a:fld id="{1DE6F2FD-5C81-4CE8-9D27-50CECF3FF30C}" type="datetime1">
               <a:rPr lang="en-US" smtClean="0"/>
-              <a:t>22-Feb-17</a:t>
+              <a:t>23-Feb-17</a:t>
             </a:fld>
             <a:endParaRPr lang="en-US"/>
           </a:p>
@@ -1570,7 +1570,7 @@
           <a:p>
             <a:fld id="{4D68A474-1C38-4243-835F-E3E418E9DA9E}" type="datetime1">
               <a:rPr lang="en-US" smtClean="0"/>
-              <a:t>22-Feb-17</a:t>
+              <a:t>23-Feb-17</a:t>
             </a:fld>
             <a:endParaRPr lang="en-US"/>
           </a:p>
@@ -1939,7 +1939,7 @@
           <a:p>
             <a:fld id="{557FE227-51E7-462D-90AF-2815A8BA0A0F}" type="datetime1">
               <a:rPr lang="en-US" smtClean="0"/>
-              <a:t>22-Feb-17</a:t>
+              <a:t>23-Feb-17</a:t>
             </a:fld>
             <a:endParaRPr lang="en-US"/>
           </a:p>
@@ -2094,7 +2094,7 @@
           <a:ln/>
           <a:extLst>
             <a:ext uri="{91240B29-F687-4f45-9708-019B960494DF}">
-              <a14:hiddenLine xmlns:a14="http://schemas.microsoft.com/office/drawing/2010/main" xmlns="" w="9525">
+              <a14:hiddenLine xmlns="" xmlns:a14="http://schemas.microsoft.com/office/drawing/2010/main" w="9525">
                 <a:solidFill>
                   <a:srgbClr val="000000"/>
                 </a:solidFill>
@@ -2212,7 +2212,7 @@
           <a:p>
             <a:fld id="{4BC055D6-85DD-4EDC-9BFB-9158DB6372C5}" type="datetime1">
               <a:rPr lang="en-US" smtClean="0"/>
-              <a:t>22-Feb-17</a:t>
+              <a:t>23-Feb-17</a:t>
             </a:fld>
             <a:endParaRPr lang="en-US"/>
           </a:p>
@@ -2369,7 +2369,7 @@
           <a:ln/>
           <a:extLst>
             <a:ext uri="{91240B29-F687-4f45-9708-019B960494DF}">
-              <a14:hiddenLine xmlns:a14="http://schemas.microsoft.com/office/drawing/2010/main" xmlns="" w="9525">
+              <a14:hiddenLine xmlns="" xmlns:a14="http://schemas.microsoft.com/office/drawing/2010/main" w="9525">
                 <a:solidFill>
                   <a:srgbClr val="000000"/>
                 </a:solidFill>
@@ -2497,7 +2497,7 @@
           <a:p>
             <a:fld id="{A9F39C5F-B6B2-41D4-966E-904A1A2E96FE}" type="datetime1">
               <a:rPr lang="en-US" smtClean="0"/>
-              <a:t>22-Feb-17</a:t>
+              <a:t>23-Feb-17</a:t>
             </a:fld>
             <a:endParaRPr lang="en-US"/>
           </a:p>
@@ -2652,7 +2652,7 @@
           <a:ln/>
           <a:extLst>
             <a:ext uri="{91240B29-F687-4f45-9708-019B960494DF}">
-              <a14:hiddenLine xmlns:a14="http://schemas.microsoft.com/office/drawing/2010/main" xmlns="" w="9525">
+              <a14:hiddenLine xmlns="" xmlns:a14="http://schemas.microsoft.com/office/drawing/2010/main" w="9525">
                 <a:solidFill>
                   <a:srgbClr val="000000"/>
                 </a:solidFill>
@@ -2780,7 +2780,7 @@
           <a:p>
             <a:fld id="{6A9E077F-C15F-40A1-9081-FDBA9BEC3F4B}" type="datetime1">
               <a:rPr lang="en-US" smtClean="0"/>
-              <a:t>22-Feb-17</a:t>
+              <a:t>23-Feb-17</a:t>
             </a:fld>
             <a:endParaRPr lang="en-US"/>
           </a:p>
@@ -3123,7 +3123,7 @@
           <a:p>
             <a:fld id="{1E974925-3E08-41AA-A704-EB3A45C8F7CE}" type="datetime1">
               <a:rPr lang="en-US" smtClean="0"/>
-              <a:t>22-Feb-17</a:t>
+              <a:t>23-Feb-17</a:t>
             </a:fld>
             <a:endParaRPr lang="en-US"/>
           </a:p>
@@ -3278,7 +3278,7 @@
           <a:ln/>
           <a:extLst>
             <a:ext uri="{91240B29-F687-4f45-9708-019B960494DF}">
-              <a14:hiddenLine xmlns:a14="http://schemas.microsoft.com/office/drawing/2010/main" xmlns="" w="9525">
+              <a14:hiddenLine xmlns="" xmlns:a14="http://schemas.microsoft.com/office/drawing/2010/main" w="9525">
                 <a:solidFill>
                   <a:srgbClr val="000000"/>
                 </a:solidFill>
@@ -3462,7 +3462,7 @@
           <a:p>
             <a:fld id="{F5BAA5CC-156E-4131-A968-CEA934C47A7B}" type="datetime1">
               <a:rPr lang="en-US" smtClean="0"/>
-              <a:t>22-Feb-17</a:t>
+              <a:t>23-Feb-17</a:t>
             </a:fld>
             <a:endParaRPr lang="en-US"/>
           </a:p>
@@ -3617,7 +3617,7 @@
           <a:ln/>
           <a:extLst>
             <a:ext uri="{91240B29-F687-4f45-9708-019B960494DF}">
-              <a14:hiddenLine xmlns:a14="http://schemas.microsoft.com/office/drawing/2010/main" xmlns="" w="9525">
+              <a14:hiddenLine xmlns="" xmlns:a14="http://schemas.microsoft.com/office/drawing/2010/main" w="9525">
                 <a:solidFill>
                   <a:srgbClr val="000000"/>
                 </a:solidFill>
@@ -3939,7 +3939,7 @@
           <a:p>
             <a:fld id="{8A128004-700F-41A7-9B23-B44E720E8472}" type="datetime1">
               <a:rPr lang="en-US" smtClean="0"/>
-              <a:t>22-Feb-17</a:t>
+              <a:t>23-Feb-17</a:t>
             </a:fld>
             <a:endParaRPr lang="en-US"/>
           </a:p>
@@ -4094,7 +4094,7 @@
           <a:ln/>
           <a:extLst>
             <a:ext uri="{91240B29-F687-4f45-9708-019B960494DF}">
-              <a14:hiddenLine xmlns:a14="http://schemas.microsoft.com/office/drawing/2010/main" xmlns="" w="9525">
+              <a14:hiddenLine xmlns="" xmlns:a14="http://schemas.microsoft.com/office/drawing/2010/main" w="9525">
                 <a:solidFill>
                   <a:srgbClr val="000000"/>
                 </a:solidFill>
@@ -4160,7 +4160,7 @@
           <a:p>
             <a:fld id="{7A414D3B-2E17-4EF8-91FA-9556D2D939DA}" type="datetime1">
               <a:rPr lang="en-US" smtClean="0"/>
-              <a:t>22-Feb-17</a:t>
+              <a:t>23-Feb-17</a:t>
             </a:fld>
             <a:endParaRPr lang="en-US"/>
           </a:p>
@@ -4255,7 +4255,7 @@
           <a:p>
             <a:fld id="{A86E1A77-11D3-4388-ACF8-061C1A0CBF79}" type="datetime1">
               <a:rPr lang="en-US" smtClean="0"/>
-              <a:t>22-Feb-17</a:t>
+              <a:t>23-Feb-17</a:t>
             </a:fld>
             <a:endParaRPr lang="en-US"/>
           </a:p>
@@ -4523,7 +4523,7 @@
           <a:ln/>
           <a:extLst>
             <a:ext uri="{91240B29-F687-4f45-9708-019B960494DF}">
-              <a14:hiddenLine xmlns:a14="http://schemas.microsoft.com/office/drawing/2010/main" xmlns="" w="9525">
+              <a14:hiddenLine xmlns="" xmlns:a14="http://schemas.microsoft.com/office/drawing/2010/main" w="9525">
                 <a:solidFill>
                   <a:srgbClr val="000000"/>
                 </a:solidFill>
@@ -4722,7 +4722,7 @@
           <a:p>
             <a:fld id="{71280B3E-1203-486D-B2C8-658508DF6AE2}" type="datetime1">
               <a:rPr lang="en-US" smtClean="0"/>
-              <a:t>22-Feb-17</a:t>
+              <a:t>23-Feb-17</a:t>
             </a:fld>
             <a:endParaRPr lang="en-US"/>
           </a:p>
@@ -5035,7 +5035,7 @@
           <a:p>
             <a:fld id="{E298B48B-F629-4FDA-B979-1CF740029079}" type="datetime1">
               <a:rPr lang="en-US" smtClean="0"/>
-              <a:t>22-Feb-17</a:t>
+              <a:t>23-Feb-17</a:t>
             </a:fld>
             <a:endParaRPr lang="en-US"/>
           </a:p>
@@ -5305,7 +5305,7 @@
           <a:p>
             <a:fld id="{69ABDBB3-1493-4A91-8914-234560779987}" type="datetime1">
               <a:rPr lang="en-US" smtClean="0"/>
-              <a:t>22-Feb-17</a:t>
+              <a:t>23-Feb-17</a:t>
             </a:fld>
             <a:endParaRPr lang="en-US"/>
           </a:p>
@@ -6012,11 +6012,7 @@
           <a:p>
             <a:r>
               <a:rPr lang="en-US" dirty="0" smtClean="0"/>
-              <a:t>FSM &amp; Fitness </a:t>
-            </a:r>
-            <a:r>
-              <a:rPr lang="en-US" dirty="0" smtClean="0"/>
-              <a:t>Function</a:t>
+              <a:t>FSM &amp; Fitness Function</a:t>
             </a:r>
             <a:endParaRPr lang="en-US" dirty="0"/>
           </a:p>
@@ -6961,8 +6957,8 @@
         </p:nvSpPr>
         <p:spPr>
           <a:xfrm>
-            <a:off x="790900" y="4134214"/>
-            <a:ext cx="2028407" cy="890548"/>
+            <a:off x="485641" y="4100465"/>
+            <a:ext cx="2639684" cy="1069707"/>
           </a:xfrm>
           <a:prstGeom prst="roundRect">
             <a:avLst/>
@@ -7003,43 +6999,59 @@
             </a:r>
             <a:r>
               <a:rPr lang="en-US" sz="1200" dirty="0" smtClean="0"/>
-              <a:t>= w</a:t>
+              <a:t>= </a:t>
+            </a:r>
+            <a:r>
+              <a:rPr lang="en-US" sz="1200" dirty="0" err="1" smtClean="0"/>
+              <a:t>resourceCount</a:t>
+            </a:r>
+            <a:r>
+              <a:rPr lang="en-US" sz="1200" dirty="0" smtClean="0"/>
+              <a:t>                      - </a:t>
+            </a:r>
+            <a:r>
+              <a:rPr lang="en-US" sz="1200" dirty="0" smtClean="0"/>
+              <a:t>PENALTY × moved?  </a:t>
+            </a:r>
+            <a:r>
+              <a:rPr lang="en-US" sz="1200" dirty="0" smtClean="0"/>
+              <a:t>                  - w</a:t>
+            </a:r>
+            <a:r>
+              <a:rPr lang="en-US" sz="1200" baseline="-25000" dirty="0" smtClean="0"/>
+              <a:t>2 </a:t>
+            </a:r>
+            <a:r>
+              <a:rPr lang="en-US" sz="1200" dirty="0" smtClean="0"/>
+              <a:t>× </a:t>
+            </a:r>
+            <a:r>
+              <a:rPr lang="en-US" sz="1200" dirty="0" smtClean="0"/>
+              <a:t>distance(</a:t>
+            </a:r>
+            <a:r>
+              <a:rPr lang="en-US" sz="1200" dirty="0" err="1" smtClean="0"/>
+              <a:t>targetPosition</a:t>
+            </a:r>
+            <a:r>
+              <a:rPr lang="en-US" sz="1200" dirty="0" smtClean="0"/>
+              <a:t>)  + </a:t>
+            </a:r>
+            <a:r>
+              <a:rPr lang="en-US" sz="1200" dirty="0" err="1" smtClean="0"/>
+              <a:t>distMoved</a:t>
+            </a:r>
+            <a:r>
+              <a:rPr lang="en-US" sz="1200" dirty="0"/>
+              <a:t> </a:t>
+            </a:r>
+            <a:r>
+              <a:rPr lang="en-US" sz="1200" dirty="0" smtClean="0"/>
+              <a:t>+ w</a:t>
             </a:r>
             <a:r>
               <a:rPr lang="en-US" sz="1200" baseline="-25000" dirty="0" smtClean="0"/>
               <a:t>1 </a:t>
-            </a:r>
-            <a:r>
-              <a:rPr lang="en-US" sz="1200" dirty="0" smtClean="0"/>
-              <a:t>× </a:t>
-            </a:r>
-            <a:r>
-              <a:rPr lang="en-US" sz="1200" dirty="0" err="1" smtClean="0"/>
-              <a:t>resourceCount</a:t>
-            </a:r>
-            <a:r>
-              <a:rPr lang="en-US" sz="1200" dirty="0" smtClean="0"/>
-              <a:t> + PENALTY × moved?   + w</a:t>
-            </a:r>
-            <a:r>
-              <a:rPr lang="en-US" sz="1200" baseline="-25000" dirty="0" smtClean="0"/>
-              <a:t>3 </a:t>
-            </a:r>
-            <a:r>
-              <a:rPr lang="en-US" sz="1200" dirty="0" smtClean="0"/>
-              <a:t>× </a:t>
-            </a:r>
-            <a:r>
-              <a:rPr lang="en-US" sz="1200" dirty="0" err="1" smtClean="0"/>
-              <a:t>distMoved</a:t>
-            </a:r>
-            <a:r>
-              <a:rPr lang="en-US" sz="1200" dirty="0" smtClean="0"/>
-              <a:t>          + w</a:t>
-            </a:r>
-            <a:r>
-              <a:rPr lang="en-US" sz="1200" baseline="-25000" dirty="0" smtClean="0"/>
-              <a:t>3 </a:t>
             </a:r>
             <a:r>
               <a:rPr lang="en-US" sz="1200" dirty="0" smtClean="0"/>
@@ -7065,8 +7077,8 @@
         </p:nvSpPr>
         <p:spPr>
           <a:xfrm>
-            <a:off x="2778335" y="5559345"/>
-            <a:ext cx="6626703" cy="416891"/>
+            <a:off x="2613804" y="5559345"/>
+            <a:ext cx="6978769" cy="416891"/>
           </a:xfrm>
           <a:prstGeom prst="roundRect">
             <a:avLst/>
@@ -7104,8 +7116,16 @@
               <a:t>+</a:t>
             </a:r>
             <a:r>
-              <a:rPr lang="en-US" sz="1200" dirty="0" smtClean="0"/>
-              <a:t>= </a:t>
+              <a:rPr lang="en-US" sz="1200" dirty="0"/>
+              <a:t>= w</a:t>
+            </a:r>
+            <a:r>
+              <a:rPr lang="en-US" sz="1200" baseline="-25000" dirty="0"/>
+              <a:t>3</a:t>
+            </a:r>
+            <a:r>
+              <a:rPr lang="en-US" sz="1200" dirty="0"/>
+              <a:t> × </a:t>
             </a:r>
             <a:r>
               <a:rPr lang="en-US" sz="1200" dirty="0" err="1" smtClean="0"/>
@@ -7113,7 +7133,11 @@
             </a:r>
             <a:r>
               <a:rPr lang="en-US" sz="1200" dirty="0" smtClean="0"/>
-              <a:t> + BONUS</a:t>
+              <a:t> </a:t>
+            </a:r>
+            <a:r>
+              <a:rPr lang="en-US" sz="1200" dirty="0" smtClean="0"/>
+              <a:t>+ BONUS</a:t>
             </a:r>
             <a:r>
               <a:rPr lang="en-US" sz="1200" dirty="0"/>
@@ -7121,7 +7145,11 @@
             </a:r>
             <a:r>
               <a:rPr lang="en-US" sz="1200" dirty="0" smtClean="0"/>
-              <a:t> win? - w1</a:t>
+              <a:t> win? - w</a:t>
+            </a:r>
+            <a:r>
+              <a:rPr lang="en-US" sz="1200" baseline="-25000" dirty="0" smtClean="0"/>
+              <a:t>1</a:t>
             </a:r>
             <a:r>
               <a:rPr lang="en-US" sz="1200" dirty="0"/>
@@ -7145,7 +7173,11 @@
             </a:r>
             <a:r>
               <a:rPr lang="en-US" sz="1200" dirty="0" smtClean="0"/>
-              <a:t>overlapping(enemy)?</a:t>
+              <a:t>overlapping(Enemy</a:t>
+            </a:r>
+            <a:r>
+              <a:rPr lang="en-US" sz="1200" dirty="0" smtClean="0"/>
+              <a:t>)?</a:t>
             </a:r>
             <a:endParaRPr lang="en-US" sz="1200" dirty="0"/>
           </a:p>
@@ -7201,11 +7233,19 @@
             </a:r>
             <a:r>
               <a:rPr lang="en-US" sz="1200" dirty="0" smtClean="0"/>
-              <a:t>= - w</a:t>
+              <a:t>= - </a:t>
+            </a:r>
+            <a:r>
+              <a:rPr lang="en-US" sz="1200" dirty="0" smtClean="0"/>
+              <a:t>w</a:t>
+            </a:r>
+            <a:r>
+              <a:rPr lang="en-US" sz="1200" baseline="-25000" dirty="0"/>
+              <a:t>2</a:t>
             </a:r>
             <a:r>
               <a:rPr lang="en-US" sz="1200" baseline="-25000" dirty="0" smtClean="0"/>
-              <a:t>3 </a:t>
+              <a:t> </a:t>
             </a:r>
             <a:r>
               <a:rPr lang="en-US" sz="1200" dirty="0" smtClean="0"/>
@@ -7281,11 +7321,15 @@
             </a:r>
             <a:r>
               <a:rPr lang="en-US" sz="1200" dirty="0" smtClean="0"/>
-              <a:t>= w</a:t>
+              <a:t>= </a:t>
+            </a:r>
+            <a:r>
+              <a:rPr lang="en-US" sz="1200" dirty="0" smtClean="0"/>
+              <a:t>w</a:t>
             </a:r>
             <a:r>
               <a:rPr lang="en-US" sz="1200" baseline="-25000" dirty="0"/>
-              <a:t>3</a:t>
+              <a:t>2</a:t>
             </a:r>
             <a:r>
               <a:rPr lang="en-US" sz="1200" baseline="-25000" dirty="0" smtClean="0"/>
@@ -7293,11 +7337,15 @@
             </a:r>
             <a:r>
               <a:rPr lang="en-US" sz="1200" dirty="0" smtClean="0"/>
-              <a:t>× distance(Enemy) + w</a:t>
+              <a:t>× distance(Enemy) + </a:t>
+            </a:r>
+            <a:r>
+              <a:rPr lang="en-US" sz="1200" dirty="0" smtClean="0"/>
+              <a:t>w</a:t>
             </a:r>
             <a:r>
               <a:rPr lang="en-US" sz="1200" baseline="-25000" dirty="0"/>
-              <a:t>2</a:t>
+              <a:t>1</a:t>
             </a:r>
             <a:r>
               <a:rPr lang="en-US" sz="1200" baseline="-25000" dirty="0" smtClean="0"/>
@@ -7313,11 +7361,19 @@
             </a:r>
             <a:r>
               <a:rPr lang="en-US" sz="1200" dirty="0" smtClean="0"/>
-              <a:t>       + w</a:t>
+              <a:t>       + </a:t>
+            </a:r>
+            <a:r>
+              <a:rPr lang="en-US" sz="1200" dirty="0" smtClean="0"/>
+              <a:t>w</a:t>
+            </a:r>
+            <a:r>
+              <a:rPr lang="en-US" sz="1200" baseline="-25000" dirty="0"/>
+              <a:t>1</a:t>
             </a:r>
             <a:r>
               <a:rPr lang="en-US" sz="1200" baseline="-25000" dirty="0" smtClean="0"/>
-              <a:t>3 </a:t>
+              <a:t> </a:t>
             </a:r>
             <a:r>
               <a:rPr lang="en-US" sz="1200" dirty="0" smtClean="0"/>
@@ -7385,11 +7441,15 @@
             </a:r>
             <a:r>
               <a:rPr lang="en-US" sz="1200" dirty="0" smtClean="0"/>
-              <a:t>= w</a:t>
+              <a:t>= </a:t>
+            </a:r>
+            <a:r>
+              <a:rPr lang="en-US" sz="1200" dirty="0" smtClean="0"/>
+              <a:t>w</a:t>
             </a:r>
             <a:r>
               <a:rPr lang="en-US" sz="1200" baseline="-25000" dirty="0"/>
-              <a:t>3</a:t>
+              <a:t>2</a:t>
             </a:r>
             <a:r>
               <a:rPr lang="en-US" sz="1200" baseline="-25000" dirty="0" smtClean="0"/>
@@ -7426,6 +7486,10 @@
             <a:r>
               <a:rPr lang="en-US" sz="1200" dirty="0" smtClean="0"/>
               <a:t> </a:t>
+            </a:r>
+            <a:r>
+              <a:rPr lang="en-US" sz="1200" dirty="0" smtClean="0"/>
+              <a:t>       + distance(Resource)</a:t>
             </a:r>
             <a:endParaRPr lang="en-US" sz="1200" dirty="0"/>
           </a:p>
@@ -7635,9 +7699,9 @@
           <p:nvPr/>
         </p:nvCxnSpPr>
         <p:spPr>
-          <a:xfrm>
-            <a:off x="1805104" y="5024762"/>
-            <a:ext cx="0" cy="265691"/>
+          <a:xfrm flipH="1">
+            <a:off x="1805102" y="5170172"/>
+            <a:ext cx="381" cy="120281"/>
           </a:xfrm>
           <a:prstGeom prst="line">
             <a:avLst/>
@@ -7807,6 +7871,102 @@
           </a:fillRef>
           <a:effectRef idx="0">
             <a:schemeClr val="accent6"/>
+          </a:effectRef>
+          <a:fontRef idx="minor">
+            <a:schemeClr val="tx1"/>
+          </a:fontRef>
+        </p:style>
+      </p:cxnSp>
+      <p:sp>
+        <p:nvSpPr>
+          <p:cNvPr id="3" name="TextBox 2"/>
+          <p:cNvSpPr txBox="1"/>
+          <p:nvPr/>
+        </p:nvSpPr>
+        <p:spPr>
+          <a:xfrm>
+            <a:off x="272075" y="3446535"/>
+            <a:ext cx="1717227" cy="253916"/>
+          </a:xfrm>
+          <a:prstGeom prst="rect">
+            <a:avLst/>
+          </a:prstGeom>
+          <a:noFill/>
+        </p:spPr>
+        <p:txBody>
+          <a:bodyPr wrap="square" rtlCol="0">
+            <a:spAutoFit/>
+          </a:bodyPr>
+          <a:lstStyle/>
+          <a:p>
+            <a:r>
+              <a:rPr lang="en-US" sz="1050" dirty="0" smtClean="0"/>
+              <a:t>opponent       bad NPC</a:t>
+            </a:r>
+            <a:endParaRPr lang="en-US" sz="1050" dirty="0"/>
+          </a:p>
+        </p:txBody>
+      </p:sp>
+      <p:cxnSp>
+        <p:nvCxnSpPr>
+          <p:cNvPr id="10" name="Straight Arrow Connector 9"/>
+          <p:cNvCxnSpPr/>
+          <p:nvPr/>
+        </p:nvCxnSpPr>
+        <p:spPr>
+          <a:xfrm flipH="1">
+            <a:off x="724620" y="3340884"/>
+            <a:ext cx="384590" cy="126163"/>
+          </a:xfrm>
+          <a:prstGeom prst="straightConnector1">
+            <a:avLst/>
+          </a:prstGeom>
+          <a:ln>
+            <a:tailEnd type="triangle"/>
+          </a:ln>
+        </p:spPr>
+        <p:style>
+          <a:lnRef idx="1">
+            <a:schemeClr val="accent1"/>
+          </a:lnRef>
+          <a:fillRef idx="0">
+            <a:schemeClr val="accent1"/>
+          </a:fillRef>
+          <a:effectRef idx="0">
+            <a:schemeClr val="accent1"/>
+          </a:effectRef>
+          <a:fontRef idx="minor">
+            <a:schemeClr val="tx1"/>
+          </a:fontRef>
+        </p:style>
+      </p:cxnSp>
+      <p:cxnSp>
+        <p:nvCxnSpPr>
+          <p:cNvPr id="14" name="Straight Arrow Connector 13"/>
+          <p:cNvCxnSpPr/>
+          <p:nvPr/>
+        </p:nvCxnSpPr>
+        <p:spPr>
+          <a:xfrm>
+            <a:off x="1259094" y="3319536"/>
+            <a:ext cx="294470" cy="147511"/>
+          </a:xfrm>
+          <a:prstGeom prst="straightConnector1">
+            <a:avLst/>
+          </a:prstGeom>
+          <a:ln>
+            <a:tailEnd type="triangle"/>
+          </a:ln>
+        </p:spPr>
+        <p:style>
+          <a:lnRef idx="1">
+            <a:schemeClr val="accent1"/>
+          </a:lnRef>
+          <a:fillRef idx="0">
+            <a:schemeClr val="accent1"/>
+          </a:fillRef>
+          <a:effectRef idx="0">
+            <a:schemeClr val="accent1"/>
           </a:effectRef>
           <a:fontRef idx="minor">
             <a:schemeClr val="tx1"/>
@@ -7948,7 +8108,6 @@
               <a:rPr lang="en-US" dirty="0" smtClean="0"/>
               <a:t> butterfly!</a:t>
             </a:r>
-            <a:endParaRPr lang="en-US" dirty="0" smtClean="0"/>
           </a:p>
           <a:p>
             <a:r>
@@ -7963,8 +8122,13 @@
             </a:pPr>
             <a:r>
               <a:rPr lang="en-US" dirty="0" smtClean="0"/>
-              <a:t>Still too general and doesn’t know puppies are bad</a:t>
-            </a:r>
+              <a:t>Still too general and </a:t>
+            </a:r>
+            <a:r>
+              <a:rPr lang="en-US" dirty="0" smtClean="0"/>
+              <a:t>likes puppies too much.</a:t>
+            </a:r>
+            <a:endParaRPr lang="en-US" dirty="0" smtClean="0"/>
           </a:p>
           <a:p>
             <a:pPr lvl="1">
@@ -7973,8 +8137,17 @@
             </a:pPr>
             <a:r>
               <a:rPr lang="en-US" dirty="0" smtClean="0"/>
-              <a:t>Ignores FSM awesomeness and does what it pleases (i.e. hit trees with sticks)</a:t>
-            </a:r>
+              <a:t>Ignores most of </a:t>
+            </a:r>
+            <a:r>
+              <a:rPr lang="en-US" dirty="0" smtClean="0"/>
+              <a:t>FSM awesomeness and does what it pleases (i.e. hit trees with sticks</a:t>
+            </a:r>
+            <a:r>
+              <a:rPr lang="en-US" dirty="0" smtClean="0"/>
+              <a:t>).</a:t>
+            </a:r>
+            <a:endParaRPr lang="en-US" dirty="0" smtClean="0"/>
           </a:p>
           <a:p>
             <a:pPr lvl="1">
@@ -7983,7 +8156,11 @@
             </a:pPr>
             <a:r>
               <a:rPr lang="en-US" dirty="0" smtClean="0"/>
-              <a:t>Game too expensive for many generations to be iterated through in real time</a:t>
+              <a:t>Game too expensive for many generations to be iterated through in real </a:t>
+            </a:r>
+            <a:r>
+              <a:rPr lang="en-US" dirty="0" smtClean="0"/>
+              <a:t>time.</a:t>
             </a:r>
             <a:endParaRPr lang="en-US" dirty="0"/>
           </a:p>
@@ -8090,7 +8267,6 @@
               <a:rPr lang="en-US" dirty="0" smtClean="0"/>
               <a:t>Automatic map adjustment for fully connected maze</a:t>
             </a:r>
-            <a:endParaRPr lang="en-US" dirty="0" smtClean="0"/>
           </a:p>
           <a:p>
             <a:r>
@@ -9290,11 +9466,7 @@
             </a:pPr>
             <a:r>
               <a:rPr lang="en-US" dirty="0" smtClean="0"/>
-              <a:t>Decreased over </a:t>
-            </a:r>
-            <a:r>
-              <a:rPr lang="en-US" dirty="0" smtClean="0"/>
-              <a:t>time</a:t>
+              <a:t>Decreased over time</a:t>
             </a:r>
           </a:p>
           <a:p>
@@ -9310,11 +9482,6 @@
               </a:rPr>
               <a:t>+ Decreased by killer puppies! (spawned in regular intervals 3 at a time chasing each player)</a:t>
             </a:r>
-            <a:endParaRPr lang="en-US" dirty="0" smtClean="0">
-              <a:solidFill>
-                <a:schemeClr val="accent5"/>
-              </a:solidFill>
-            </a:endParaRPr>
           </a:p>
           <a:p>
             <a:pPr lvl="1">
@@ -9333,15 +9500,7 @@
             </a:pPr>
             <a:r>
               <a:rPr lang="en-US" dirty="0" smtClean="0"/>
-              <a:t>Kill and eat forest </a:t>
-            </a:r>
-            <a:r>
-              <a:rPr lang="en-US" dirty="0" smtClean="0"/>
-              <a:t>animals {Random NPCs} </a:t>
-            </a:r>
-            <a:r>
-              <a:rPr lang="en-US" dirty="0" smtClean="0"/>
-              <a:t>(most) - but they leave </a:t>
+              <a:t>Kill and eat forest animals {Random NPCs} (most) - but they leave </a:t>
             </a:r>
             <a:r>
               <a:rPr lang="en-US" dirty="0"/>
@@ -9351,7 +9510,6 @@
               <a:rPr lang="en-US" dirty="0" smtClean="0"/>
               <a:t>.</a:t>
             </a:r>
-            <a:endParaRPr lang="en-US" dirty="0" smtClean="0"/>
           </a:p>
           <a:p>
             <a:pPr lvl="2">
@@ -10486,11 +10644,7 @@
           <a:p>
             <a:r>
               <a:rPr lang="en-US" dirty="0" smtClean="0"/>
-              <a:t>Play Test #1 - </a:t>
-            </a:r>
-            <a:r>
-              <a:rPr lang="en-US" dirty="0" smtClean="0"/>
-              <a:t>Game v1</a:t>
+              <a:t>Play Test #1 - Game v1</a:t>
             </a:r>
             <a:endParaRPr lang="en-US" dirty="0"/>
           </a:p>
@@ -10640,53 +10794,21 @@
                   <a:schemeClr val="accent5"/>
                 </a:solidFill>
               </a:rPr>
-              <a:t>Prompts </a:t>
-            </a:r>
+              <a:t>Prompts for special events</a:t>
+            </a:r>
+          </a:p>
+          <a:p>
+            <a:pPr lvl="2">
+              <a:buFont typeface="Wingdings" panose="05000000000000000000" pitchFamily="2" charset="2"/>
+              <a:buChar char="Ø"/>
+            </a:pPr>
             <a:r>
               <a:rPr lang="en-US" sz="1200" b="1" dirty="0" smtClean="0">
                 <a:solidFill>
                   <a:schemeClr val="accent5"/>
                 </a:solidFill>
               </a:rPr>
-              <a:t>for special events</a:t>
-            </a:r>
-          </a:p>
-          <a:p>
-            <a:pPr lvl="2">
-              <a:buFont typeface="Wingdings" panose="05000000000000000000" pitchFamily="2" charset="2"/>
-              <a:buChar char="Ø"/>
-            </a:pPr>
-            <a:r>
-              <a:rPr lang="en-US" sz="1200" b="1" dirty="0" smtClean="0">
-                <a:solidFill>
-                  <a:schemeClr val="accent5"/>
-                </a:solidFill>
-              </a:rPr>
-              <a:t>Timed </a:t>
-            </a:r>
-            <a:r>
-              <a:rPr lang="en-US" sz="1200" b="1" dirty="0" smtClean="0">
-                <a:solidFill>
-                  <a:schemeClr val="accent5"/>
-                </a:solidFill>
-              </a:rPr>
-              <a:t>events to provoke player </a:t>
-            </a:r>
-            <a:r>
-              <a:rPr lang="en-US" sz="1200" b="1" dirty="0" smtClean="0">
-                <a:solidFill>
-                  <a:schemeClr val="accent5"/>
-                </a:solidFill>
-              </a:rPr>
-              <a:t>interaction / spikes in gameplay </a:t>
-            </a:r>
-            <a:r>
-              <a:rPr lang="en-US" sz="1200" b="1" dirty="0" smtClean="0">
-                <a:solidFill>
-                  <a:schemeClr val="accent5"/>
-                </a:solidFill>
-              </a:rPr>
-              <a:t>(i.e. food in the middle visible to all players)</a:t>
+              <a:t>Timed events to provoke player interaction / spikes in gameplay (i.e. food in the middle visible to all players)</a:t>
             </a:r>
             <a:endParaRPr lang="en-US" sz="1200" b="1" dirty="0">
               <a:solidFill>
@@ -11011,15 +11133,7 @@
                   <a:schemeClr val="accent2"/>
                 </a:solidFill>
               </a:rPr>
-              <a:t>AI </a:t>
-            </a:r>
-            <a:r>
-              <a:rPr lang="en-US" b="1" dirty="0" smtClean="0">
-                <a:solidFill>
-                  <a:schemeClr val="accent2"/>
-                </a:solidFill>
-              </a:rPr>
-              <a:t>dies too quickly to puppies.</a:t>
+              <a:t>AI dies too quickly to puppies.</a:t>
             </a:r>
           </a:p>
           <a:p>

</xml_diff>

<commit_message>
Code tidying up + readme file
</commit_message>
<xml_diff>
--- a/docs/final presentation.pptx
+++ b/docs/final presentation.pptx
@@ -572,7 +572,7 @@
           <a:effectLst/>
           <a:extLst>
             <a:ext uri="{91240B29-F687-4f45-9708-019B960494DF}">
-              <a14:hiddenLine xmlns="" xmlns:a14="http://schemas.microsoft.com/office/drawing/2010/main" w="9525">
+              <a14:hiddenLine xmlns:a14="http://schemas.microsoft.com/office/drawing/2010/main" xmlns="" w="9525">
                 <a:solidFill>
                   <a:srgbClr val="000000"/>
                 </a:solidFill>
@@ -2094,7 +2094,7 @@
           <a:ln/>
           <a:extLst>
             <a:ext uri="{91240B29-F687-4f45-9708-019B960494DF}">
-              <a14:hiddenLine xmlns="" xmlns:a14="http://schemas.microsoft.com/office/drawing/2010/main" w="9525">
+              <a14:hiddenLine xmlns:a14="http://schemas.microsoft.com/office/drawing/2010/main" xmlns="" w="9525">
                 <a:solidFill>
                   <a:srgbClr val="000000"/>
                 </a:solidFill>
@@ -2369,7 +2369,7 @@
           <a:ln/>
           <a:extLst>
             <a:ext uri="{91240B29-F687-4f45-9708-019B960494DF}">
-              <a14:hiddenLine xmlns="" xmlns:a14="http://schemas.microsoft.com/office/drawing/2010/main" w="9525">
+              <a14:hiddenLine xmlns:a14="http://schemas.microsoft.com/office/drawing/2010/main" xmlns="" w="9525">
                 <a:solidFill>
                   <a:srgbClr val="000000"/>
                 </a:solidFill>
@@ -2652,7 +2652,7 @@
           <a:ln/>
           <a:extLst>
             <a:ext uri="{91240B29-F687-4f45-9708-019B960494DF}">
-              <a14:hiddenLine xmlns="" xmlns:a14="http://schemas.microsoft.com/office/drawing/2010/main" w="9525">
+              <a14:hiddenLine xmlns:a14="http://schemas.microsoft.com/office/drawing/2010/main" xmlns="" w="9525">
                 <a:solidFill>
                   <a:srgbClr val="000000"/>
                 </a:solidFill>
@@ -3278,7 +3278,7 @@
           <a:ln/>
           <a:extLst>
             <a:ext uri="{91240B29-F687-4f45-9708-019B960494DF}">
-              <a14:hiddenLine xmlns="" xmlns:a14="http://schemas.microsoft.com/office/drawing/2010/main" w="9525">
+              <a14:hiddenLine xmlns:a14="http://schemas.microsoft.com/office/drawing/2010/main" xmlns="" w="9525">
                 <a:solidFill>
                   <a:srgbClr val="000000"/>
                 </a:solidFill>
@@ -3617,7 +3617,7 @@
           <a:ln/>
           <a:extLst>
             <a:ext uri="{91240B29-F687-4f45-9708-019B960494DF}">
-              <a14:hiddenLine xmlns="" xmlns:a14="http://schemas.microsoft.com/office/drawing/2010/main" w="9525">
+              <a14:hiddenLine xmlns:a14="http://schemas.microsoft.com/office/drawing/2010/main" xmlns="" w="9525">
                 <a:solidFill>
                   <a:srgbClr val="000000"/>
                 </a:solidFill>
@@ -4094,7 +4094,7 @@
           <a:ln/>
           <a:extLst>
             <a:ext uri="{91240B29-F687-4f45-9708-019B960494DF}">
-              <a14:hiddenLine xmlns="" xmlns:a14="http://schemas.microsoft.com/office/drawing/2010/main" w="9525">
+              <a14:hiddenLine xmlns:a14="http://schemas.microsoft.com/office/drawing/2010/main" xmlns="" w="9525">
                 <a:solidFill>
                   <a:srgbClr val="000000"/>
                 </a:solidFill>
@@ -4523,7 +4523,7 @@
           <a:ln/>
           <a:extLst>
             <a:ext uri="{91240B29-F687-4f45-9708-019B960494DF}">
-              <a14:hiddenLine xmlns="" xmlns:a14="http://schemas.microsoft.com/office/drawing/2010/main" w="9525">
+              <a14:hiddenLine xmlns:a14="http://schemas.microsoft.com/office/drawing/2010/main" xmlns="" w="9525">
                 <a:solidFill>
                   <a:srgbClr val="000000"/>
                 </a:solidFill>
@@ -7007,15 +7007,7 @@
             </a:r>
             <a:r>
               <a:rPr lang="en-US" sz="1200" dirty="0" smtClean="0"/>
-              <a:t>                      - </a:t>
-            </a:r>
-            <a:r>
-              <a:rPr lang="en-US" sz="1200" dirty="0" smtClean="0"/>
-              <a:t>PENALTY × moved?  </a:t>
-            </a:r>
-            <a:r>
-              <a:rPr lang="en-US" sz="1200" dirty="0" smtClean="0"/>
-              <a:t>                  - w</a:t>
+              <a:t>                      - PENALTY × moved?                    - w</a:t>
             </a:r>
             <a:r>
               <a:rPr lang="en-US" sz="1200" baseline="-25000" dirty="0" smtClean="0"/>
@@ -7023,11 +7015,7 @@
             </a:r>
             <a:r>
               <a:rPr lang="en-US" sz="1200" dirty="0" smtClean="0"/>
-              <a:t>× </a:t>
-            </a:r>
-            <a:r>
-              <a:rPr lang="en-US" sz="1200" dirty="0" smtClean="0"/>
-              <a:t>distance(</a:t>
+              <a:t>× distance(</a:t>
             </a:r>
             <a:r>
               <a:rPr lang="en-US" sz="1200" dirty="0" err="1" smtClean="0"/>
@@ -7133,11 +7121,7 @@
             </a:r>
             <a:r>
               <a:rPr lang="en-US" sz="1200" dirty="0" smtClean="0"/>
-              <a:t> </a:t>
-            </a:r>
-            <a:r>
-              <a:rPr lang="en-US" sz="1200" dirty="0" smtClean="0"/>
-              <a:t>+ BONUS</a:t>
+              <a:t> + BONUS</a:t>
             </a:r>
             <a:r>
               <a:rPr lang="en-US" sz="1200" dirty="0"/>
@@ -7173,11 +7157,7 @@
             </a:r>
             <a:r>
               <a:rPr lang="en-US" sz="1200" dirty="0" smtClean="0"/>
-              <a:t>overlapping(Enemy</a:t>
-            </a:r>
-            <a:r>
-              <a:rPr lang="en-US" sz="1200" dirty="0" smtClean="0"/>
-              <a:t>)?</a:t>
+              <a:t>overlapping(Enemy)?</a:t>
             </a:r>
             <a:endParaRPr lang="en-US" sz="1200" dirty="0"/>
           </a:p>
@@ -7233,11 +7213,7 @@
             </a:r>
             <a:r>
               <a:rPr lang="en-US" sz="1200" dirty="0" smtClean="0"/>
-              <a:t>= - </a:t>
-            </a:r>
-            <a:r>
-              <a:rPr lang="en-US" sz="1200" dirty="0" smtClean="0"/>
-              <a:t>w</a:t>
+              <a:t>= - w</a:t>
             </a:r>
             <a:r>
               <a:rPr lang="en-US" sz="1200" baseline="-25000" dirty="0"/>
@@ -7321,11 +7297,7 @@
             </a:r>
             <a:r>
               <a:rPr lang="en-US" sz="1200" dirty="0" smtClean="0"/>
-              <a:t>= </a:t>
-            </a:r>
-            <a:r>
-              <a:rPr lang="en-US" sz="1200" dirty="0" smtClean="0"/>
-              <a:t>w</a:t>
+              <a:t>= w</a:t>
             </a:r>
             <a:r>
               <a:rPr lang="en-US" sz="1200" baseline="-25000" dirty="0"/>
@@ -7337,11 +7309,7 @@
             </a:r>
             <a:r>
               <a:rPr lang="en-US" sz="1200" dirty="0" smtClean="0"/>
-              <a:t>× distance(Enemy) + </a:t>
-            </a:r>
-            <a:r>
-              <a:rPr lang="en-US" sz="1200" dirty="0" smtClean="0"/>
-              <a:t>w</a:t>
+              <a:t>× distance(Enemy) + w</a:t>
             </a:r>
             <a:r>
               <a:rPr lang="en-US" sz="1200" baseline="-25000" dirty="0"/>
@@ -7361,11 +7329,7 @@
             </a:r>
             <a:r>
               <a:rPr lang="en-US" sz="1200" dirty="0" smtClean="0"/>
-              <a:t>       + </a:t>
-            </a:r>
-            <a:r>
-              <a:rPr lang="en-US" sz="1200" dirty="0" smtClean="0"/>
-              <a:t>w</a:t>
+              <a:t>       + w</a:t>
             </a:r>
             <a:r>
               <a:rPr lang="en-US" sz="1200" baseline="-25000" dirty="0"/>
@@ -7441,11 +7405,7 @@
             </a:r>
             <a:r>
               <a:rPr lang="en-US" sz="1200" dirty="0" smtClean="0"/>
-              <a:t>= </a:t>
-            </a:r>
-            <a:r>
-              <a:rPr lang="en-US" sz="1200" dirty="0" smtClean="0"/>
-              <a:t>w</a:t>
+              <a:t>= w</a:t>
             </a:r>
             <a:r>
               <a:rPr lang="en-US" sz="1200" baseline="-25000" dirty="0"/>
@@ -7485,11 +7445,15 @@
             </a:r>
             <a:r>
               <a:rPr lang="en-US" sz="1200" dirty="0" smtClean="0"/>
-              <a:t> </a:t>
+              <a:t>      </a:t>
             </a:r>
             <a:r>
               <a:rPr lang="en-US" sz="1200" dirty="0" smtClean="0"/>
-              <a:t>       + distance(Resource)</a:t>
+              <a:t>   - </a:t>
+            </a:r>
+            <a:r>
+              <a:rPr lang="en-US" sz="1200" dirty="0" smtClean="0"/>
+              <a:t>distance(Resource)</a:t>
             </a:r>
             <a:endParaRPr lang="en-US" sz="1200" dirty="0"/>
           </a:p>
@@ -8122,13 +8086,8 @@
             </a:pPr>
             <a:r>
               <a:rPr lang="en-US" dirty="0" smtClean="0"/>
-              <a:t>Still too general and </a:t>
-            </a:r>
-            <a:r>
-              <a:rPr lang="en-US" dirty="0" smtClean="0"/>
-              <a:t>likes puppies too much.</a:t>
-            </a:r>
-            <a:endParaRPr lang="en-US" dirty="0" smtClean="0"/>
+              <a:t>Still too general and likes puppies too much.</a:t>
+            </a:r>
           </a:p>
           <a:p>
             <a:pPr lvl="1">
@@ -8137,17 +8096,8 @@
             </a:pPr>
             <a:r>
               <a:rPr lang="en-US" dirty="0" smtClean="0"/>
-              <a:t>Ignores most of </a:t>
-            </a:r>
-            <a:r>
-              <a:rPr lang="en-US" dirty="0" smtClean="0"/>
-              <a:t>FSM awesomeness and does what it pleases (i.e. hit trees with sticks</a:t>
-            </a:r>
-            <a:r>
-              <a:rPr lang="en-US" dirty="0" smtClean="0"/>
-              <a:t>).</a:t>
-            </a:r>
-            <a:endParaRPr lang="en-US" dirty="0" smtClean="0"/>
+              <a:t>Ignores most of FSM awesomeness and does what it pleases (i.e. hit trees with sticks).</a:t>
+            </a:r>
           </a:p>
           <a:p>
             <a:pPr lvl="1">
@@ -8156,11 +8106,7 @@
             </a:pPr>
             <a:r>
               <a:rPr lang="en-US" dirty="0" smtClean="0"/>
-              <a:t>Game too expensive for many generations to be iterated through in real </a:t>
-            </a:r>
-            <a:r>
-              <a:rPr lang="en-US" dirty="0" smtClean="0"/>
-              <a:t>time.</a:t>
+              <a:t>Game too expensive for many generations to be iterated through in real time.</a:t>
             </a:r>
             <a:endParaRPr lang="en-US" dirty="0"/>
           </a:p>

</xml_diff>